<commit_message>
Minor updates and corrections to slides
</commit_message>
<xml_diff>
--- a/LectureSlides/06b_IntroductionToBootstrap.pptx
+++ b/LectureSlides/06b_IntroductionToBootstrap.pptx
@@ -1,11 +1,11 @@
 
 <file path=ppt/presentation.xml><?xml version="1.0" encoding="utf-8"?>
-<p:presentation xmlns:a="http://schemas.openxmlformats.org/drawingml/2006/main" xmlns:p="http://schemas.openxmlformats.org/presentationml/2006/main" xmlns:r="http://schemas.openxmlformats.org/officeDocument/2006/relationships" autoCompressPictures="0" saveSubsetFonts="1">
+<p:presentation xmlns:a="http://schemas.openxmlformats.org/drawingml/2006/main" xmlns:r="http://schemas.openxmlformats.org/officeDocument/2006/relationships" xmlns:p="http://schemas.openxmlformats.org/presentationml/2006/main" saveSubsetFonts="1" autoCompressPictures="0">
   <p:sldMasterIdLst>
     <p:sldMasterId id="2147483648" r:id="rId1"/>
   </p:sldMasterIdLst>
   <p:sldIdLst>
-    <p:sldId id="256" r:id="rId2"/>
+    <p:sldId id="299" r:id="rId2"/>
     <p:sldId id="257" r:id="rId3"/>
     <p:sldId id="258" r:id="rId4"/>
     <p:sldId id="259" r:id="rId5"/>
@@ -40,8 +40,8 @@
     <a:defPPr>
       <a:defRPr lang="en-US"/>
     </a:defPPr>
-    <a:lvl1pPr algn="l" defTabSz="457200" eaLnBrk="1" hangingPunct="1" latinLnBrk="0" marL="0" rtl="0">
-      <a:defRPr kern="1200" sz="1800">
+    <a:lvl1pPr marL="0" algn="l" defTabSz="457200" rtl="0" eaLnBrk="1" latinLnBrk="0" hangingPunct="1">
+      <a:defRPr sz="1800" kern="1200">
         <a:solidFill>
           <a:schemeClr val="tx1"/>
         </a:solidFill>
@@ -50,8 +50,8 @@
         <a:cs typeface="+mn-cs"/>
       </a:defRPr>
     </a:lvl1pPr>
-    <a:lvl2pPr algn="l" defTabSz="457200" eaLnBrk="1" hangingPunct="1" latinLnBrk="0" marL="457200" rtl="0">
-      <a:defRPr kern="1200" sz="1800">
+    <a:lvl2pPr marL="457200" algn="l" defTabSz="457200" rtl="0" eaLnBrk="1" latinLnBrk="0" hangingPunct="1">
+      <a:defRPr sz="1800" kern="1200">
         <a:solidFill>
           <a:schemeClr val="tx1"/>
         </a:solidFill>
@@ -60,8 +60,8 @@
         <a:cs typeface="+mn-cs"/>
       </a:defRPr>
     </a:lvl2pPr>
-    <a:lvl3pPr algn="l" defTabSz="457200" eaLnBrk="1" hangingPunct="1" latinLnBrk="0" marL="914400" rtl="0">
-      <a:defRPr kern="1200" sz="1800">
+    <a:lvl3pPr marL="914400" algn="l" defTabSz="457200" rtl="0" eaLnBrk="1" latinLnBrk="0" hangingPunct="1">
+      <a:defRPr sz="1800" kern="1200">
         <a:solidFill>
           <a:schemeClr val="tx1"/>
         </a:solidFill>
@@ -70,8 +70,8 @@
         <a:cs typeface="+mn-cs"/>
       </a:defRPr>
     </a:lvl3pPr>
-    <a:lvl4pPr algn="l" defTabSz="457200" eaLnBrk="1" hangingPunct="1" latinLnBrk="0" marL="1371600" rtl="0">
-      <a:defRPr kern="1200" sz="1800">
+    <a:lvl4pPr marL="1371600" algn="l" defTabSz="457200" rtl="0" eaLnBrk="1" latinLnBrk="0" hangingPunct="1">
+      <a:defRPr sz="1800" kern="1200">
         <a:solidFill>
           <a:schemeClr val="tx1"/>
         </a:solidFill>
@@ -80,8 +80,8 @@
         <a:cs typeface="+mn-cs"/>
       </a:defRPr>
     </a:lvl4pPr>
-    <a:lvl5pPr algn="l" defTabSz="457200" eaLnBrk="1" hangingPunct="1" latinLnBrk="0" marL="1828800" rtl="0">
-      <a:defRPr kern="1200" sz="1800">
+    <a:lvl5pPr marL="1828800" algn="l" defTabSz="457200" rtl="0" eaLnBrk="1" latinLnBrk="0" hangingPunct="1">
+      <a:defRPr sz="1800" kern="1200">
         <a:solidFill>
           <a:schemeClr val="tx1"/>
         </a:solidFill>
@@ -90,8 +90,8 @@
         <a:cs typeface="+mn-cs"/>
       </a:defRPr>
     </a:lvl5pPr>
-    <a:lvl6pPr algn="l" defTabSz="457200" eaLnBrk="1" hangingPunct="1" latinLnBrk="0" marL="2286000" rtl="0">
-      <a:defRPr kern="1200" sz="1800">
+    <a:lvl6pPr marL="2286000" algn="l" defTabSz="457200" rtl="0" eaLnBrk="1" latinLnBrk="0" hangingPunct="1">
+      <a:defRPr sz="1800" kern="1200">
         <a:solidFill>
           <a:schemeClr val="tx1"/>
         </a:solidFill>
@@ -100,8 +100,8 @@
         <a:cs typeface="+mn-cs"/>
       </a:defRPr>
     </a:lvl6pPr>
-    <a:lvl7pPr algn="l" defTabSz="457200" eaLnBrk="1" hangingPunct="1" latinLnBrk="0" marL="2743200" rtl="0">
-      <a:defRPr kern="1200" sz="1800">
+    <a:lvl7pPr marL="2743200" algn="l" defTabSz="457200" rtl="0" eaLnBrk="1" latinLnBrk="0" hangingPunct="1">
+      <a:defRPr sz="1800" kern="1200">
         <a:solidFill>
           <a:schemeClr val="tx1"/>
         </a:solidFill>
@@ -110,8 +110,8 @@
         <a:cs typeface="+mn-cs"/>
       </a:defRPr>
     </a:lvl7pPr>
-    <a:lvl8pPr algn="l" defTabSz="457200" eaLnBrk="1" hangingPunct="1" latinLnBrk="0" marL="3200400" rtl="0">
-      <a:defRPr kern="1200" sz="1800">
+    <a:lvl8pPr marL="3200400" algn="l" defTabSz="457200" rtl="0" eaLnBrk="1" latinLnBrk="0" hangingPunct="1">
+      <a:defRPr sz="1800" kern="1200">
         <a:solidFill>
           <a:schemeClr val="tx1"/>
         </a:solidFill>
@@ -120,8 +120,8 @@
         <a:cs typeface="+mn-cs"/>
       </a:defRPr>
     </a:lvl8pPr>
-    <a:lvl9pPr algn="l" defTabSz="457200" eaLnBrk="1" hangingPunct="1" latinLnBrk="0" marL="3657600" rtl="0">
-      <a:defRPr kern="1200" sz="1800">
+    <a:lvl9pPr marL="3657600" algn="l" defTabSz="457200" rtl="0" eaLnBrk="1" latinLnBrk="0" hangingPunct="1">
+      <a:defRPr sz="1800" kern="1200">
         <a:solidFill>
           <a:schemeClr val="tx1"/>
         </a:solidFill>
@@ -329,7 +329,7 @@
           <a:p>
             <a:fld id="{241EB5C9-1307-BA42-ABA2-0BC069CD8E7F}" type="datetimeFigureOut">
               <a:rPr lang="en-US" smtClean="0"/>
-              <a:t>1/2/22</a:t>
+              <a:t>9/11/2024</a:t>
             </a:fld>
             <a:endParaRPr lang="en-US"/>
           </a:p>
@@ -497,7 +497,7 @@
           <a:p>
             <a:fld id="{241EB5C9-1307-BA42-ABA2-0BC069CD8E7F}" type="datetimeFigureOut">
               <a:rPr lang="en-US" smtClean="0"/>
-              <a:t>1/2/22</a:t>
+              <a:t>9/11/2024</a:t>
             </a:fld>
             <a:endParaRPr lang="en-US"/>
           </a:p>
@@ -675,7 +675,7 @@
           <a:p>
             <a:fld id="{241EB5C9-1307-BA42-ABA2-0BC069CD8E7F}" type="datetimeFigureOut">
               <a:rPr lang="en-US" smtClean="0"/>
-              <a:t>1/2/22</a:t>
+              <a:t>9/11/2024</a:t>
             </a:fld>
             <a:endParaRPr lang="en-US"/>
           </a:p>
@@ -843,7 +843,7 @@
           <a:p>
             <a:fld id="{241EB5C9-1307-BA42-ABA2-0BC069CD8E7F}" type="datetimeFigureOut">
               <a:rPr lang="en-US" smtClean="0"/>
-              <a:t>1/2/22</a:t>
+              <a:t>9/11/2024</a:t>
             </a:fld>
             <a:endParaRPr lang="en-US"/>
           </a:p>
@@ -1088,7 +1088,7 @@
           <a:p>
             <a:fld id="{241EB5C9-1307-BA42-ABA2-0BC069CD8E7F}" type="datetimeFigureOut">
               <a:rPr lang="en-US" smtClean="0"/>
-              <a:t>1/2/22</a:t>
+              <a:t>9/11/2024</a:t>
             </a:fld>
             <a:endParaRPr lang="en-US"/>
           </a:p>
@@ -1373,7 +1373,7 @@
           <a:p>
             <a:fld id="{241EB5C9-1307-BA42-ABA2-0BC069CD8E7F}" type="datetimeFigureOut">
               <a:rPr lang="en-US" smtClean="0"/>
-              <a:t>1/2/22</a:t>
+              <a:t>9/11/2024</a:t>
             </a:fld>
             <a:endParaRPr lang="en-US"/>
           </a:p>
@@ -1792,7 +1792,7 @@
           <a:p>
             <a:fld id="{241EB5C9-1307-BA42-ABA2-0BC069CD8E7F}" type="datetimeFigureOut">
               <a:rPr lang="en-US" smtClean="0"/>
-              <a:t>1/2/22</a:t>
+              <a:t>9/11/2024</a:t>
             </a:fld>
             <a:endParaRPr lang="en-US"/>
           </a:p>
@@ -1909,7 +1909,7 @@
           <a:p>
             <a:fld id="{241EB5C9-1307-BA42-ABA2-0BC069CD8E7F}" type="datetimeFigureOut">
               <a:rPr lang="en-US" smtClean="0"/>
-              <a:t>1/2/22</a:t>
+              <a:t>9/11/2024</a:t>
             </a:fld>
             <a:endParaRPr lang="en-US"/>
           </a:p>
@@ -2004,7 +2004,7 @@
           <a:p>
             <a:fld id="{241EB5C9-1307-BA42-ABA2-0BC069CD8E7F}" type="datetimeFigureOut">
               <a:rPr lang="en-US" smtClean="0"/>
-              <a:t>1/2/22</a:t>
+              <a:t>9/11/2024</a:t>
             </a:fld>
             <a:endParaRPr lang="en-US"/>
           </a:p>
@@ -2279,7 +2279,7 @@
           <a:p>
             <a:fld id="{241EB5C9-1307-BA42-ABA2-0BC069CD8E7F}" type="datetimeFigureOut">
               <a:rPr lang="en-US" smtClean="0"/>
-              <a:t>1/2/22</a:t>
+              <a:t>9/11/2024</a:t>
             </a:fld>
             <a:endParaRPr lang="en-US"/>
           </a:p>
@@ -2531,7 +2531,7 @@
           <a:p>
             <a:fld id="{241EB5C9-1307-BA42-ABA2-0BC069CD8E7F}" type="datetimeFigureOut">
               <a:rPr lang="en-US" smtClean="0"/>
-              <a:t>1/2/22</a:t>
+              <a:t>9/11/2024</a:t>
             </a:fld>
             <a:endParaRPr lang="en-US"/>
           </a:p>
@@ -2593,7 +2593,7 @@
 </file>
 
 <file path=ppt/slideMasters/slideMaster1.xml><?xml version="1.0" encoding="utf-8"?>
-<p:sldMaster xmlns:a="http://schemas.openxmlformats.org/drawingml/2006/main" xmlns:p="http://schemas.openxmlformats.org/presentationml/2006/main" xmlns:r="http://schemas.openxmlformats.org/officeDocument/2006/relationships">
+<p:sldMaster xmlns:a="http://schemas.openxmlformats.org/drawingml/2006/main" xmlns:r="http://schemas.openxmlformats.org/officeDocument/2006/relationships" xmlns:p="http://schemas.openxmlformats.org/presentationml/2006/main">
   <p:cSld>
     <p:bg>
       <p:bgRef idx="1001">
@@ -2634,7 +2634,7 @@
           </a:prstGeom>
         </p:spPr>
         <p:txBody>
-          <a:bodyPr anchor="ctr" bIns="45720" lIns="91440" rIns="91440" rtlCol="0" tIns="45720" vert="horz">
+          <a:bodyPr vert="horz" lIns="91440" tIns="45720" rIns="91440" bIns="45720" rtlCol="0" anchor="ctr">
             <a:normAutofit/>
           </a:bodyPr>
           <a:lstStyle/>
@@ -2653,7 +2653,7 @@
             <a:spLocks noGrp="1"/>
           </p:cNvSpPr>
           <p:nvPr>
-            <p:ph idx="1" type="body"/>
+            <p:ph type="body" idx="1"/>
           </p:nvPr>
         </p:nvSpPr>
         <p:spPr>
@@ -2666,7 +2666,7 @@
           </a:prstGeom>
         </p:spPr>
         <p:txBody>
-          <a:bodyPr bIns="45720" lIns="91440" rIns="91440" rtlCol="0" tIns="45720" vert="horz">
+          <a:bodyPr vert="horz" lIns="91440" tIns="45720" rIns="91440" bIns="45720" rtlCol="0">
             <a:normAutofit/>
           </a:bodyPr>
           <a:lstStyle/>
@@ -2714,7 +2714,7 @@
             <a:spLocks noGrp="1"/>
           </p:cNvSpPr>
           <p:nvPr>
-            <p:ph idx="2" sz="half" type="dt"/>
+            <p:ph type="dt" sz="half" idx="2"/>
           </p:nvPr>
         </p:nvSpPr>
         <p:spPr>
@@ -2727,7 +2727,7 @@
           </a:prstGeom>
         </p:spPr>
         <p:txBody>
-          <a:bodyPr anchor="ctr" bIns="45720" lIns="91440" rIns="91440" rtlCol="0" tIns="45720" vert="horz"/>
+          <a:bodyPr vert="horz" lIns="91440" tIns="45720" rIns="91440" bIns="45720" rtlCol="0" anchor="ctr"/>
           <a:lstStyle>
             <a:lvl1pPr algn="l">
               <a:defRPr sz="900">
@@ -2742,7 +2742,7 @@
           <a:p>
             <a:fld id="{241EB5C9-1307-BA42-ABA2-0BC069CD8E7F}" type="datetimeFigureOut">
               <a:rPr lang="en-US" smtClean="0"/>
-              <a:t>1/2/22</a:t>
+              <a:t>9/11/2024</a:t>
             </a:fld>
             <a:endParaRPr lang="en-US"/>
           </a:p>
@@ -2755,7 +2755,7 @@
             <a:spLocks noGrp="1"/>
           </p:cNvSpPr>
           <p:nvPr>
-            <p:ph idx="3" sz="quarter" type="ftr"/>
+            <p:ph type="ftr" sz="quarter" idx="3"/>
           </p:nvPr>
         </p:nvSpPr>
         <p:spPr>
@@ -2768,7 +2768,7 @@
           </a:prstGeom>
         </p:spPr>
         <p:txBody>
-          <a:bodyPr anchor="ctr" bIns="45720" lIns="91440" rIns="91440" rtlCol="0" tIns="45720" vert="horz"/>
+          <a:bodyPr vert="horz" lIns="91440" tIns="45720" rIns="91440" bIns="45720" rtlCol="0" anchor="ctr"/>
           <a:lstStyle>
             <a:lvl1pPr algn="ctr">
               <a:defRPr sz="900">
@@ -2792,7 +2792,7 @@
             <a:spLocks noGrp="1"/>
           </p:cNvSpPr>
           <p:nvPr>
-            <p:ph idx="4" sz="quarter" type="sldNum"/>
+            <p:ph type="sldNum" sz="quarter" idx="4"/>
           </p:nvPr>
         </p:nvSpPr>
         <p:spPr>
@@ -2805,7 +2805,7 @@
           </a:prstGeom>
         </p:spPr>
         <p:txBody>
-          <a:bodyPr anchor="ctr" bIns="45720" lIns="91440" rIns="91440" rtlCol="0" tIns="45720" vert="horz"/>
+          <a:bodyPr vert="horz" lIns="91440" tIns="45720" rIns="91440" bIns="45720" rtlCol="0" anchor="ctr"/>
           <a:lstStyle>
             <a:lvl1pPr algn="r">
               <a:defRPr sz="900">
@@ -2833,7 +2833,7 @@
       </p:ext>
     </p:extLst>
   </p:cSld>
-  <p:clrMap accent1="accent1" accent2="accent2" accent3="accent3" accent4="accent4" accent5="accent5" accent6="accent6" bg1="lt1" bg2="lt2" folHlink="folHlink" hlink="hlink" tx1="dk1" tx2="dk2"/>
+  <p:clrMap bg1="lt1" tx1="dk1" bg2="lt2" tx2="dk2" accent1="accent1" accent2="accent2" accent3="accent3" accent4="accent4" accent5="accent5" accent6="accent6" hlink="hlink" folHlink="folHlink"/>
   <p:sldLayoutIdLst>
     <p:sldLayoutId id="2147483649" r:id="rId1"/>
     <p:sldLayoutId id="2147483650" r:id="rId2"/>
@@ -2849,12 +2849,12 @@
   </p:sldLayoutIdLst>
   <p:txStyles>
     <p:titleStyle>
-      <a:lvl1pPr algn="ctr" defTabSz="342900" eaLnBrk="1" hangingPunct="1" latinLnBrk="0" rtl="0">
+      <a:lvl1pPr algn="ctr" defTabSz="342900" rtl="0" eaLnBrk="1" latinLnBrk="0" hangingPunct="1">
         <a:spcBef>
           <a:spcPct val="0"/>
         </a:spcBef>
         <a:buNone/>
-        <a:defRPr kern="1200" sz="3300">
+        <a:defRPr sz="3300" kern="1200">
           <a:solidFill>
             <a:schemeClr val="tx1"/>
           </a:solidFill>
@@ -2865,13 +2865,13 @@
       </a:lvl1pPr>
     </p:titleStyle>
     <p:bodyStyle>
-      <a:lvl1pPr algn="l" defTabSz="342900" eaLnBrk="1" hangingPunct="1" indent="-342900" latinLnBrk="0" marL="342900" rtl="0">
+      <a:lvl1pPr marL="342900" indent="-342900" algn="l" defTabSz="342900" rtl="0" eaLnBrk="1" latinLnBrk="0" hangingPunct="1">
         <a:spcBef>
           <a:spcPct val="20000"/>
         </a:spcBef>
         <a:buFont typeface="Arial"/>
         <a:buChar char="•"/>
-        <a:defRPr kern="1200" sz="2400">
+        <a:defRPr sz="2400" kern="1200">
           <a:solidFill>
             <a:schemeClr val="tx1"/>
           </a:solidFill>
@@ -2880,13 +2880,13 @@
           <a:cs typeface="+mn-cs"/>
         </a:defRPr>
       </a:lvl1pPr>
-      <a:lvl2pPr algn="l" defTabSz="342900" eaLnBrk="1" hangingPunct="1" indent="-342900" latinLnBrk="0" marL="685800" rtl="0">
+      <a:lvl2pPr marL="685800" indent="-342900" algn="l" defTabSz="342900" rtl="0" eaLnBrk="1" latinLnBrk="0" hangingPunct="1">
         <a:spcBef>
           <a:spcPct val="20000"/>
         </a:spcBef>
         <a:buFont typeface="Arial"/>
         <a:buChar char="–"/>
-        <a:defRPr kern="1200" sz="2100">
+        <a:defRPr sz="2100" kern="1200">
           <a:solidFill>
             <a:schemeClr val="tx1"/>
           </a:solidFill>
@@ -2895,13 +2895,13 @@
           <a:cs typeface="+mn-cs"/>
         </a:defRPr>
       </a:lvl2pPr>
-      <a:lvl3pPr algn="l" defTabSz="342900" eaLnBrk="1" hangingPunct="1" indent="-342900" latinLnBrk="0" marL="1028700" rtl="0">
+      <a:lvl3pPr marL="1028700" indent="-342900" algn="l" defTabSz="342900" rtl="0" eaLnBrk="1" latinLnBrk="0" hangingPunct="1">
         <a:spcBef>
           <a:spcPct val="20000"/>
         </a:spcBef>
         <a:buFont typeface="Arial"/>
         <a:buChar char="•"/>
-        <a:defRPr kern="1200" sz="1800">
+        <a:defRPr sz="1800" kern="1200">
           <a:solidFill>
             <a:schemeClr val="tx1"/>
           </a:solidFill>
@@ -2910,13 +2910,13 @@
           <a:cs typeface="+mn-cs"/>
         </a:defRPr>
       </a:lvl3pPr>
-      <a:lvl4pPr algn="l" defTabSz="342900" eaLnBrk="1" hangingPunct="1" indent="-342900" latinLnBrk="0" marL="1371600" rtl="0">
+      <a:lvl4pPr marL="1371600" indent="-342900" algn="l" defTabSz="342900" rtl="0" eaLnBrk="1" latinLnBrk="0" hangingPunct="1">
         <a:spcBef>
           <a:spcPct val="20000"/>
         </a:spcBef>
         <a:buFont typeface="Arial"/>
         <a:buChar char="–"/>
-        <a:defRPr kern="1200" sz="1500">
+        <a:defRPr sz="1500" kern="1200">
           <a:solidFill>
             <a:schemeClr val="tx1"/>
           </a:solidFill>
@@ -2925,13 +2925,13 @@
           <a:cs typeface="+mn-cs"/>
         </a:defRPr>
       </a:lvl4pPr>
-      <a:lvl5pPr algn="l" defTabSz="342900" eaLnBrk="1" hangingPunct="1" indent="-342900" latinLnBrk="0" marL="1714500" rtl="0">
+      <a:lvl5pPr marL="1714500" indent="-342900" algn="l" defTabSz="342900" rtl="0" eaLnBrk="1" latinLnBrk="0" hangingPunct="1">
         <a:spcBef>
           <a:spcPct val="20000"/>
         </a:spcBef>
         <a:buFont typeface="Arial"/>
         <a:buChar char="»"/>
-        <a:defRPr kern="1200" sz="1500">
+        <a:defRPr sz="1500" kern="1200">
           <a:solidFill>
             <a:schemeClr val="tx1"/>
           </a:solidFill>
@@ -2940,13 +2940,13 @@
           <a:cs typeface="+mn-cs"/>
         </a:defRPr>
       </a:lvl5pPr>
-      <a:lvl6pPr algn="l" defTabSz="342900" eaLnBrk="1" hangingPunct="1" indent="-342900" latinLnBrk="0" marL="2057400" rtl="0">
+      <a:lvl6pPr marL="2057400" indent="-342900" algn="l" defTabSz="342900" rtl="0" eaLnBrk="1" latinLnBrk="0" hangingPunct="1">
         <a:spcBef>
           <a:spcPct val="20000"/>
         </a:spcBef>
         <a:buFont typeface="Arial"/>
         <a:buChar char="•"/>
-        <a:defRPr kern="1200" sz="1500">
+        <a:defRPr sz="1500" kern="1200">
           <a:solidFill>
             <a:schemeClr val="tx1"/>
           </a:solidFill>
@@ -2955,13 +2955,13 @@
           <a:cs typeface="+mn-cs"/>
         </a:defRPr>
       </a:lvl6pPr>
-      <a:lvl7pPr algn="l" defTabSz="342900" eaLnBrk="1" hangingPunct="1" indent="-342900" latinLnBrk="0" marL="2400300" rtl="0">
+      <a:lvl7pPr marL="2400300" indent="-342900" algn="l" defTabSz="342900" rtl="0" eaLnBrk="1" latinLnBrk="0" hangingPunct="1">
         <a:spcBef>
           <a:spcPct val="20000"/>
         </a:spcBef>
         <a:buFont typeface="Arial"/>
         <a:buChar char="•"/>
-        <a:defRPr kern="1200" sz="1500">
+        <a:defRPr sz="1500" kern="1200">
           <a:solidFill>
             <a:schemeClr val="tx1"/>
           </a:solidFill>
@@ -2970,13 +2970,13 @@
           <a:cs typeface="+mn-cs"/>
         </a:defRPr>
       </a:lvl7pPr>
-      <a:lvl8pPr algn="l" defTabSz="342900" eaLnBrk="1" hangingPunct="1" indent="-342900" latinLnBrk="0" marL="2743200" rtl="0">
+      <a:lvl8pPr marL="2743200" indent="-342900" algn="l" defTabSz="342900" rtl="0" eaLnBrk="1" latinLnBrk="0" hangingPunct="1">
         <a:spcBef>
           <a:spcPct val="20000"/>
         </a:spcBef>
         <a:buFont typeface="Arial"/>
         <a:buChar char="•"/>
-        <a:defRPr kern="1200" sz="1500">
+        <a:defRPr sz="1500" kern="1200">
           <a:solidFill>
             <a:schemeClr val="tx1"/>
           </a:solidFill>
@@ -2985,13 +2985,13 @@
           <a:cs typeface="+mn-cs"/>
         </a:defRPr>
       </a:lvl8pPr>
-      <a:lvl9pPr algn="l" defTabSz="342900" eaLnBrk="1" hangingPunct="1" indent="-342900" latinLnBrk="0" marL="3086100" rtl="0">
+      <a:lvl9pPr marL="3086100" indent="-342900" algn="l" defTabSz="342900" rtl="0" eaLnBrk="1" latinLnBrk="0" hangingPunct="1">
         <a:spcBef>
           <a:spcPct val="20000"/>
         </a:spcBef>
         <a:buFont typeface="Arial"/>
         <a:buChar char="•"/>
-        <a:defRPr kern="1200" sz="1500">
+        <a:defRPr sz="1500" kern="1200">
           <a:solidFill>
             <a:schemeClr val="tx1"/>
           </a:solidFill>
@@ -3005,8 +3005,8 @@
       <a:defPPr>
         <a:defRPr lang="en-US"/>
       </a:defPPr>
-      <a:lvl1pPr algn="l" defTabSz="342900" eaLnBrk="1" hangingPunct="1" latinLnBrk="0" marL="0" rtl="0">
-        <a:defRPr kern="1200" sz="1350">
+      <a:lvl1pPr marL="0" algn="l" defTabSz="342900" rtl="0" eaLnBrk="1" latinLnBrk="0" hangingPunct="1">
+        <a:defRPr sz="1350" kern="1200">
           <a:solidFill>
             <a:schemeClr val="tx1"/>
           </a:solidFill>
@@ -3015,8 +3015,8 @@
           <a:cs typeface="+mn-cs"/>
         </a:defRPr>
       </a:lvl1pPr>
-      <a:lvl2pPr algn="l" defTabSz="342900" eaLnBrk="1" hangingPunct="1" latinLnBrk="0" marL="342900" rtl="0">
-        <a:defRPr kern="1200" sz="1350">
+      <a:lvl2pPr marL="342900" algn="l" defTabSz="342900" rtl="0" eaLnBrk="1" latinLnBrk="0" hangingPunct="1">
+        <a:defRPr sz="1350" kern="1200">
           <a:solidFill>
             <a:schemeClr val="tx1"/>
           </a:solidFill>
@@ -3025,8 +3025,8 @@
           <a:cs typeface="+mn-cs"/>
         </a:defRPr>
       </a:lvl2pPr>
-      <a:lvl3pPr algn="l" defTabSz="342900" eaLnBrk="1" hangingPunct="1" latinLnBrk="0" marL="685800" rtl="0">
-        <a:defRPr kern="1200" sz="1350">
+      <a:lvl3pPr marL="685800" algn="l" defTabSz="342900" rtl="0" eaLnBrk="1" latinLnBrk="0" hangingPunct="1">
+        <a:defRPr sz="1350" kern="1200">
           <a:solidFill>
             <a:schemeClr val="tx1"/>
           </a:solidFill>
@@ -3035,8 +3035,8 @@
           <a:cs typeface="+mn-cs"/>
         </a:defRPr>
       </a:lvl3pPr>
-      <a:lvl4pPr algn="l" defTabSz="342900" eaLnBrk="1" hangingPunct="1" latinLnBrk="0" marL="1028700" rtl="0">
-        <a:defRPr kern="1200" sz="1350">
+      <a:lvl4pPr marL="1028700" algn="l" defTabSz="342900" rtl="0" eaLnBrk="1" latinLnBrk="0" hangingPunct="1">
+        <a:defRPr sz="1350" kern="1200">
           <a:solidFill>
             <a:schemeClr val="tx1"/>
           </a:solidFill>
@@ -3045,8 +3045,8 @@
           <a:cs typeface="+mn-cs"/>
         </a:defRPr>
       </a:lvl4pPr>
-      <a:lvl5pPr algn="l" defTabSz="342900" eaLnBrk="1" hangingPunct="1" latinLnBrk="0" marL="1371600" rtl="0">
-        <a:defRPr kern="1200" sz="1350">
+      <a:lvl5pPr marL="1371600" algn="l" defTabSz="342900" rtl="0" eaLnBrk="1" latinLnBrk="0" hangingPunct="1">
+        <a:defRPr sz="1350" kern="1200">
           <a:solidFill>
             <a:schemeClr val="tx1"/>
           </a:solidFill>
@@ -3055,8 +3055,8 @@
           <a:cs typeface="+mn-cs"/>
         </a:defRPr>
       </a:lvl5pPr>
-      <a:lvl6pPr algn="l" defTabSz="342900" eaLnBrk="1" hangingPunct="1" latinLnBrk="0" marL="1714500" rtl="0">
-        <a:defRPr kern="1200" sz="1350">
+      <a:lvl6pPr marL="1714500" algn="l" defTabSz="342900" rtl="0" eaLnBrk="1" latinLnBrk="0" hangingPunct="1">
+        <a:defRPr sz="1350" kern="1200">
           <a:solidFill>
             <a:schemeClr val="tx1"/>
           </a:solidFill>
@@ -3065,8 +3065,8 @@
           <a:cs typeface="+mn-cs"/>
         </a:defRPr>
       </a:lvl6pPr>
-      <a:lvl7pPr algn="l" defTabSz="342900" eaLnBrk="1" hangingPunct="1" latinLnBrk="0" marL="2057400" rtl="0">
-        <a:defRPr kern="1200" sz="1350">
+      <a:lvl7pPr marL="2057400" algn="l" defTabSz="342900" rtl="0" eaLnBrk="1" latinLnBrk="0" hangingPunct="1">
+        <a:defRPr sz="1350" kern="1200">
           <a:solidFill>
             <a:schemeClr val="tx1"/>
           </a:solidFill>
@@ -3075,8 +3075,8 @@
           <a:cs typeface="+mn-cs"/>
         </a:defRPr>
       </a:lvl7pPr>
-      <a:lvl8pPr algn="l" defTabSz="342900" eaLnBrk="1" hangingPunct="1" latinLnBrk="0" marL="2400300" rtl="0">
-        <a:defRPr kern="1200" sz="1350">
+      <a:lvl8pPr marL="2400300" algn="l" defTabSz="342900" rtl="0" eaLnBrk="1" latinLnBrk="0" hangingPunct="1">
+        <a:defRPr sz="1350" kern="1200">
           <a:solidFill>
             <a:schemeClr val="tx1"/>
           </a:solidFill>
@@ -3085,8 +3085,8 @@
           <a:cs typeface="+mn-cs"/>
         </a:defRPr>
       </a:lvl8pPr>
-      <a:lvl9pPr algn="l" defTabSz="342900" eaLnBrk="1" hangingPunct="1" latinLnBrk="0" marL="2743200" rtl="0">
-        <a:defRPr kern="1200" sz="1350">
+      <a:lvl9pPr marL="2743200" algn="l" defTabSz="342900" rtl="0" eaLnBrk="1" latinLnBrk="0" hangingPunct="1">
+        <a:defRPr sz="1350" kern="1200">
           <a:solidFill>
             <a:schemeClr val="tx1"/>
           </a:solidFill>
@@ -3129,21 +3129,22 @@
         </p:nvSpPr>
         <p:spPr>
           <a:xfrm>
-            <a:off x="685800" y="1597819"/>
-            <a:ext cx="7772400" cy="1102519"/>
+            <a:off x="685800" y="517003"/>
+            <a:ext cx="7772400" cy="1515861"/>
           </a:xfrm>
         </p:spPr>
         <p:txBody>
           <a:bodyPr/>
           <a:lstStyle/>
           <a:p>
-            <a:pPr lvl="0" indent="0" marL="0">
+            <a:pPr marL="0" lvl="0" indent="0">
               <a:buNone/>
             </a:pPr>
             <a:r>
-              <a:rPr/>
+              <a:rPr lang="en-US" dirty="0"/>
               <a:t>Introduction to Nonparametric Bootstrap Methods</a:t>
             </a:r>
+            <a:endParaRPr b="1" dirty="0"/>
           </a:p>
         </p:txBody>
       </p:sp>
@@ -3154,26 +3155,32 @@
             <a:spLocks noGrp="1"/>
           </p:cNvSpPr>
           <p:nvPr>
-            <p:ph idx="1" type="subTitle"/>
+            <p:ph type="subTitle" idx="1"/>
           </p:nvPr>
         </p:nvSpPr>
         <p:spPr>
           <a:xfrm>
-            <a:off x="1371600" y="2914650"/>
-            <a:ext cx="6400800" cy="1314450"/>
+            <a:off x="1371600" y="1878957"/>
+            <a:ext cx="6400800" cy="563301"/>
           </a:xfrm>
         </p:spPr>
         <p:txBody>
-          <a:bodyPr/>
-          <a:lstStyle/>
-          <a:p>
-            <a:pPr lvl="0" indent="0" marL="0">
+          <a:bodyPr>
+            <a:normAutofit fontScale="32500" lnSpcReduction="20000"/>
+          </a:bodyPr>
+          <a:lstStyle/>
+          <a:p>
+            <a:pPr marL="0" lvl="0" indent="0">
               <a:buNone/>
             </a:pPr>
-            <a:br/>
-            <a:br/>
-            <a:r>
-              <a:rPr/>
+            <a:br>
+              <a:rPr dirty="0"/>
+            </a:br>
+            <a:br>
+              <a:rPr dirty="0"/>
+            </a:br>
+            <a:r>
+              <a:rPr sz="5900" b="1" dirty="0"/>
               <a:t>Steve Elston</a:t>
             </a:r>
           </a:p>
@@ -3186,26 +3193,115 @@
             <a:spLocks noGrp="1"/>
           </p:cNvSpPr>
           <p:nvPr>
-            <p:ph idx="10" sz="half" type="dt"/>
-          </p:nvPr>
-        </p:nvSpPr>
-        <p:spPr/>
-        <p:txBody>
-          <a:bodyPr/>
-          <a:lstStyle/>
-          <a:p>
-            <a:pPr lvl="0" indent="0" marL="0">
+            <p:ph type="dt" sz="half" idx="10"/>
+          </p:nvPr>
+        </p:nvSpPr>
+        <p:spPr/>
+        <p:txBody>
+          <a:bodyPr/>
+          <a:lstStyle/>
+          <a:p>
+            <a:pPr marL="0" lvl="0" indent="0">
               <a:buNone/>
             </a:pPr>
             <a:r>
-              <a:rPr/>
-              <a:t>10/09/2023</a:t>
+              <a:t>09/04/2023</a:t>
+            </a:r>
+          </a:p>
+        </p:txBody>
+      </p:sp>
+      <p:pic>
+        <p:nvPicPr>
+          <p:cNvPr id="5" name="Picture 2" descr="Image result for harvard extension school logo">
+            <a:extLst>
+              <a:ext uri="{FF2B5EF4-FFF2-40B4-BE49-F238E27FC236}">
+                <a16:creationId xmlns:a16="http://schemas.microsoft.com/office/drawing/2014/main" id="{4589CD93-89FF-3DF6-420D-DE6D671B6DD7}"/>
+              </a:ext>
+            </a:extLst>
+          </p:cNvPr>
+          <p:cNvPicPr>
+            <a:picLocks noChangeAspect="1" noChangeArrowheads="1"/>
+          </p:cNvPicPr>
+          <p:nvPr/>
+        </p:nvPicPr>
+        <p:blipFill>
+          <a:blip r:embed="rId2">
+            <a:extLst>
+              <a:ext uri="{28A0092B-C50C-407E-A947-70E740481C1C}">
+                <a14:useLocalDpi xmlns:a14="http://schemas.microsoft.com/office/drawing/2010/main" val="0"/>
+              </a:ext>
+            </a:extLst>
+          </a:blip>
+          <a:srcRect/>
+          <a:stretch>
+            <a:fillRect/>
+          </a:stretch>
+        </p:blipFill>
+        <p:spPr bwMode="auto">
+          <a:xfrm>
+            <a:off x="3291067" y="3659436"/>
+            <a:ext cx="2345803" cy="965131"/>
+          </a:xfrm>
+          <a:prstGeom prst="rect">
+            <a:avLst/>
+          </a:prstGeom>
+          <a:noFill/>
+          <a:extLst>
+            <a:ext uri="{909E8E84-426E-40DD-AFC4-6F175D3DCCD1}">
+              <a14:hiddenFill xmlns:a14="http://schemas.microsoft.com/office/drawing/2010/main">
+                <a:solidFill>
+                  <a:srgbClr val="FFFFFF"/>
+                </a:solidFill>
+              </a14:hiddenFill>
+            </a:ext>
+          </a:extLst>
+        </p:spPr>
+      </p:pic>
+      <p:sp>
+        <p:nvSpPr>
+          <p:cNvPr id="6" name="TextBox 5">
+            <a:extLst>
+              <a:ext uri="{FF2B5EF4-FFF2-40B4-BE49-F238E27FC236}">
+                <a16:creationId xmlns:a16="http://schemas.microsoft.com/office/drawing/2014/main" id="{E74191BF-5D24-EFDF-F46A-91EA7CBF856B}"/>
+              </a:ext>
+            </a:extLst>
+          </p:cNvPr>
+          <p:cNvSpPr txBox="1"/>
+          <p:nvPr/>
+        </p:nvSpPr>
+        <p:spPr>
+          <a:xfrm>
+            <a:off x="1805276" y="4705706"/>
+            <a:ext cx="5744633" cy="369332"/>
+          </a:xfrm>
+          <a:prstGeom prst="rect">
+            <a:avLst/>
+          </a:prstGeom>
+          <a:noFill/>
+        </p:spPr>
+        <p:txBody>
+          <a:bodyPr wrap="square" rtlCol="0">
+            <a:spAutoFit/>
+          </a:bodyPr>
+          <a:lstStyle/>
+          <a:p>
+            <a:pPr algn="ctr"/>
+            <a:r>
+              <a:rPr lang="en-US" sz="1100" dirty="0"/>
+              <a:t>Copyright 2018, 2019, 2020, 2021, 2022, 2023 2024, Stephen F Elston. All rights reserved</a:t>
+            </a:r>
+            <a:r>
+              <a:rPr lang="en-US" dirty="0"/>
+              <a:t>.</a:t>
             </a:r>
           </a:p>
         </p:txBody>
       </p:sp>
     </p:spTree>
   </p:cSld>
+  <p:clrMapOvr>
+    <a:masterClrMapping/>
+  </p:clrMapOvr>
 </p:sld>
 </file>
 
@@ -3241,11 +3337,10 @@
           <a:bodyPr/>
           <a:lstStyle/>
           <a:p>
-            <a:pPr lvl="0" indent="0" marL="0">
+            <a:pPr marL="0" lvl="0" indent="0">
               <a:buNone/>
             </a:pPr>
             <a:r>
-              <a:rPr/>
               <a:t>Bootstrap Distribution</a:t>
             </a:r>
           </a:p>
@@ -3266,11 +3361,10 @@
           <a:bodyPr/>
           <a:lstStyle/>
           <a:p>
-            <a:pPr lvl="0" indent="0" marL="0">
+            <a:pPr marL="0" lvl="0" indent="0">
               <a:buNone/>
             </a:pPr>
             <a:r>
-              <a:rPr/>
               <a:t>Rather than repeatedly resample the population, bootstrapping repeatedly resamples an original sample</a:t>
             </a:r>
           </a:p>
@@ -3278,7 +3372,7 @@
       </p:sp>
       <p:pic>
         <p:nvPicPr>
-          <p:cNvPr descr="../images/BootstrapDistribution.png" id="0" name="Picture 1"/>
+          <p:cNvPr id="4" name="Picture 1" descr="../images/BootstrapDistribution.png"/>
           <p:cNvPicPr>
             <a:picLocks noGrp="1" noChangeAspect="1"/>
           </p:cNvPicPr>
@@ -3308,7 +3402,7 @@
       </p:pic>
       <p:sp>
         <p:nvSpPr>
-          <p:cNvPr id="1" name="TextBox 3"/>
+          <p:cNvPr id="5" name="TextBox 3"/>
           <p:cNvSpPr txBox="1"/>
           <p:nvPr/>
         </p:nvSpPr>
@@ -3326,11 +3420,10 @@
           <a:bodyPr/>
           <a:lstStyle/>
           <a:p>
-            <a:pPr lvl="0" indent="0" marL="0" algn="ctr">
+            <a:pPr marL="0" lvl="0" indent="0" algn="ctr">
               <a:buNone/>
             </a:pPr>
             <a:r>
-              <a:rPr/>
               <a:t>Resampling to estiamte the bootstrap distribution of a statistic</a:t>
             </a:r>
           </a:p>
@@ -3338,6 +3431,9 @@
       </p:sp>
     </p:spTree>
   </p:cSld>
+  <p:clrMapOvr>
+    <a:masterClrMapping/>
+  </p:clrMapOvr>
 </p:sld>
 </file>
 
@@ -3373,11 +3469,10 @@
           <a:bodyPr/>
           <a:lstStyle/>
           <a:p>
-            <a:pPr lvl="0" indent="0" marL="0">
+            <a:pPr marL="0" lvl="0" indent="0">
               <a:buNone/>
             </a:pPr>
             <a:r>
-              <a:rPr/>
               <a:t>Overview of the Bootstrap Algorithm</a:t>
             </a:r>
           </a:p>
@@ -3395,23 +3490,23 @@
         </p:nvSpPr>
         <p:spPr/>
         <p:txBody>
-          <a:bodyPr/>
-          <a:lstStyle/>
-          <a:p>
-            <a:pPr lvl="0" indent="0" marL="0">
+          <a:bodyPr>
+            <a:normAutofit fontScale="70000" lnSpcReduction="20000"/>
+          </a:bodyPr>
+          <a:lstStyle/>
+          <a:p>
+            <a:pPr marL="0" lvl="0" indent="0">
               <a:buNone/>
             </a:pPr>
             <a:r>
-              <a:rPr/>
               <a:t>The bootstrap method follows a simple algorithm. Estimates of the point estimate of a statistic are accumulated by these steps:</a:t>
             </a:r>
           </a:p>
           <a:p>
-            <a:pPr lvl="0" indent="-342900" marL="342900">
+            <a:pPr marL="342900" lvl="0" indent="-342900">
               <a:buAutoNum type="arabicPeriod"/>
             </a:pPr>
             <a:r>
-              <a:rPr/>
               <a:t>Randomly </a:t>
             </a:r>
             <a:r>
@@ -3419,7 +3514,6 @@
               <a:t>Bernoulli sample</a:t>
             </a:r>
             <a:r>
-              <a:rPr/>
               <a:t> sample with size n </a:t>
             </a:r>
             <a:r>
@@ -3427,47 +3521,46 @@
               <a:t>with replacement</a:t>
             </a:r>
             <a:r>
-              <a:rPr/>
               <a:t> from an original data sample of n values; Resample is the same size as the original data sample</a:t>
             </a:r>
             <a:br/>
-          </a:p>
-          <a:p>
-            <a:pPr lvl="0" indent="-342900" marL="342900">
+            <a:endParaRPr/>
+          </a:p>
+          <a:p>
+            <a:pPr marL="342900" lvl="0" indent="-342900">
               <a:buAutoNum type="arabicPeriod"/>
             </a:pPr>
             <a:r>
-              <a:rPr/>
               <a:t>Re-compute the statistic with each resample</a:t>
             </a:r>
             <a:br/>
-          </a:p>
-          <a:p>
-            <a:pPr lvl="0" indent="-342900" marL="342900">
+            <a:endParaRPr/>
+          </a:p>
+          <a:p>
+            <a:pPr marL="342900" lvl="0" indent="-342900">
               <a:buAutoNum type="arabicPeriod"/>
             </a:pPr>
             <a:r>
-              <a:rPr/>
               <a:t>Repeat steps 1 and 2 to accumulate the required number of bootstrap samples</a:t>
             </a:r>
             <a:br/>
-          </a:p>
-          <a:p>
-            <a:pPr lvl="0" indent="-342900" marL="342900">
+            <a:endParaRPr/>
+          </a:p>
+          <a:p>
+            <a:pPr marL="342900" lvl="0" indent="-342900">
               <a:buAutoNum type="arabicPeriod"/>
             </a:pPr>
             <a:r>
-              <a:rPr/>
               <a:t>Accumulated bootstrap values form the bootstrap distribution; An estimate of the sample distribution of the statistic</a:t>
             </a:r>
             <a:br/>
-          </a:p>
-          <a:p>
-            <a:pPr lvl="0" indent="-342900" marL="342900">
+            <a:endParaRPr/>
+          </a:p>
+          <a:p>
+            <a:pPr marL="342900" lvl="0" indent="-342900">
               <a:buAutoNum type="arabicPeriod"/>
             </a:pPr>
             <a:r>
-              <a:rPr/>
               <a:t>The mean of the computed statistic values is the bootstrap point estimate of the statistic</a:t>
             </a:r>
           </a:p>
@@ -3475,6 +3568,9 @@
       </p:sp>
     </p:spTree>
   </p:cSld>
+  <p:clrMapOvr>
+    <a:masterClrMapping/>
+  </p:clrMapOvr>
 </p:sld>
 </file>
 
@@ -3510,11 +3606,10 @@
           <a:bodyPr/>
           <a:lstStyle/>
           <a:p>
-            <a:pPr lvl="0" indent="0" marL="0">
+            <a:pPr marL="0" lvl="0" indent="0">
               <a:buNone/>
             </a:pPr>
             <a:r>
-              <a:rPr/>
               <a:t>Overview of the Bootstrap Algorithm</a:t>
             </a:r>
           </a:p>
@@ -3535,39 +3630,34 @@
           <a:bodyPr/>
           <a:lstStyle/>
           <a:p>
-            <a:pPr lvl="0" indent="0" marL="0">
+            <a:pPr marL="0" lvl="0" indent="0">
               <a:buNone/>
             </a:pPr>
             <a:r>
-              <a:rPr/>
               <a:t>Properties of the nonparametric bootstrap</a:t>
             </a:r>
           </a:p>
           <a:p>
             <a:pPr lvl="0"/>
             <a:r>
-              <a:rPr/>
               <a:t>By law of large numbers, bootstrap point estimate converges</a:t>
             </a:r>
           </a:p>
           <a:p>
             <a:pPr lvl="0"/>
             <a:r>
-              <a:rPr/>
               <a:t>Larger number of resamples lower variance of estimate</a:t>
             </a:r>
           </a:p>
           <a:p>
             <a:pPr lvl="0"/>
             <a:r>
-              <a:rPr/>
               <a:t>Efrom and Tibshirani (1993) and Efron and Hasti (2016) recommend using at least 200 bootstrap samples for point estimates</a:t>
             </a:r>
           </a:p>
           <a:p>
             <a:pPr lvl="0"/>
             <a:r>
-              <a:rPr/>
               <a:t>Other authors recommend a larger number (e.g. 1,000-2,000) of resamples given low computer cost</a:t>
             </a:r>
           </a:p>
@@ -3575,6 +3665,9 @@
       </p:sp>
     </p:spTree>
   </p:cSld>
+  <p:clrMapOvr>
+    <a:masterClrMapping/>
+  </p:clrMapOvr>
 </p:sld>
 </file>
 
@@ -3610,11 +3703,10 @@
           <a:bodyPr/>
           <a:lstStyle/>
           <a:p>
-            <a:pPr lvl="0" indent="0" marL="0">
+            <a:pPr marL="0" lvl="0" indent="0">
               <a:buNone/>
             </a:pPr>
             <a:r>
-              <a:rPr/>
               <a:t>Overview of the Bootstrap Algorithm</a:t>
             </a:r>
           </a:p>
@@ -3622,7 +3714,7 @@
       </p:sp>
       <p:pic>
         <p:nvPicPr>
-          <p:cNvPr descr="../images/BootstrapMean.png" id="0" name="Picture 1"/>
+          <p:cNvPr id="3" name="Picture 1" descr="../images/BootstrapMean.png"/>
           <p:cNvPicPr>
             <a:picLocks noGrp="1" noChangeAspect="1"/>
           </p:cNvPicPr>
@@ -3652,7 +3744,7 @@
       </p:pic>
       <p:sp>
         <p:nvSpPr>
-          <p:cNvPr id="1" name="TextBox 3"/>
+          <p:cNvPr id="4" name="TextBox 3"/>
           <p:cNvSpPr txBox="1"/>
           <p:nvPr/>
         </p:nvSpPr>
@@ -3670,11 +3762,10 @@
           <a:bodyPr/>
           <a:lstStyle/>
           <a:p>
-            <a:pPr lvl="0" indent="0" marL="0" algn="ctr">
+            <a:pPr marL="0" lvl="0" indent="0" algn="ctr">
               <a:buNone/>
             </a:pPr>
             <a:r>
-              <a:rPr/>
               <a:t>Outline of bootstrap resampling algorithm to compute mean</a:t>
             </a:r>
           </a:p>
@@ -3682,6 +3773,9 @@
       </p:sp>
     </p:spTree>
   </p:cSld>
+  <p:clrMapOvr>
+    <a:masterClrMapping/>
+  </p:clrMapOvr>
 </p:sld>
 </file>
 
@@ -3717,11 +3811,10 @@
           <a:bodyPr/>
           <a:lstStyle/>
           <a:p>
-            <a:pPr lvl="0" indent="0" marL="0">
+            <a:pPr marL="0" lvl="0" indent="0">
               <a:buNone/>
             </a:pPr>
             <a:r>
-              <a:rPr/>
               <a:t>Example; One Sample Bootstrap</a:t>
             </a:r>
           </a:p>
@@ -3739,14 +3832,15 @@
         </p:nvSpPr>
         <p:spPr/>
         <p:txBody>
-          <a:bodyPr/>
-          <a:lstStyle/>
-          <a:p>
-            <a:pPr lvl="0" indent="0" marL="0">
+          <a:bodyPr>
+            <a:normAutofit fontScale="55000" lnSpcReduction="20000"/>
+          </a:bodyPr>
+          <a:lstStyle/>
+          <a:p>
+            <a:pPr marL="0" lvl="0" indent="0">
               <a:buNone/>
             </a:pPr>
             <a:r>
-              <a:rPr/>
               <a:t>Use sample of standardized scores of highschool students from </a:t>
             </a:r>
             <a:r>
@@ -3782,6 +3876,9 @@
       </p:sp>
     </p:spTree>
   </p:cSld>
+  <p:clrMapOvr>
+    <a:masterClrMapping/>
+  </p:clrMapOvr>
 </p:sld>
 </file>
 
@@ -3822,11 +3919,10 @@
           <a:bodyPr/>
           <a:lstStyle/>
           <a:p>
-            <a:pPr lvl="0" indent="0" marL="0">
+            <a:pPr marL="0" lvl="0" indent="0">
               <a:buNone/>
             </a:pPr>
             <a:r>
-              <a:rPr/>
               <a:t>Example; One Sample Bootstrap</a:t>
             </a:r>
           </a:p>
@@ -3839,19 +3935,18 @@
             <a:spLocks noGrp="1"/>
           </p:cNvSpPr>
           <p:nvPr>
-            <p:ph idx="2" sz="half" type="body"/>
-          </p:nvPr>
-        </p:nvSpPr>
-        <p:spPr/>
-        <p:txBody>
-          <a:bodyPr/>
-          <a:lstStyle/>
-          <a:p>
-            <a:pPr lvl="0" indent="0" marL="0">
+            <p:ph type="body" sz="half" idx="2"/>
+          </p:nvPr>
+        </p:nvSpPr>
+        <p:spPr/>
+        <p:txBody>
+          <a:bodyPr/>
+          <a:lstStyle/>
+          <a:p>
+            <a:pPr marL="0" lvl="0" indent="0">
               <a:buNone/>
             </a:pPr>
             <a:r>
-              <a:rPr/>
               <a:t>Histogram of the math scores</a:t>
             </a:r>
           </a:p>
@@ -3859,7 +3954,7 @@
       </p:sp>
       <p:pic>
         <p:nvPicPr>
-          <p:cNvPr descr="06b_IntroductionToBootstrap_files/figure-pptx/unnamed-chunk-2-1.png" id="0" name="Picture 1"/>
+          <p:cNvPr id="3" name="Picture 1" descr="06b_IntroductionToBootstrap_files/figure-pptx/unnamed-chunk-2-1.png"/>
           <p:cNvPicPr>
             <a:picLocks noGrp="1" noChangeAspect="1"/>
           </p:cNvPicPr>
@@ -3889,6 +3984,9 @@
       </p:pic>
     </p:spTree>
   </p:cSld>
+  <p:clrMapOvr>
+    <a:masterClrMapping/>
+  </p:clrMapOvr>
 </p:sld>
 </file>
 
@@ -3924,11 +4022,10 @@
           <a:bodyPr/>
           <a:lstStyle/>
           <a:p>
-            <a:pPr lvl="0" indent="0" marL="0">
+            <a:pPr marL="0" lvl="0" indent="0">
               <a:buNone/>
             </a:pPr>
             <a:r>
-              <a:rPr/>
               <a:t>Example; One Sample Bootstrap</a:t>
             </a:r>
           </a:p>
@@ -3946,14 +4043,15 @@
         </p:nvSpPr>
         <p:spPr/>
         <p:txBody>
-          <a:bodyPr/>
-          <a:lstStyle/>
-          <a:p>
-            <a:pPr lvl="0" indent="0" marL="0">
+          <a:bodyPr>
+            <a:normAutofit fontScale="55000" lnSpcReduction="20000"/>
+          </a:bodyPr>
+          <a:lstStyle/>
+          <a:p>
+            <a:pPr marL="0" lvl="0" indent="0">
               <a:buNone/>
             </a:pPr>
             <a:r>
-              <a:rPr/>
               <a:t>Function to compute single sample bootstrap estimate of statistic</a:t>
             </a:r>
           </a:p>
@@ -4367,6 +4465,9 @@
       </p:sp>
     </p:spTree>
   </p:cSld>
+  <p:clrMapOvr>
+    <a:masterClrMapping/>
+  </p:clrMapOvr>
 </p:sld>
 </file>
 
@@ -4407,11 +4508,10 @@
           <a:bodyPr/>
           <a:lstStyle/>
           <a:p>
-            <a:pPr lvl="0" indent="0" marL="0">
+            <a:pPr marL="0" lvl="0" indent="0">
               <a:buNone/>
             </a:pPr>
             <a:r>
-              <a:rPr/>
               <a:t>Example; One Sample Bootstrap</a:t>
             </a:r>
           </a:p>
@@ -4424,19 +4524,18 @@
             <a:spLocks noGrp="1"/>
           </p:cNvSpPr>
           <p:nvPr>
-            <p:ph idx="2" sz="half" type="body"/>
-          </p:nvPr>
-        </p:nvSpPr>
-        <p:spPr/>
-        <p:txBody>
-          <a:bodyPr/>
-          <a:lstStyle/>
-          <a:p>
-            <a:pPr lvl="0" indent="0" marL="0">
+            <p:ph type="body" sz="half" idx="2"/>
+          </p:nvPr>
+        </p:nvSpPr>
+        <p:spPr/>
+        <p:txBody>
+          <a:bodyPr/>
+          <a:lstStyle/>
+          <a:p>
+            <a:pPr marL="0" lvl="0" indent="0">
               <a:buNone/>
             </a:pPr>
             <a:r>
-              <a:rPr/>
               <a:t>Distribution of 200 bootstrap samples of mean estimates</a:t>
             </a:r>
           </a:p>
@@ -4455,7 +4554,7 @@
       </p:sp>
       <p:pic>
         <p:nvPicPr>
-          <p:cNvPr descr="06b_IntroductionToBootstrap_files/figure-pptx/unnamed-chunk-4-3.png" id="0" name="Picture 1"/>
+          <p:cNvPr id="3" name="Picture 1" descr="06b_IntroductionToBootstrap_files/figure-pptx/unnamed-chunk-4-3.png"/>
           <p:cNvPicPr>
             <a:picLocks noGrp="1" noChangeAspect="1"/>
           </p:cNvPicPr>
@@ -4485,6 +4584,9 @@
       </p:pic>
     </p:spTree>
   </p:cSld>
+  <p:clrMapOvr>
+    <a:masterClrMapping/>
+  </p:clrMapOvr>
 </p:sld>
 </file>
 
@@ -4520,11 +4622,10 @@
           <a:bodyPr/>
           <a:lstStyle/>
           <a:p>
-            <a:pPr lvl="0" indent="0" marL="0">
+            <a:pPr marL="0" lvl="0" indent="0">
               <a:buNone/>
             </a:pPr>
             <a:r>
-              <a:rPr/>
               <a:t>Bootstrap Confidence Intervals</a:t>
             </a:r>
           </a:p>
@@ -4544,220 +4645,274 @@
             </p:nvSpPr>
             <p:spPr/>
             <p:txBody>
-              <a:bodyPr/>
+              <a:bodyPr>
+                <a:normAutofit fontScale="62500" lnSpcReduction="20000"/>
+              </a:bodyPr>
               <a:lstStyle/>
               <a:p>
-                <a:pPr lvl="0" indent="0" marL="0">
+                <a:pPr marL="0" lvl="0" indent="0">
                   <a:buNone/>
                 </a:pPr>
                 <a:r>
-                  <a:rPr/>
                   <a:t>Distribution of 2000 bootstrap bootstrap confidence intervals?</a:t>
                 </a:r>
               </a:p>
               <a:p>
                 <a:pPr lvl="0"/>
                 <a:r>
-                  <a:rPr/>
                   <a:t>Two sided CI percentile method:</a:t>
                 </a:r>
               </a:p>
               <a:p>
-                <a:pPr lvl="1" indent="-342900" marL="685800">
+                <a:pPr marL="685800" lvl="1" indent="-342900">
                   <a:buAutoNum type="arabicPeriod"/>
                 </a:pPr>
                 <a:r>
-                  <a:rPr/>
                   <a:t>Define confidence level, eg. 95% or </a:t>
                 </a:r>
                 <a14:m>
                   <m:oMath xmlns:m="http://schemas.openxmlformats.org/officeDocument/2006/math">
                     <m:r>
-                      <m:t>α</m:t>
+                      <a:rPr>
+                        <a:latin typeface="Cambria Math" panose="02040503050406030204" pitchFamily="18" charset="0"/>
+                      </a:rPr>
+                      <m:t>𝛼</m:t>
                     </m:r>
                     <m:r>
-                      <m:rPr>
-                        <m:sty m:val="p"/>
-                      </m:rPr>
-                      <m:t>=</m:t>
-                    </m:r>
-                    <m:r>
-                      <m:t>0.05</m:t>
+                      <a:rPr>
+                        <a:latin typeface="Cambria Math" panose="02040503050406030204" pitchFamily="18" charset="0"/>
+                      </a:rPr>
+                      <m:t>=0.05</m:t>
                     </m:r>
                   </m:oMath>
                 </a14:m>
                 <a:br/>
+                <a:endParaRPr/>
               </a:p>
               <a:p>
-                <a:pPr lvl="1" indent="-342900" marL="685800">
+                <a:pPr marL="685800" lvl="1" indent="-342900">
                   <a:buAutoNum type="arabicPeriod"/>
                 </a:pPr>
                 <a:r>
-                  <a:rPr/>
                   <a:t>Order b bootstrap samples, </a:t>
                 </a:r>
                 <a14:m>
                   <m:oMath xmlns:m="http://schemas.openxmlformats.org/officeDocument/2006/math">
                     <m:sSub>
+                      <m:sSubPr>
+                        <m:ctrlPr>
+                          <a:rPr>
+                            <a:latin typeface="Cambria Math" panose="02040503050406030204" pitchFamily="18" charset="0"/>
+                          </a:rPr>
+                        </m:ctrlPr>
+                      </m:sSubPr>
                       <m:e>
                         <m:r>
-                          <m:t>s</m:t>
+                          <a:rPr>
+                            <a:latin typeface="Cambria Math" panose="02040503050406030204" pitchFamily="18" charset="0"/>
+                          </a:rPr>
+                          <m:t>𝑠</m:t>
                         </m:r>
                       </m:e>
                       <m:sub>
                         <m:r>
-                          <m:t>i</m:t>
+                          <a:rPr>
+                            <a:latin typeface="Cambria Math" panose="02040503050406030204" pitchFamily="18" charset="0"/>
+                          </a:rPr>
+                          <m:t>𝑖</m:t>
                         </m:r>
                       </m:sub>
                     </m:sSub>
                   </m:oMath>
                 </a14:m>
                 <a:r>
-                  <a:rPr/>
                   <a:t>, by value</a:t>
                 </a:r>
                 <a:br/>
+                <a:endParaRPr/>
               </a:p>
               <a:p>
-                <a:pPr lvl="1" indent="-342900" marL="685800">
+                <a:pPr marL="685800" lvl="1" indent="-342900">
                   <a:buAutoNum type="arabicPeriod"/>
                 </a:pPr>
                 <a:r>
-                  <a:rPr/>
                   <a:t>Lower CI index; </a:t>
                 </a:r>
                 <a14:m>
                   <m:oMath xmlns:m="http://schemas.openxmlformats.org/officeDocument/2006/math">
                     <m:r>
-                      <m:t>i</m:t>
+                      <a:rPr>
+                        <a:latin typeface="Cambria Math" panose="02040503050406030204" pitchFamily="18" charset="0"/>
+                      </a:rPr>
+                      <m:t>𝑖</m:t>
                     </m:r>
                     <m:r>
-                      <m:rPr>
-                        <m:sty m:val="p"/>
-                      </m:rPr>
+                      <a:rPr>
+                        <a:latin typeface="Cambria Math" panose="02040503050406030204" pitchFamily="18" charset="0"/>
+                      </a:rPr>
                       <m:t>=</m:t>
                     </m:r>
                     <m:r>
-                      <m:t>b</m:t>
+                      <a:rPr>
+                        <a:latin typeface="Cambria Math" panose="02040503050406030204" pitchFamily="18" charset="0"/>
+                      </a:rPr>
+                      <m:t>𝑏</m:t>
                     </m:r>
                     <m:r>
-                      <m:rPr>
-                        <m:sty m:val="p"/>
-                      </m:rPr>
+                      <a:rPr>
+                        <a:latin typeface="Cambria Math" panose="02040503050406030204" pitchFamily="18" charset="0"/>
+                      </a:rPr>
                       <m:t>∗</m:t>
                     </m:r>
                     <m:r>
-                      <m:t>α</m:t>
+                      <a:rPr>
+                        <a:latin typeface="Cambria Math" panose="02040503050406030204" pitchFamily="18" charset="0"/>
+                      </a:rPr>
+                      <m:t>𝛼</m:t>
                     </m:r>
                     <m:r>
-                      <m:rPr>
-                        <m:sty m:val="p"/>
-                      </m:rPr>
-                      <m:t>/</m:t>
-                    </m:r>
-                    <m:r>
-                      <m:t>2</m:t>
+                      <a:rPr>
+                        <a:latin typeface="Cambria Math" panose="02040503050406030204" pitchFamily="18" charset="0"/>
+                      </a:rPr>
+                      <m:t>/2</m:t>
                     </m:r>
                   </m:oMath>
                 </a14:m>
                 <a:br/>
+                <a:endParaRPr/>
               </a:p>
               <a:p>
-                <a:pPr lvl="1" indent="-342900" marL="685800">
+                <a:pPr marL="685800" lvl="1" indent="-342900">
                   <a:buAutoNum type="arabicPeriod"/>
                 </a:pPr>
                 <a:r>
-                  <a:rPr/>
                   <a:t>Upper CI index; </a:t>
                 </a:r>
                 <a14:m>
                   <m:oMath xmlns:m="http://schemas.openxmlformats.org/officeDocument/2006/math">
                     <m:r>
-                      <m:t>i</m:t>
+                      <a:rPr>
+                        <a:latin typeface="Cambria Math" panose="02040503050406030204" pitchFamily="18" charset="0"/>
+                      </a:rPr>
+                      <m:t>𝑖</m:t>
                     </m:r>
                     <m:r>
-                      <m:rPr>
-                        <m:sty m:val="p"/>
-                      </m:rPr>
+                      <a:rPr>
+                        <a:latin typeface="Cambria Math" panose="02040503050406030204" pitchFamily="18" charset="0"/>
+                      </a:rPr>
                       <m:t>=</m:t>
                     </m:r>
                     <m:r>
-                      <m:t>b</m:t>
+                      <a:rPr>
+                        <a:latin typeface="Cambria Math" panose="02040503050406030204" pitchFamily="18" charset="0"/>
+                      </a:rPr>
+                      <m:t>𝑏</m:t>
                     </m:r>
                     <m:r>
-                      <m:rPr>
-                        <m:sty m:val="p"/>
-                      </m:rPr>
+                      <a:rPr>
+                        <a:latin typeface="Cambria Math" panose="02040503050406030204" pitchFamily="18" charset="0"/>
+                      </a:rPr>
                       <m:t>∗</m:t>
                     </m:r>
                     <m:d>
                       <m:dPr>
-                        <m:begChr m:val="("/>
-                        <m:endChr m:val=")"/>
-                        <m:sepChr m:val=""/>
-                        <m:grow/>
+                        <m:ctrlPr>
+                          <a:rPr i="1">
+                            <a:latin typeface="Cambria Math" panose="02040503050406030204" pitchFamily="18" charset="0"/>
+                          </a:rPr>
+                        </m:ctrlPr>
                       </m:dPr>
                       <m:e>
                         <m:r>
-                          <m:t>1</m:t>
+                          <a:rPr>
+                            <a:latin typeface="Cambria Math" panose="02040503050406030204" pitchFamily="18" charset="0"/>
+                          </a:rPr>
+                          <m:t>1−</m:t>
                         </m:r>
                         <m:r>
-                          <m:rPr>
-                            <m:sty m:val="p"/>
-                          </m:rPr>
-                          <m:t>−</m:t>
+                          <a:rPr>
+                            <a:latin typeface="Cambria Math" panose="02040503050406030204" pitchFamily="18" charset="0"/>
+                          </a:rPr>
+                          <m:t>𝛼</m:t>
                         </m:r>
                         <m:r>
-                          <m:t>α</m:t>
-                        </m:r>
-                        <m:r>
-                          <m:rPr>
-                            <m:sty m:val="p"/>
-                          </m:rPr>
-                          <m:t>/</m:t>
-                        </m:r>
-                        <m:r>
-                          <m:t>2</m:t>
+                          <a:rPr>
+                            <a:latin typeface="Cambria Math" panose="02040503050406030204" pitchFamily="18" charset="0"/>
+                          </a:rPr>
+                          <m:t>/2</m:t>
                         </m:r>
                       </m:e>
                     </m:d>
                   </m:oMath>
                 </a14:m>
+                <a:endParaRPr/>
               </a:p>
               <a:p>
                 <a:pPr lvl="0"/>
                 <a:r>
-                  <a:rPr/>
                   <a:t>Percentile method is know to be biased</a:t>
                 </a:r>
               </a:p>
               <a:p>
                 <a:pPr lvl="1"/>
                 <a:r>
-                  <a:rPr/>
                   <a:t>Bias correction methods available</a:t>
                 </a:r>
               </a:p>
               <a:p>
                 <a:pPr lvl="0"/>
                 <a:r>
-                  <a:rPr/>
                   <a:t>Efrom and Tibshirani (1993) and Efron and Hasti (2016) recommend using at least 2,000 bootstrap samples to estimate confidence intervals</a:t>
                 </a:r>
               </a:p>
               <a:p>
                 <a:pPr lvl="0"/>
                 <a:r>
-                  <a:rPr/>
                   <a:t>Other authors recommend a larger number (e.g. 5,000-20,000) of resamples given low computer cost</a:t>
                 </a:r>
               </a:p>
             </p:txBody>
           </p:sp>
         </mc:Choice>
+        <mc:Fallback>
+          <p:sp>
+            <p:nvSpPr>
+              <p:cNvPr id="3" name="Content Placeholder 2"/>
+              <p:cNvSpPr>
+                <a:spLocks noGrp="1" noRot="1" noChangeAspect="1" noMove="1" noResize="1" noEditPoints="1" noAdjustHandles="1" noChangeArrowheads="1" noChangeShapeType="1" noTextEdit="1"/>
+              </p:cNvSpPr>
+              <p:nvPr>
+                <p:ph idx="1"/>
+              </p:nvPr>
+            </p:nvSpPr>
+            <p:spPr>
+              <a:blipFill>
+                <a:blip r:embed="rId2"/>
+                <a:stretch>
+                  <a:fillRect l="-296" t="-1436"/>
+                </a:stretch>
+              </a:blipFill>
+            </p:spPr>
+            <p:txBody>
+              <a:bodyPr/>
+              <a:lstStyle/>
+              <a:p>
+                <a:r>
+                  <a:rPr lang="en-US">
+                    <a:noFill/>
+                  </a:rPr>
+                  <a:t> </a:t>
+                </a:r>
+              </a:p>
+            </p:txBody>
+          </p:sp>
+        </mc:Fallback>
       </mc:AlternateContent>
     </p:spTree>
   </p:cSld>
+  <p:clrMapOvr>
+    <a:masterClrMapping/>
+  </p:clrMapOvr>
 </p:sld>
 </file>
 
@@ -4793,11 +4948,10 @@
           <a:bodyPr/>
           <a:lstStyle/>
           <a:p>
-            <a:pPr lvl="0" indent="0" marL="0">
+            <a:pPr marL="0" lvl="0" indent="0">
               <a:buNone/>
             </a:pPr>
             <a:r>
-              <a:rPr/>
               <a:t>Bootstrap Confidence Intervals</a:t>
             </a:r>
           </a:p>
@@ -4818,32 +4972,28 @@
           <a:bodyPr/>
           <a:lstStyle/>
           <a:p>
-            <a:pPr lvl="0" indent="0" marL="0">
+            <a:pPr marL="0" lvl="0" indent="0">
               <a:buNone/>
             </a:pPr>
             <a:r>
-              <a:rPr/>
               <a:t>Bootstrap confidence intervals are known to be biased!</a:t>
             </a:r>
           </a:p>
           <a:p>
             <a:pPr lvl="0"/>
             <a:r>
-              <a:rPr/>
               <a:t>Often bootstrap CIs are overly optimistic</a:t>
             </a:r>
           </a:p>
           <a:p>
             <a:pPr lvl="0"/>
             <a:r>
-              <a:rPr/>
               <a:t>Bias can be significant for asymmetric distributions</a:t>
             </a:r>
           </a:p>
           <a:p>
             <a:pPr lvl="0"/>
             <a:r>
-              <a:rPr/>
               <a:t>In practice, bias corrections are applied</a:t>
             </a:r>
           </a:p>
@@ -4851,6 +5001,9 @@
       </p:sp>
     </p:spTree>
   </p:cSld>
+  <p:clrMapOvr>
+    <a:masterClrMapping/>
+  </p:clrMapOvr>
 </p:sld>
 </file>
 
@@ -4886,11 +5039,10 @@
           <a:bodyPr/>
           <a:lstStyle/>
           <a:p>
-            <a:pPr lvl="0" indent="0" marL="0">
+            <a:pPr marL="0" lvl="0" indent="0">
               <a:buNone/>
             </a:pPr>
             <a:r>
-              <a:rPr/>
               <a:t>Introduction</a:t>
             </a:r>
           </a:p>
@@ -4908,10 +5060,12 @@
         </p:nvSpPr>
         <p:spPr/>
         <p:txBody>
-          <a:bodyPr/>
-          <a:lstStyle/>
-          <a:p>
-            <a:pPr lvl="0" indent="0" marL="0">
+          <a:bodyPr>
+            <a:normAutofit fontScale="85000" lnSpcReduction="10000"/>
+          </a:bodyPr>
+          <a:lstStyle/>
+          <a:p>
+            <a:pPr marL="0" lvl="0" indent="0">
               <a:buNone/>
             </a:pPr>
             <a:r>
@@ -4925,39 +5079,34 @@
             </a:r>
           </a:p>
           <a:p>
-            <a:pPr lvl="0" indent="0" marL="0">
+            <a:pPr marL="0" lvl="0" indent="0">
               <a:buNone/>
             </a:pPr>
             <a:r>
-              <a:rPr/>
               <a:t>Bootstrap and re-sampling methods are widely applicable statistical methods</a:t>
             </a:r>
           </a:p>
           <a:p>
             <a:pPr lvl="0"/>
             <a:r>
-              <a:rPr/>
               <a:t>Resampling methods are products of the computer age</a:t>
             </a:r>
           </a:p>
           <a:p>
             <a:pPr lvl="0"/>
             <a:r>
-              <a:rPr/>
               <a:t>Use computational resources unimaginable in the early 20th Century</a:t>
             </a:r>
           </a:p>
           <a:p>
             <a:pPr lvl="0"/>
             <a:r>
-              <a:rPr/>
               <a:t>Repeatedly re-sampling the data with nonparametric model relaxes some assumptions of classical statistical methods</a:t>
             </a:r>
           </a:p>
           <a:p>
             <a:pPr lvl="0"/>
             <a:r>
-              <a:rPr/>
               <a:t>Re-sampling methods draw heavily on the law of large number and the central limit theorem</a:t>
             </a:r>
           </a:p>
@@ -4965,6 +5114,9 @@
       </p:sp>
     </p:spTree>
   </p:cSld>
+  <p:clrMapOvr>
+    <a:masterClrMapping/>
+  </p:clrMapOvr>
 </p:sld>
 </file>
 
@@ -5005,11 +5157,10 @@
           <a:bodyPr/>
           <a:lstStyle/>
           <a:p>
-            <a:pPr lvl="0" indent="0" marL="0">
+            <a:pPr marL="0" lvl="0" indent="0">
               <a:buNone/>
             </a:pPr>
             <a:r>
-              <a:rPr/>
               <a:t>Example; One Sample Bootstrap</a:t>
             </a:r>
           </a:p>
@@ -5022,19 +5173,18 @@
             <a:spLocks noGrp="1"/>
           </p:cNvSpPr>
           <p:nvPr>
-            <p:ph idx="2" sz="half" type="body"/>
-          </p:nvPr>
-        </p:nvSpPr>
-        <p:spPr/>
-        <p:txBody>
-          <a:bodyPr/>
-          <a:lstStyle/>
-          <a:p>
-            <a:pPr lvl="0" indent="0" marL="0">
+            <p:ph type="body" sz="half" idx="2"/>
+          </p:nvPr>
+        </p:nvSpPr>
+        <p:spPr/>
+        <p:txBody>
+          <a:bodyPr/>
+          <a:lstStyle/>
+          <a:p>
+            <a:pPr marL="0" lvl="0" indent="0">
               <a:buNone/>
             </a:pPr>
             <a:r>
-              <a:rPr/>
               <a:t>Bootstrap distribution of 2000 of mean estimates with confidence intervals</a:t>
             </a:r>
           </a:p>
@@ -5064,7 +5214,7 @@
       </p:sp>
       <p:pic>
         <p:nvPicPr>
-          <p:cNvPr descr="06b_IntroductionToBootstrap_files/figure-pptx/unnamed-chunk-5-5.png" id="0" name="Picture 1"/>
+          <p:cNvPr id="3" name="Picture 1" descr="06b_IntroductionToBootstrap_files/figure-pptx/unnamed-chunk-5-5.png"/>
           <p:cNvPicPr>
             <a:picLocks noGrp="1" noChangeAspect="1"/>
           </p:cNvPicPr>
@@ -5094,6 +5244,9 @@
       </p:pic>
     </p:spTree>
   </p:cSld>
+  <p:clrMapOvr>
+    <a:masterClrMapping/>
+  </p:clrMapOvr>
 </p:sld>
 </file>
 
@@ -5129,11 +5282,10 @@
           <a:bodyPr/>
           <a:lstStyle/>
           <a:p>
-            <a:pPr lvl="0" indent="0" marL="0">
+            <a:pPr marL="0" lvl="0" indent="0">
               <a:buNone/>
             </a:pPr>
             <a:r>
-              <a:rPr/>
               <a:t>Two Sample Bootstrap</a:t>
             </a:r>
           </a:p>
@@ -5151,35 +5303,33 @@
         </p:nvSpPr>
         <p:spPr/>
         <p:txBody>
-          <a:bodyPr/>
-          <a:lstStyle/>
-          <a:p>
-            <a:pPr lvl="0" indent="0" marL="0">
+          <a:bodyPr>
+            <a:normAutofit fontScale="85000" lnSpcReduction="10000"/>
+          </a:bodyPr>
+          <a:lstStyle/>
+          <a:p>
+            <a:pPr marL="0" lvl="0" indent="0">
               <a:buNone/>
             </a:pPr>
             <a:r>
-              <a:rPr/>
               <a:t>How can we apply the bootstrap algorithm for two-sample statistics?</a:t>
             </a:r>
           </a:p>
           <a:p>
             <a:pPr lvl="0"/>
             <a:r>
-              <a:rPr/>
               <a:t>Example, difference of means of two independently sampled populations</a:t>
             </a:r>
           </a:p>
           <a:p>
             <a:pPr lvl="0"/>
             <a:r>
-              <a:rPr/>
               <a:t>How to generate bootstrap samples?</a:t>
             </a:r>
           </a:p>
           <a:p>
             <a:pPr lvl="0"/>
             <a:r>
-              <a:rPr/>
               <a:t>Can we just sample the concatenation of the two samples?</a:t>
             </a:r>
           </a:p>
@@ -5193,22 +5343,20 @@
           <a:p>
             <a:pPr lvl="1"/>
             <a:r>
-              <a:rPr/>
               <a:t>There is no guarantee of a correct number of resamples for each group</a:t>
             </a:r>
             <a:br/>
+            <a:endParaRPr/>
           </a:p>
           <a:p>
             <a:pPr lvl="1"/>
             <a:r>
-              <a:rPr/>
               <a:t>Imbalanced sampling leads to bias</a:t>
             </a:r>
           </a:p>
           <a:p>
             <a:pPr lvl="0"/>
             <a:r>
-              <a:rPr/>
               <a:t>Must </a:t>
             </a:r>
             <a:r>
@@ -5216,14 +5364,12 @@
               <a:t>independently sample the two groups</a:t>
             </a:r>
             <a:r>
-              <a:rPr/>
               <a:t> or populations</a:t>
             </a:r>
           </a:p>
           <a:p>
             <a:pPr lvl="0"/>
             <a:r>
-              <a:rPr/>
               <a:t>Compute the statistic from the two samples</a:t>
             </a:r>
           </a:p>
@@ -5231,6 +5377,9 @@
       </p:sp>
     </p:spTree>
   </p:cSld>
+  <p:clrMapOvr>
+    <a:masterClrMapping/>
+  </p:clrMapOvr>
 </p:sld>
 </file>
 
@@ -5266,11 +5415,10 @@
           <a:bodyPr/>
           <a:lstStyle/>
           <a:p>
-            <a:pPr lvl="0" indent="0" marL="0">
+            <a:pPr marL="0" lvl="0" indent="0">
               <a:buNone/>
             </a:pPr>
             <a:r>
-              <a:rPr/>
               <a:t>Two Sample Bootstrap</a:t>
             </a:r>
           </a:p>
@@ -5288,23 +5436,23 @@
         </p:nvSpPr>
         <p:spPr/>
         <p:txBody>
-          <a:bodyPr/>
-          <a:lstStyle/>
-          <a:p>
-            <a:pPr lvl="0" indent="0" marL="0">
+          <a:bodyPr>
+            <a:normAutofit fontScale="62500" lnSpcReduction="20000"/>
+          </a:bodyPr>
+          <a:lstStyle/>
+          <a:p>
+            <a:pPr marL="0" lvl="0" indent="0">
               <a:buNone/>
             </a:pPr>
             <a:r>
-              <a:rPr/>
               <a:t>Example: algorithm to compute difference of means:</a:t>
             </a:r>
           </a:p>
           <a:p>
-            <a:pPr lvl="0" indent="-342900" marL="342900">
+            <a:pPr marL="342900" lvl="0" indent="-342900">
               <a:buAutoNum type="arabicPeriod"/>
             </a:pPr>
             <a:r>
-              <a:rPr/>
               <a:t>Independently randomly </a:t>
             </a:r>
             <a:r>
@@ -5312,7 +5460,6 @@
               <a:t>Bernoulli sample</a:t>
             </a:r>
             <a:r>
-              <a:rPr/>
               <a:t> n data </a:t>
             </a:r>
             <a:r>
@@ -5320,47 +5467,46 @@
               <a:t>with replacement</a:t>
             </a:r>
             <a:r>
-              <a:rPr/>
               <a:t> from each original data sample; The number of resamples for each populations is the number of samples for that population</a:t>
             </a:r>
             <a:br/>
-          </a:p>
-          <a:p>
-            <a:pPr lvl="0" indent="-342900" marL="342900">
+            <a:endParaRPr/>
+          </a:p>
+          <a:p>
+            <a:pPr marL="342900" lvl="0" indent="-342900">
               <a:buAutoNum type="arabicPeriod"/>
             </a:pPr>
             <a:r>
-              <a:rPr/>
               <a:t>Compute the two-sample statistic; e.g. difference of means</a:t>
             </a:r>
             <a:br/>
-          </a:p>
-          <a:p>
-            <a:pPr lvl="0" indent="-342900" marL="342900">
+            <a:endParaRPr/>
+          </a:p>
+          <a:p>
+            <a:pPr marL="342900" lvl="0" indent="-342900">
               <a:buAutoNum type="arabicPeriod"/>
             </a:pPr>
             <a:r>
-              <a:rPr/>
               <a:t>Repeat steps 1 and 2 to accumulate the required number of bootstrap samples Accumulated bootstrap values comprise the bootstrap distribution; an estimate of the sample distribution of the statistic</a:t>
             </a:r>
             <a:br/>
-          </a:p>
-          <a:p>
-            <a:pPr lvl="0" indent="-342900" marL="342900">
+            <a:endParaRPr/>
+          </a:p>
+          <a:p>
+            <a:pPr marL="342900" lvl="0" indent="-342900">
               <a:buAutoNum type="arabicPeriod"/>
             </a:pPr>
             <a:r>
-              <a:rPr/>
               <a:t>The mean of the computed statistic values is the bootstrap point estimate of the statistic; e.g. difference of means</a:t>
             </a:r>
             <a:br/>
-          </a:p>
-          <a:p>
-            <a:pPr lvl="0" indent="-342900" marL="342900">
+            <a:endParaRPr/>
+          </a:p>
+          <a:p>
+            <a:pPr marL="342900" lvl="0" indent="-342900">
               <a:buAutoNum type="arabicPeriod"/>
             </a:pPr>
             <a:r>
-              <a:rPr/>
               <a:t>Compute CIs from bootstrap distribution</a:t>
             </a:r>
           </a:p>
@@ -5368,6 +5514,9 @@
       </p:sp>
     </p:spTree>
   </p:cSld>
+  <p:clrMapOvr>
+    <a:masterClrMapping/>
+  </p:clrMapOvr>
 </p:sld>
 </file>
 
@@ -5408,11 +5557,10 @@
           <a:bodyPr/>
           <a:lstStyle/>
           <a:p>
-            <a:pPr lvl="0" indent="0" marL="0">
+            <a:pPr marL="0" lvl="0" indent="0">
               <a:buNone/>
             </a:pPr>
             <a:r>
-              <a:rPr/>
               <a:t>Two Sample Bootstrap</a:t>
             </a:r>
           </a:p>
@@ -5425,19 +5573,18 @@
             <a:spLocks noGrp="1"/>
           </p:cNvSpPr>
           <p:nvPr>
-            <p:ph idx="2" sz="half" type="body"/>
-          </p:nvPr>
-        </p:nvSpPr>
-        <p:spPr/>
-        <p:txBody>
-          <a:bodyPr/>
-          <a:lstStyle/>
-          <a:p>
-            <a:pPr lvl="0" indent="0" marL="0">
+            <p:ph type="body" sz="half" idx="2"/>
+          </p:nvPr>
+        </p:nvSpPr>
+        <p:spPr/>
+        <p:txBody>
+          <a:bodyPr/>
+          <a:lstStyle/>
+          <a:p>
+            <a:pPr marL="0" lvl="0" indent="0">
               <a:buNone/>
             </a:pPr>
             <a:r>
-              <a:rPr/>
               <a:t>Example; find the bootstrap distribution of the difference in math scores between low and middle SES students.</a:t>
             </a:r>
           </a:p>
@@ -5445,7 +5592,7 @@
       </p:sp>
       <p:pic>
         <p:nvPicPr>
-          <p:cNvPr descr="06b_IntroductionToBootstrap_files/figure-pptx/unnamed-chunk-6-7.png" id="0" name="Picture 1"/>
+          <p:cNvPr id="3" name="Picture 1" descr="06b_IntroductionToBootstrap_files/figure-pptx/unnamed-chunk-6-7.png"/>
           <p:cNvPicPr>
             <a:picLocks noGrp="1" noChangeAspect="1"/>
           </p:cNvPicPr>
@@ -5475,6 +5622,9 @@
       </p:pic>
     </p:spTree>
   </p:cSld>
+  <p:clrMapOvr>
+    <a:masterClrMapping/>
+  </p:clrMapOvr>
 </p:sld>
 </file>
 
@@ -5510,11 +5660,10 @@
           <a:bodyPr/>
           <a:lstStyle/>
           <a:p>
-            <a:pPr lvl="0" indent="0" marL="0">
+            <a:pPr marL="0" lvl="0" indent="0">
               <a:buNone/>
             </a:pPr>
             <a:r>
-              <a:rPr/>
               <a:t>Example, Two Sample Bootstrap</a:t>
             </a:r>
           </a:p>
@@ -5532,7 +5681,9 @@
         </p:nvSpPr>
         <p:spPr/>
         <p:txBody>
-          <a:bodyPr/>
+          <a:bodyPr>
+            <a:normAutofit fontScale="40000" lnSpcReduction="20000"/>
+          </a:bodyPr>
           <a:lstStyle/>
           <a:p>
             <a:pPr lvl="0" indent="0">
@@ -6275,6 +6426,9 @@
       </p:sp>
     </p:spTree>
   </p:cSld>
+  <p:clrMapOvr>
+    <a:masterClrMapping/>
+  </p:clrMapOvr>
 </p:sld>
 </file>
 
@@ -6315,11 +6469,10 @@
           <a:bodyPr/>
           <a:lstStyle/>
           <a:p>
-            <a:pPr lvl="0" indent="0" marL="0">
+            <a:pPr marL="0" lvl="0" indent="0">
               <a:buNone/>
             </a:pPr>
             <a:r>
-              <a:rPr/>
               <a:t>Example, Two Sample Bootstrap</a:t>
             </a:r>
           </a:p>
@@ -6332,19 +6485,18 @@
             <a:spLocks noGrp="1"/>
           </p:cNvSpPr>
           <p:nvPr>
-            <p:ph idx="2" sz="half" type="body"/>
-          </p:nvPr>
-        </p:nvSpPr>
-        <p:spPr/>
-        <p:txBody>
-          <a:bodyPr/>
-          <a:lstStyle/>
-          <a:p>
-            <a:pPr lvl="0" indent="0" marL="0">
+            <p:ph type="body" sz="half" idx="2"/>
+          </p:nvPr>
+        </p:nvSpPr>
+        <p:spPr/>
+        <p:txBody>
+          <a:bodyPr/>
+          <a:lstStyle/>
+          <a:p>
+            <a:pPr marL="0" lvl="0" indent="0">
               <a:buNone/>
             </a:pPr>
             <a:r>
-              <a:rPr/>
               <a:t>Compute and display the bootstrap distribution of the difference of student scores</a:t>
             </a:r>
           </a:p>
@@ -6374,7 +6526,7 @@
       </p:sp>
       <p:pic>
         <p:nvPicPr>
-          <p:cNvPr descr="06b_IntroductionToBootstrap_files/figure-pptx/unnamed-chunk-8-9.png" id="0" name="Picture 1"/>
+          <p:cNvPr id="3" name="Picture 1" descr="06b_IntroductionToBootstrap_files/figure-pptx/unnamed-chunk-8-9.png"/>
           <p:cNvPicPr>
             <a:picLocks noGrp="1" noChangeAspect="1"/>
           </p:cNvPicPr>
@@ -6404,6 +6556,9 @@
       </p:pic>
     </p:spTree>
   </p:cSld>
+  <p:clrMapOvr>
+    <a:masterClrMapping/>
+  </p:clrMapOvr>
 </p:sld>
 </file>
 
@@ -6439,11 +6594,10 @@
           <a:bodyPr/>
           <a:lstStyle/>
           <a:p>
-            <a:pPr lvl="0" indent="0" marL="0">
+            <a:pPr marL="0" lvl="0" indent="0">
               <a:buNone/>
             </a:pPr>
             <a:r>
-              <a:rPr/>
               <a:t>Summary</a:t>
             </a:r>
           </a:p>
@@ -6461,28 +6615,27 @@
         </p:nvSpPr>
         <p:spPr/>
         <p:txBody>
-          <a:bodyPr/>
-          <a:lstStyle/>
-          <a:p>
-            <a:pPr lvl="0" indent="0" marL="0">
+          <a:bodyPr>
+            <a:normAutofit fontScale="85000" lnSpcReduction="10000"/>
+          </a:bodyPr>
+          <a:lstStyle/>
+          <a:p>
+            <a:pPr marL="0" lvl="0" indent="0">
               <a:buNone/>
             </a:pPr>
             <a:r>
-              <a:rPr/>
               <a:t>Bootstrap estimation is widely useful and requires minimal assumption</a:t>
             </a:r>
           </a:p>
           <a:p>
             <a:pPr lvl="0"/>
             <a:r>
-              <a:rPr/>
               <a:t>Bootstrap distribution is comprised of values of the statistic computed from bootstrap resamples of the original observations (data sample)</a:t>
             </a:r>
           </a:p>
           <a:p>
             <a:pPr lvl="0"/>
             <a:r>
-              <a:rPr/>
               <a:t>Computing bootstrap distribution requires </a:t>
             </a:r>
             <a:r>
@@ -6493,14 +6646,12 @@
           <a:p>
             <a:pPr lvl="1"/>
             <a:r>
-              <a:rPr/>
               <a:t>Bootstrap resampling substitutes computer power for paper and pencil statistician power</a:t>
             </a:r>
           </a:p>
           <a:p>
             <a:pPr lvl="0"/>
             <a:r>
-              <a:rPr/>
               <a:t>Bootstrap resampling estimates the </a:t>
             </a:r>
             <a:r>
@@ -6508,22 +6659,20 @@
               <a:t>bootstrap distribution</a:t>
             </a:r>
             <a:r>
-              <a:rPr/>
               <a:t> of a statistic</a:t>
             </a:r>
           </a:p>
           <a:p>
             <a:pPr lvl="1"/>
             <a:r>
-              <a:rPr/>
               <a:t>Compute mostly likely point estimate of the statistic, or bootstrap estimate</a:t>
             </a:r>
             <a:br/>
+            <a:endParaRPr/>
           </a:p>
           <a:p>
             <a:pPr lvl="1"/>
             <a:r>
-              <a:rPr/>
               <a:t>The bootstrap confidence interval is computed from the bootstrap distribution</a:t>
             </a:r>
           </a:p>
@@ -6531,6 +6680,9 @@
       </p:sp>
     </p:spTree>
   </p:cSld>
+  <p:clrMapOvr>
+    <a:masterClrMapping/>
+  </p:clrMapOvr>
 </p:sld>
 </file>
 
@@ -6566,11 +6718,10 @@
           <a:bodyPr/>
           <a:lstStyle/>
           <a:p>
-            <a:pPr lvl="0" indent="0" marL="0">
+            <a:pPr marL="0" lvl="0" indent="0">
               <a:buNone/>
             </a:pPr>
             <a:r>
-              <a:rPr/>
               <a:t>Summary</a:t>
             </a:r>
           </a:p>
@@ -6591,53 +6742,46 @@
           <a:bodyPr/>
           <a:lstStyle/>
           <a:p>
-            <a:pPr lvl="0" indent="0" marL="0">
+            <a:pPr marL="0" lvl="0" indent="0">
               <a:buNone/>
             </a:pPr>
             <a:r>
-              <a:rPr/>
               <a:t>There are several variations of the basi nonparametric bootstrap algorithm</a:t>
             </a:r>
           </a:p>
           <a:p>
             <a:pPr lvl="0"/>
             <a:r>
-              <a:rPr/>
               <a:t>One sample bootstrap</a:t>
             </a:r>
           </a:p>
           <a:p>
             <a:pPr lvl="1"/>
             <a:r>
-              <a:rPr/>
               <a:t>Inference on single populations</a:t>
             </a:r>
           </a:p>
           <a:p>
             <a:pPr lvl="0"/>
             <a:r>
-              <a:rPr/>
               <a:t>Two sample bootstrap</a:t>
             </a:r>
           </a:p>
           <a:p>
             <a:pPr lvl="1"/>
             <a:r>
-              <a:rPr/>
               <a:t>Inference on different populations</a:t>
             </a:r>
           </a:p>
           <a:p>
             <a:pPr lvl="0"/>
             <a:r>
-              <a:rPr/>
               <a:t>Special cases</a:t>
             </a:r>
           </a:p>
           <a:p>
             <a:pPr lvl="1"/>
             <a:r>
-              <a:rPr/>
               <a:t>Correlation coefficients - part of your assignment</a:t>
             </a:r>
           </a:p>
@@ -6645,6 +6789,9 @@
       </p:sp>
     </p:spTree>
   </p:cSld>
+  <p:clrMapOvr>
+    <a:masterClrMapping/>
+  </p:clrMapOvr>
 </p:sld>
 </file>
 
@@ -6680,11 +6827,10 @@
           <a:bodyPr/>
           <a:lstStyle/>
           <a:p>
-            <a:pPr lvl="0" indent="0" marL="0">
+            <a:pPr marL="0" lvl="0" indent="0">
               <a:buNone/>
             </a:pPr>
             <a:r>
-              <a:rPr/>
               <a:t>Summary</a:t>
             </a:r>
           </a:p>
@@ -6704,36 +6850,35 @@
             </p:nvSpPr>
             <p:spPr/>
             <p:txBody>
-              <a:bodyPr/>
+              <a:bodyPr>
+                <a:normAutofit fontScale="70000" lnSpcReduction="20000"/>
+              </a:bodyPr>
               <a:lstStyle/>
               <a:p>
-                <a:pPr lvl="0" indent="0" marL="0">
+                <a:pPr marL="0" lvl="0" indent="0">
                   <a:buNone/>
                 </a:pPr>
                 <a:r>
-                  <a:rPr/>
                   <a:t>Re-sampling methods are general and powerful but, there is no magic involved! There are pitfalls!</a:t>
                 </a:r>
               </a:p>
               <a:p>
                 <a:pPr lvl="0"/>
                 <a:r>
-                  <a:rPr/>
                   <a:t>If a sample is biased, the resampled statistic estimate based on that sample will be biased</a:t>
                 </a:r>
               </a:p>
               <a:p>
                 <a:pPr lvl="1"/>
                 <a:r>
-                  <a:rPr/>
                   <a:t>Results can be no better than the sample you start with</a:t>
                 </a:r>
                 <a:br/>
+                <a:endParaRPr/>
               </a:p>
               <a:p>
                 <a:pPr lvl="1"/>
                 <a:r>
-                  <a:rPr/>
                   <a:t>Example; the bootstrap estimate of mean is the unbiased sample estimate, </a:t>
                 </a:r>
                 <a14:m>
@@ -6741,62 +6886,106 @@
                     <m:acc>
                       <m:accPr>
                         <m:chr m:val="‾"/>
+                        <m:ctrlPr>
+                          <a:rPr>
+                            <a:latin typeface="Cambria Math" panose="02040503050406030204" pitchFamily="18" charset="0"/>
+                          </a:rPr>
+                        </m:ctrlPr>
                       </m:accPr>
                       <m:e>
                         <m:r>
-                          <m:t>x</m:t>
+                          <a:rPr>
+                            <a:latin typeface="Cambria Math" panose="02040503050406030204" pitchFamily="18" charset="0"/>
+                          </a:rPr>
+                          <m:t>𝑥</m:t>
                         </m:r>
                       </m:e>
                     </m:acc>
                   </m:oMath>
                 </a14:m>
                 <a:r>
-                  <a:rPr/>
                   <a:t>, not the population parameter, </a:t>
                 </a:r>
                 <a14:m>
                   <m:oMath xmlns:m="http://schemas.openxmlformats.org/officeDocument/2006/math">
                     <m:r>
-                      <m:t>μ</m:t>
+                      <a:rPr>
+                        <a:latin typeface="Cambria Math" panose="02040503050406030204" pitchFamily="18" charset="0"/>
+                      </a:rPr>
+                      <m:t>𝜇</m:t>
                     </m:r>
                   </m:oMath>
                 </a14:m>
+                <a:endParaRPr/>
               </a:p>
               <a:p>
                 <a:pPr lvl="0"/>
                 <a:r>
-                  <a:rPr/>
                   <a:t>The sample variance and Cis can be no better than the sample distribution allows</a:t>
                 </a:r>
               </a:p>
               <a:p>
                 <a:pPr lvl="1"/>
                 <a:r>
-                  <a:rPr/>
                   <a:t>Be suspicious of overly optimistic confidence intervals</a:t>
                 </a:r>
                 <a:br/>
+                <a:endParaRPr/>
               </a:p>
               <a:p>
                 <a:pPr lvl="1"/>
                 <a:r>
-                  <a:rPr/>
                   <a:t>CIs can be optimistically biased</a:t>
                 </a:r>
               </a:p>
               <a:p>
                 <a:pPr lvl="0"/>
                 <a:r>
-                  <a:rPr/>
                   <a:t>Are computationally intensive, but often highly parallelizable</a:t>
                 </a:r>
               </a:p>
             </p:txBody>
           </p:sp>
         </mc:Choice>
+        <mc:Fallback>
+          <p:sp>
+            <p:nvSpPr>
+              <p:cNvPr id="3" name="Content Placeholder 2"/>
+              <p:cNvSpPr>
+                <a:spLocks noGrp="1" noRot="1" noChangeAspect="1" noMove="1" noResize="1" noEditPoints="1" noAdjustHandles="1" noChangeArrowheads="1" noChangeShapeType="1" noTextEdit="1"/>
+              </p:cNvSpPr>
+              <p:nvPr>
+                <p:ph idx="1"/>
+              </p:nvPr>
+            </p:nvSpPr>
+            <p:spPr>
+              <a:blipFill>
+                <a:blip r:embed="rId2"/>
+                <a:stretch>
+                  <a:fillRect l="-444" t="-1975"/>
+                </a:stretch>
+              </a:blipFill>
+            </p:spPr>
+            <p:txBody>
+              <a:bodyPr/>
+              <a:lstStyle/>
+              <a:p>
+                <a:r>
+                  <a:rPr lang="en-US">
+                    <a:noFill/>
+                  </a:rPr>
+                  <a:t> </a:t>
+                </a:r>
+              </a:p>
+            </p:txBody>
+          </p:sp>
+        </mc:Fallback>
       </mc:AlternateContent>
     </p:spTree>
   </p:cSld>
+  <p:clrMapOvr>
+    <a:masterClrMapping/>
+  </p:clrMapOvr>
 </p:sld>
 </file>
 
@@ -6832,11 +7021,10 @@
           <a:bodyPr/>
           <a:lstStyle/>
           <a:p>
-            <a:pPr lvl="0" indent="0" marL="0">
+            <a:pPr marL="0" lvl="0" indent="0">
               <a:buNone/>
             </a:pPr>
             <a:r>
-              <a:rPr/>
               <a:t>Types of Resampling Methods</a:t>
             </a:r>
           </a:p>
@@ -6854,14 +7042,15 @@
         </p:nvSpPr>
         <p:spPr/>
         <p:txBody>
-          <a:bodyPr/>
-          <a:lstStyle/>
-          <a:p>
-            <a:pPr lvl="0" indent="0" marL="0">
+          <a:bodyPr>
+            <a:normAutofit fontScale="55000" lnSpcReduction="20000"/>
+          </a:bodyPr>
+          <a:lstStyle/>
+          <a:p>
+            <a:pPr marL="0" lvl="0" indent="0">
               <a:buNone/>
             </a:pPr>
             <a:r>
-              <a:rPr/>
               <a:t>Commonly used re-sampling methods include:</a:t>
             </a:r>
           </a:p>
@@ -6872,22 +7061,20 @@
               <a:t>Randomization or Permutation methods:</a:t>
             </a:r>
             <a:r>
-              <a:rPr/>
               <a:t> aka exact tests</a:t>
             </a:r>
           </a:p>
           <a:p>
             <a:pPr lvl="1"/>
             <a:r>
-              <a:rPr/>
               <a:t>Have a long history; e.g. Fisher’s exact test (1922)</a:t>
             </a:r>
             <a:br/>
+            <a:endParaRPr/>
           </a:p>
           <a:p>
             <a:pPr lvl="1"/>
             <a:r>
-              <a:rPr/>
               <a:t>Practical approximate algorithms for larger data sets in computer era</a:t>
             </a:r>
           </a:p>
@@ -6898,30 +7085,28 @@
               <a:t>Cross validation:</a:t>
             </a:r>
             <a:r>
-              <a:rPr/>
               <a:t> resample into multiple folds without replacement</a:t>
             </a:r>
           </a:p>
           <a:p>
             <a:pPr lvl="1"/>
             <a:r>
-              <a:rPr/>
               <a:t>Leave n out method</a:t>
             </a:r>
             <a:br/>
+            <a:endParaRPr/>
           </a:p>
           <a:p>
             <a:pPr lvl="1"/>
             <a:r>
-              <a:rPr/>
               <a:t>Has origins in the 1950s</a:t>
             </a:r>
             <a:br/>
+            <a:endParaRPr/>
           </a:p>
           <a:p>
             <a:pPr lvl="1"/>
             <a:r>
-              <a:rPr/>
               <a:t>Widely used to evaluate machine learning (ML) models</a:t>
             </a:r>
           </a:p>
@@ -6932,29 +7117,26 @@
               <a:t>Jackknife:</a:t>
             </a:r>
             <a:r>
-              <a:rPr/>
               <a:t> leave one out re-sampling</a:t>
             </a:r>
           </a:p>
           <a:p>
             <a:pPr lvl="1"/>
             <a:r>
-              <a:rPr/>
               <a:t>Leave one out method</a:t>
             </a:r>
           </a:p>
           <a:p>
             <a:pPr lvl="1"/>
             <a:r>
-              <a:rPr/>
               <a:t>Early general purpose resampling method</a:t>
             </a:r>
             <a:br/>
+            <a:endParaRPr/>
           </a:p>
           <a:p>
             <a:pPr lvl="1"/>
             <a:r>
-              <a:rPr/>
               <a:t>Has origins in the 1950s</a:t>
             </a:r>
           </a:p>
@@ -6965,14 +7147,12 @@
               <a:t>Nonparametric Bootstrap:</a:t>
             </a:r>
             <a:r>
-              <a:rPr/>
               <a:t> resample with equivalent size and replacement - our focus here</a:t>
             </a:r>
           </a:p>
           <a:p>
             <a:pPr lvl="1"/>
             <a:r>
-              <a:rPr/>
               <a:t>Published by Prof Brad Efron in 1979</a:t>
             </a:r>
           </a:p>
@@ -6980,6 +7160,9 @@
       </p:sp>
     </p:spTree>
   </p:cSld>
+  <p:clrMapOvr>
+    <a:masterClrMapping/>
+  </p:clrMapOvr>
 </p:sld>
 </file>
 
@@ -7015,11 +7198,10 @@
           <a:bodyPr/>
           <a:lstStyle/>
           <a:p>
-            <a:pPr lvl="0" indent="0" marL="0">
+            <a:pPr marL="0" lvl="0" indent="0">
               <a:buNone/>
             </a:pPr>
             <a:r>
-              <a:rPr/>
               <a:t>Nonparametric vs. Parametric Statistical Model</a:t>
             </a:r>
           </a:p>
@@ -7037,14 +7219,15 @@
         </p:nvSpPr>
         <p:spPr/>
         <p:txBody>
-          <a:bodyPr/>
-          <a:lstStyle/>
-          <a:p>
-            <a:pPr lvl="0" indent="0" marL="0">
+          <a:bodyPr>
+            <a:normAutofit fontScale="92500" lnSpcReduction="20000"/>
+          </a:bodyPr>
+          <a:lstStyle/>
+          <a:p>
+            <a:pPr marL="0" lvl="0" indent="0">
               <a:buNone/>
             </a:pPr>
             <a:r>
-              <a:rPr/>
               <a:t>Many familiar statistic models are </a:t>
             </a:r>
             <a:r>
@@ -7052,7 +7235,6 @@
               <a:t>parametric</a:t>
             </a:r>
             <a:r>
-              <a:rPr/>
               <a:t>, being based on a assumed </a:t>
             </a:r>
             <a:r>
@@ -7063,51 +7245,46 @@
           <a:p>
             <a:pPr lvl="0"/>
             <a:r>
-              <a:rPr/>
               <a:t>Likelihood models based on a parametric distributions</a:t>
             </a:r>
           </a:p>
           <a:p>
             <a:pPr lvl="0"/>
             <a:r>
-              <a:rPr/>
               <a:t>Parametric models have low variance estimates for statistics</a:t>
             </a:r>
           </a:p>
           <a:p>
             <a:pPr lvl="1"/>
             <a:r>
-              <a:rPr/>
               <a:t>But susceptible to poor choice of likelihood model</a:t>
             </a:r>
           </a:p>
           <a:p>
             <a:pPr lvl="0"/>
             <a:r>
-              <a:rPr/>
               <a:t>Example, least-squares error model uses a Normal likelihood</a:t>
             </a:r>
           </a:p>
           <a:p>
             <a:pPr lvl="1"/>
             <a:r>
-              <a:rPr/>
               <a:t>Parameters which must be estimated</a:t>
             </a:r>
             <a:br/>
+            <a:endParaRPr/>
           </a:p>
           <a:p>
             <a:pPr lvl="1"/>
             <a:r>
-              <a:rPr/>
               <a:t>Location and scale in one-dimension</a:t>
             </a:r>
             <a:br/>
+            <a:endParaRPr/>
           </a:p>
           <a:p>
             <a:pPr lvl="1"/>
             <a:r>
-              <a:rPr/>
               <a:t>Betas and covariance in higher dimensions</a:t>
             </a:r>
           </a:p>
@@ -7115,6 +7292,9 @@
       </p:sp>
     </p:spTree>
   </p:cSld>
+  <p:clrMapOvr>
+    <a:masterClrMapping/>
+  </p:clrMapOvr>
 </p:sld>
 </file>
 
@@ -7150,11 +7330,10 @@
           <a:bodyPr/>
           <a:lstStyle/>
           <a:p>
-            <a:pPr lvl="0" indent="0" marL="0">
+            <a:pPr marL="0" lvl="0" indent="0">
               <a:buNone/>
             </a:pPr>
             <a:r>
-              <a:rPr/>
               <a:t>Nonparametric vs. Parametric Statistical Model</a:t>
             </a:r>
           </a:p>
@@ -7172,10 +7351,12 @@
         </p:nvSpPr>
         <p:spPr/>
         <p:txBody>
-          <a:bodyPr/>
-          <a:lstStyle/>
-          <a:p>
-            <a:pPr lvl="0" indent="0" marL="0">
+          <a:bodyPr>
+            <a:normAutofit fontScale="62500" lnSpcReduction="20000"/>
+          </a:bodyPr>
+          <a:lstStyle/>
+          <a:p>
+            <a:pPr marL="0" lvl="0" indent="0">
               <a:buNone/>
             </a:pPr>
             <a:r>
@@ -7183,14 +7364,12 @@
               <a:t>Nonparametric model</a:t>
             </a:r>
             <a:r>
-              <a:rPr/>
               <a:t> not based on a parametric likelihood</a:t>
             </a:r>
           </a:p>
           <a:p>
             <a:pPr lvl="0"/>
             <a:r>
-              <a:rPr/>
               <a:t>Use an </a:t>
             </a:r>
             <a:r>
@@ -7198,74 +7377,68 @@
               <a:t>empirical distribution</a:t>
             </a:r>
             <a:r>
-              <a:rPr/>
               <a:t> estimated from observations</a:t>
             </a:r>
           </a:p>
           <a:p>
             <a:pPr lvl="1"/>
             <a:r>
-              <a:rPr/>
               <a:t>No likelihood model assumptions</a:t>
             </a:r>
           </a:p>
           <a:p>
             <a:pPr lvl="0"/>
             <a:r>
-              <a:rPr/>
               <a:t>Statistical properties estimated from this empirical distribution</a:t>
             </a:r>
           </a:p>
           <a:p>
             <a:pPr lvl="1"/>
             <a:r>
-              <a:rPr/>
               <a:t>Potentially high variance estimates</a:t>
             </a:r>
             <a:br/>
+            <a:endParaRPr/>
           </a:p>
           <a:p>
             <a:pPr lvl="1"/>
             <a:r>
-              <a:rPr/>
               <a:t>Need sufficient sample size</a:t>
             </a:r>
             <a:br/>
+            <a:endParaRPr/>
           </a:p>
           <a:p>
             <a:pPr lvl="1"/>
             <a:r>
-              <a:rPr/>
               <a:t>Example, mean and variance estimates</a:t>
             </a:r>
           </a:p>
           <a:p>
             <a:pPr lvl="0"/>
             <a:r>
-              <a:rPr/>
               <a:t>Examples of nonparametric statistical estimators:</a:t>
             </a:r>
           </a:p>
           <a:p>
             <a:pPr lvl="1"/>
             <a:r>
-              <a:rPr/>
               <a:t>Permutation tests</a:t>
             </a:r>
             <a:br/>
+            <a:endParaRPr/>
           </a:p>
           <a:p>
             <a:pPr lvl="1"/>
             <a:r>
-              <a:rPr/>
               <a:t>Jackknife estimates</a:t>
             </a:r>
             <a:br/>
+            <a:endParaRPr/>
           </a:p>
           <a:p>
             <a:pPr lvl="1"/>
             <a:r>
-              <a:rPr/>
               <a:t>Nonparametric bootstrap</a:t>
             </a:r>
           </a:p>
@@ -7273,6 +7446,9 @@
       </p:sp>
     </p:spTree>
   </p:cSld>
+  <p:clrMapOvr>
+    <a:masterClrMapping/>
+  </p:clrMapOvr>
 </p:sld>
 </file>
 
@@ -7305,14 +7481,15 @@
         </p:nvSpPr>
         <p:spPr/>
         <p:txBody>
-          <a:bodyPr/>
-          <a:lstStyle/>
-          <a:p>
-            <a:pPr lvl="0" indent="0" marL="0">
+          <a:bodyPr>
+            <a:normAutofit fontScale="90000"/>
+          </a:bodyPr>
+          <a:lstStyle/>
+          <a:p>
+            <a:pPr marL="0" lvl="0" indent="0">
               <a:buNone/>
             </a:pPr>
             <a:r>
-              <a:rPr/>
               <a:t>General Characteristics of Nonparametric Resampling Methods</a:t>
             </a:r>
           </a:p>
@@ -7330,42 +7507,39 @@
         </p:nvSpPr>
         <p:spPr/>
         <p:txBody>
-          <a:bodyPr/>
-          <a:lstStyle/>
-          <a:p>
-            <a:pPr lvl="0" indent="0" marL="0">
+          <a:bodyPr>
+            <a:normAutofit fontScale="92500"/>
+          </a:bodyPr>
+          <a:lstStyle/>
+          <a:p>
+            <a:pPr marL="0" lvl="0" indent="0">
               <a:buNone/>
             </a:pPr>
             <a:r>
-              <a:rPr/>
               <a:t>General characteristics of nonparametric resampling methods include</a:t>
             </a:r>
           </a:p>
           <a:p>
             <a:pPr lvl="0"/>
             <a:r>
-              <a:rPr/>
               <a:t>Allow computation of statistics from data samples for statistics with continuous derivatives</a:t>
             </a:r>
           </a:p>
           <a:p>
             <a:pPr lvl="0"/>
             <a:r>
-              <a:rPr/>
               <a:t>Repeatedly compute statistics from multiple resamples of dataset</a:t>
             </a:r>
           </a:p>
           <a:p>
             <a:pPr lvl="0"/>
             <a:r>
-              <a:rPr/>
               <a:t>The result converges to the sample distribution of the statistic being computed</a:t>
             </a:r>
           </a:p>
           <a:p>
             <a:pPr lvl="0"/>
             <a:r>
-              <a:rPr/>
               <a:t>Make minimal distributional assumptions, when compared to classical frequentist statistics</a:t>
             </a:r>
           </a:p>
@@ -7373,6 +7547,9 @@
       </p:sp>
     </p:spTree>
   </p:cSld>
+  <p:clrMapOvr>
+    <a:masterClrMapping/>
+  </p:clrMapOvr>
 </p:sld>
 </file>
 
@@ -7408,11 +7585,10 @@
           <a:bodyPr/>
           <a:lstStyle/>
           <a:p>
-            <a:pPr lvl="0" indent="0" marL="0">
+            <a:pPr marL="0" lvl="0" indent="0">
               <a:buNone/>
             </a:pPr>
             <a:r>
-              <a:rPr/>
               <a:t>Pitfalls of Resampling Methods</a:t>
             </a:r>
           </a:p>
@@ -7432,36 +7608,35 @@
             </p:nvSpPr>
             <p:spPr/>
             <p:txBody>
-              <a:bodyPr/>
+              <a:bodyPr>
+                <a:normAutofit fontScale="70000" lnSpcReduction="20000"/>
+              </a:bodyPr>
               <a:lstStyle/>
               <a:p>
-                <a:pPr lvl="0" indent="0" marL="0">
+                <a:pPr marL="0" lvl="0" indent="0">
                   <a:buNone/>
                 </a:pPr>
                 <a:r>
-                  <a:rPr/>
                   <a:t>Re-sampling methods are general and powerful but, there is no magic involved! There are pitfalls!</a:t>
                 </a:r>
               </a:p>
               <a:p>
                 <a:pPr lvl="0"/>
                 <a:r>
-                  <a:rPr/>
                   <a:t>If a sample is biased, the resampled statistic estimate based on that sample will be biased</a:t>
                 </a:r>
               </a:p>
               <a:p>
                 <a:pPr lvl="1"/>
                 <a:r>
-                  <a:rPr/>
                   <a:t>Results can be no better than the sample you start with</a:t>
                 </a:r>
                 <a:br/>
+                <a:endParaRPr/>
               </a:p>
               <a:p>
                 <a:pPr lvl="1"/>
                 <a:r>
-                  <a:rPr/>
                   <a:t>Example; the bootstrap estimate of mean is a sample estimate, </a:t>
                 </a:r>
                 <a14:m>
@@ -7469,70 +7644,114 @@
                     <m:acc>
                       <m:accPr>
                         <m:chr m:val="‾"/>
+                        <m:ctrlPr>
+                          <a:rPr>
+                            <a:latin typeface="Cambria Math" panose="02040503050406030204" pitchFamily="18" charset="0"/>
+                          </a:rPr>
+                        </m:ctrlPr>
                       </m:accPr>
                       <m:e>
                         <m:r>
-                          <m:t>x</m:t>
+                          <a:rPr>
+                            <a:latin typeface="Cambria Math" panose="02040503050406030204" pitchFamily="18" charset="0"/>
+                          </a:rPr>
+                          <m:t>𝑥</m:t>
                         </m:r>
                       </m:e>
                     </m:acc>
                   </m:oMath>
                 </a14:m>
                 <a:r>
-                  <a:rPr/>
                   <a:t>, not the population parameter, </a:t>
                 </a:r>
                 <a14:m>
                   <m:oMath xmlns:m="http://schemas.openxmlformats.org/officeDocument/2006/math">
                     <m:r>
-                      <m:t>μ</m:t>
+                      <a:rPr>
+                        <a:latin typeface="Cambria Math" panose="02040503050406030204" pitchFamily="18" charset="0"/>
+                      </a:rPr>
+                      <m:t>𝜇</m:t>
                     </m:r>
                   </m:oMath>
                 </a14:m>
+                <a:endParaRPr/>
               </a:p>
               <a:p>
                 <a:pPr lvl="0"/>
                 <a:r>
-                  <a:rPr/>
                   <a:t>The sample variance and CIs can be no better than the sample distribution allows</a:t>
                 </a:r>
               </a:p>
               <a:p>
                 <a:pPr lvl="1"/>
                 <a:r>
-                  <a:rPr/>
                   <a:t>Often higher variance than parametric models</a:t>
                 </a:r>
                 <a:br/>
+                <a:endParaRPr/>
               </a:p>
               <a:p>
                 <a:pPr lvl="1"/>
                 <a:r>
-                  <a:rPr/>
                   <a:t>Be suspicious of overly optimistic confidence intervals</a:t>
                 </a:r>
                 <a:br/>
+                <a:endParaRPr/>
               </a:p>
               <a:p>
                 <a:pPr lvl="1"/>
                 <a:r>
-                  <a:rPr/>
                   <a:t>CIs can be optimistically biased</a:t>
                 </a:r>
               </a:p>
               <a:p>
                 <a:pPr lvl="0"/>
                 <a:r>
-                  <a:rPr/>
                   <a:t>Are computationally intensive, but often highly parallelizable</a:t>
                 </a:r>
               </a:p>
             </p:txBody>
           </p:sp>
         </mc:Choice>
+        <mc:Fallback>
+          <p:sp>
+            <p:nvSpPr>
+              <p:cNvPr id="3" name="Content Placeholder 2"/>
+              <p:cNvSpPr>
+                <a:spLocks noGrp="1" noRot="1" noChangeAspect="1" noMove="1" noResize="1" noEditPoints="1" noAdjustHandles="1" noChangeArrowheads="1" noChangeShapeType="1" noTextEdit="1"/>
+              </p:cNvSpPr>
+              <p:nvPr>
+                <p:ph idx="1"/>
+              </p:nvPr>
+            </p:nvSpPr>
+            <p:spPr>
+              <a:blipFill>
+                <a:blip r:embed="rId2"/>
+                <a:stretch>
+                  <a:fillRect l="-444" t="-1975" b="-1795"/>
+                </a:stretch>
+              </a:blipFill>
+            </p:spPr>
+            <p:txBody>
+              <a:bodyPr/>
+              <a:lstStyle/>
+              <a:p>
+                <a:r>
+                  <a:rPr lang="en-US">
+                    <a:noFill/>
+                  </a:rPr>
+                  <a:t> </a:t>
+                </a:r>
+              </a:p>
+            </p:txBody>
+          </p:sp>
+        </mc:Fallback>
       </mc:AlternateContent>
     </p:spTree>
   </p:cSld>
+  <p:clrMapOvr>
+    <a:masterClrMapping/>
+  </p:clrMapOvr>
 </p:sld>
 </file>
 
@@ -7568,11 +7787,10 @@
           <a:bodyPr/>
           <a:lstStyle/>
           <a:p>
-            <a:pPr lvl="0" indent="0" marL="0">
+            <a:pPr marL="0" lvl="0" indent="0">
               <a:buNone/>
             </a:pPr>
             <a:r>
-              <a:rPr/>
               <a:t>Point Estimates vs. Distribution Estimates</a:t>
             </a:r>
           </a:p>
@@ -7590,50 +7808,47 @@
         </p:nvSpPr>
         <p:spPr/>
         <p:txBody>
-          <a:bodyPr/>
-          <a:lstStyle/>
-          <a:p>
-            <a:pPr lvl="0" indent="0" marL="0">
+          <a:bodyPr>
+            <a:normAutofit fontScale="92500" lnSpcReduction="10000"/>
+          </a:bodyPr>
+          <a:lstStyle/>
+          <a:p>
+            <a:pPr marL="0" lvl="0" indent="0">
               <a:buNone/>
             </a:pPr>
             <a:r>
-              <a:rPr/>
               <a:t>The goal of frequentist statistics is to compute a point estimate and confidence interval</a:t>
             </a:r>
           </a:p>
           <a:p>
             <a:pPr lvl="0"/>
             <a:r>
-              <a:rPr/>
               <a:t>Point estimate is the single most likely value for a statistic</a:t>
             </a:r>
           </a:p>
           <a:p>
             <a:pPr lvl="1"/>
             <a:r>
-              <a:rPr/>
               <a:t>Confidence interval expresses the uncertainty of the point estimate</a:t>
             </a:r>
           </a:p>
           <a:p>
             <a:pPr lvl="0"/>
             <a:r>
-              <a:rPr/>
               <a:t>Parametric confidence interval based on the properties of some assumed probability distribution</a:t>
             </a:r>
           </a:p>
           <a:p>
             <a:pPr lvl="1"/>
             <a:r>
-              <a:rPr/>
               <a:t>Are there alternatives to this classical frequentist approach?</a:t>
             </a:r>
             <a:br/>
+            <a:endParaRPr/>
           </a:p>
           <a:p>
             <a:pPr lvl="1"/>
             <a:r>
-              <a:rPr/>
               <a:t>Here we focus on bootstrap methods which do not require explicit probability model</a:t>
             </a:r>
           </a:p>
@@ -7641,6 +7856,9 @@
       </p:sp>
     </p:spTree>
   </p:cSld>
+  <p:clrMapOvr>
+    <a:masterClrMapping/>
+  </p:clrMapOvr>
 </p:sld>
 </file>
 
@@ -7676,11 +7894,10 @@
           <a:bodyPr/>
           <a:lstStyle/>
           <a:p>
-            <a:pPr lvl="0" indent="0" marL="0">
+            <a:pPr marL="0" lvl="0" indent="0">
               <a:buNone/>
             </a:pPr>
             <a:r>
-              <a:rPr/>
               <a:t>Bootstrap Distribution</a:t>
             </a:r>
           </a:p>
@@ -7698,28 +7915,27 @@
         </p:nvSpPr>
         <p:spPr/>
         <p:txBody>
-          <a:bodyPr/>
-          <a:lstStyle/>
-          <a:p>
-            <a:pPr lvl="0" indent="0" marL="0">
+          <a:bodyPr>
+            <a:normAutofit fontScale="85000" lnSpcReduction="20000"/>
+          </a:bodyPr>
+          <a:lstStyle/>
+          <a:p>
+            <a:pPr marL="0" lvl="0" indent="0">
               <a:buNone/>
             </a:pPr>
             <a:r>
-              <a:rPr/>
               <a:t>Rather than computing a point estimate directly, bootstrap methods compute a bootstrap distribution of a statistic</a:t>
             </a:r>
           </a:p>
           <a:p>
             <a:pPr lvl="0"/>
             <a:r>
-              <a:rPr/>
               <a:t>Bootstrap distribution is comprised of values of the statistic computed from bootstrap resamples of the original observations (data sample)</a:t>
             </a:r>
           </a:p>
           <a:p>
             <a:pPr lvl="0"/>
             <a:r>
-              <a:rPr/>
               <a:t>Computing bootstrap distribution requires </a:t>
             </a:r>
             <a:r>
@@ -7730,14 +7946,12 @@
           <a:p>
             <a:pPr lvl="1"/>
             <a:r>
-              <a:rPr/>
               <a:t>Bootstrap resampling substitutes computer power for paper and pencil statistician power</a:t>
             </a:r>
           </a:p>
           <a:p>
             <a:pPr lvl="0"/>
             <a:r>
-              <a:rPr/>
               <a:t>Bootstrap resampling estimates the </a:t>
             </a:r>
             <a:r>
@@ -7745,22 +7959,20 @@
               <a:t>bootstrap distribution</a:t>
             </a:r>
             <a:r>
-              <a:rPr/>
               <a:t> of a statistic</a:t>
             </a:r>
           </a:p>
           <a:p>
             <a:pPr lvl="1"/>
             <a:r>
-              <a:rPr/>
               <a:t>Compute mostly likely point estimate of the statistic, or bootstrap estimate</a:t>
             </a:r>
             <a:br/>
+            <a:endParaRPr/>
           </a:p>
           <a:p>
             <a:pPr lvl="1"/>
             <a:r>
-              <a:rPr/>
               <a:t>The bootstrap confidence interval is computed from the bootstrap distribution</a:t>
             </a:r>
           </a:p>
@@ -7768,6 +7980,9 @@
       </p:sp>
     </p:spTree>
   </p:cSld>
+  <p:clrMapOvr>
+    <a:masterClrMapping/>
+  </p:clrMapOvr>
 </p:sld>
 </file>
 
@@ -8089,265 +8304,4 @@
   </a:objectDefaults>
   <a:extraClrSchemeLst/>
 </a:theme>
-</file>
-
-<file path=ppt/theme/theme2.xml><?xml version="1.0" encoding="utf-8"?>
-<a:theme xmlns:a="http://schemas.openxmlformats.org/drawingml/2006/main" name="Office Theme">
-  <a:themeElements>
-    <a:clrScheme name="Office">
-      <a:dk1>
-        <a:sysClr val="windowText" lastClr="000000"/>
-      </a:dk1>
-      <a:lt1>
-        <a:sysClr val="window" lastClr="FFFFFF"/>
-      </a:lt1>
-      <a:dk2>
-        <a:srgbClr val="44546A"/>
-      </a:dk2>
-      <a:lt2>
-        <a:srgbClr val="E7E6E6"/>
-      </a:lt2>
-      <a:accent1>
-        <a:srgbClr val="5B9BD5"/>
-      </a:accent1>
-      <a:accent2>
-        <a:srgbClr val="ED7D31"/>
-      </a:accent2>
-      <a:accent3>
-        <a:srgbClr val="A5A5A5"/>
-      </a:accent3>
-      <a:accent4>
-        <a:srgbClr val="FFC000"/>
-      </a:accent4>
-      <a:accent5>
-        <a:srgbClr val="4472C4"/>
-      </a:accent5>
-      <a:accent6>
-        <a:srgbClr val="70AD47"/>
-      </a:accent6>
-      <a:hlink>
-        <a:srgbClr val="0563C1"/>
-      </a:hlink>
-      <a:folHlink>
-        <a:srgbClr val="954F72"/>
-      </a:folHlink>
-    </a:clrScheme>
-    <a:fontScheme name="Office">
-      <a:majorFont>
-        <a:latin typeface="Calibri Light" panose="020F0302020204030204"/>
-        <a:ea typeface=""/>
-        <a:cs typeface=""/>
-        <a:font script="Jpan" typeface="ＭＳ Ｐゴシック"/>
-        <a:font script="Hang" typeface="맑은 고딕"/>
-        <a:font script="Hans" typeface="宋体"/>
-        <a:font script="Hant" typeface="新細明體"/>
-        <a:font script="Arab" typeface="Times New Roman"/>
-        <a:font script="Hebr" typeface="Times New Roman"/>
-        <a:font script="Thai" typeface="Angsana New"/>
-        <a:font script="Ethi" typeface="Nyala"/>
-        <a:font script="Beng" typeface="Vrinda"/>
-        <a:font script="Gujr" typeface="Shruti"/>
-        <a:font script="Khmr" typeface="MoolBoran"/>
-        <a:font script="Knda" typeface="Tunga"/>
-        <a:font script="Guru" typeface="Raavi"/>
-        <a:font script="Cans" typeface="Euphemia"/>
-        <a:font script="Cher" typeface="Plantagenet Cherokee"/>
-        <a:font script="Yiii" typeface="Microsoft Yi Baiti"/>
-        <a:font script="Tibt" typeface="Microsoft Himalaya"/>
-        <a:font script="Thaa" typeface="MV Boli"/>
-        <a:font script="Deva" typeface="Mangal"/>
-        <a:font script="Telu" typeface="Gautami"/>
-        <a:font script="Taml" typeface="Latha"/>
-        <a:font script="Syrc" typeface="Estrangelo Edessa"/>
-        <a:font script="Orya" typeface="Kalinga"/>
-        <a:font script="Mlym" typeface="Kartika"/>
-        <a:font script="Laoo" typeface="DokChampa"/>
-        <a:font script="Sinh" typeface="Iskoola Pota"/>
-        <a:font script="Mong" typeface="Mongolian Baiti"/>
-        <a:font script="Viet" typeface="Times New Roman"/>
-        <a:font script="Uigh" typeface="Microsoft Uighur"/>
-        <a:font script="Geor" typeface="Sylfaen"/>
-      </a:majorFont>
-      <a:minorFont>
-        <a:latin typeface="Calibri" panose="020F0502020204030204"/>
-        <a:ea typeface=""/>
-        <a:cs typeface=""/>
-        <a:font script="Jpan" typeface="ＭＳ Ｐゴシック"/>
-        <a:font script="Hang" typeface="맑은 고딕"/>
-        <a:font script="Hans" typeface="宋体"/>
-        <a:font script="Hant" typeface="新細明體"/>
-        <a:font script="Arab" typeface="Arial"/>
-        <a:font script="Hebr" typeface="Arial"/>
-        <a:font script="Thai" typeface="Cordia New"/>
-        <a:font script="Ethi" typeface="Nyala"/>
-        <a:font script="Beng" typeface="Vrinda"/>
-        <a:font script="Gujr" typeface="Shruti"/>
-        <a:font script="Khmr" typeface="DaunPenh"/>
-        <a:font script="Knda" typeface="Tunga"/>
-        <a:font script="Guru" typeface="Raavi"/>
-        <a:font script="Cans" typeface="Euphemia"/>
-        <a:font script="Cher" typeface="Plantagenet Cherokee"/>
-        <a:font script="Yiii" typeface="Microsoft Yi Baiti"/>
-        <a:font script="Tibt" typeface="Microsoft Himalaya"/>
-        <a:font script="Thaa" typeface="MV Boli"/>
-        <a:font script="Deva" typeface="Mangal"/>
-        <a:font script="Telu" typeface="Gautami"/>
-        <a:font script="Taml" typeface="Latha"/>
-        <a:font script="Syrc" typeface="Estrangelo Edessa"/>
-        <a:font script="Orya" typeface="Kalinga"/>
-        <a:font script="Mlym" typeface="Kartika"/>
-        <a:font script="Laoo" typeface="DokChampa"/>
-        <a:font script="Sinh" typeface="Iskoola Pota"/>
-        <a:font script="Mong" typeface="Mongolian Baiti"/>
-        <a:font script="Viet" typeface="Arial"/>
-        <a:font script="Uigh" typeface="Microsoft Uighur"/>
-        <a:font script="Geor" typeface="Sylfaen"/>
-      </a:minorFont>
-    </a:fontScheme>
-    <a:fmtScheme name="Office">
-      <a:fillStyleLst>
-        <a:solidFill>
-          <a:schemeClr val="phClr"/>
-        </a:solidFill>
-        <a:gradFill rotWithShape="1">
-          <a:gsLst>
-            <a:gs pos="0">
-              <a:schemeClr val="phClr">
-                <a:lumMod val="110000"/>
-                <a:satMod val="105000"/>
-                <a:tint val="67000"/>
-              </a:schemeClr>
-            </a:gs>
-            <a:gs pos="50000">
-              <a:schemeClr val="phClr">
-                <a:lumMod val="105000"/>
-                <a:satMod val="103000"/>
-                <a:tint val="73000"/>
-              </a:schemeClr>
-            </a:gs>
-            <a:gs pos="100000">
-              <a:schemeClr val="phClr">
-                <a:lumMod val="105000"/>
-                <a:satMod val="109000"/>
-                <a:tint val="81000"/>
-              </a:schemeClr>
-            </a:gs>
-          </a:gsLst>
-          <a:lin ang="5400000" scaled="0"/>
-        </a:gradFill>
-        <a:gradFill rotWithShape="1">
-          <a:gsLst>
-            <a:gs pos="0">
-              <a:schemeClr val="phClr">
-                <a:satMod val="103000"/>
-                <a:lumMod val="102000"/>
-                <a:tint val="94000"/>
-              </a:schemeClr>
-            </a:gs>
-            <a:gs pos="50000">
-              <a:schemeClr val="phClr">
-                <a:satMod val="110000"/>
-                <a:lumMod val="100000"/>
-                <a:shade val="100000"/>
-              </a:schemeClr>
-            </a:gs>
-            <a:gs pos="100000">
-              <a:schemeClr val="phClr">
-                <a:lumMod val="99000"/>
-                <a:satMod val="120000"/>
-                <a:shade val="78000"/>
-              </a:schemeClr>
-            </a:gs>
-          </a:gsLst>
-          <a:lin ang="5400000" scaled="0"/>
-        </a:gradFill>
-      </a:fillStyleLst>
-      <a:lnStyleLst>
-        <a:ln w="6350" cap="flat" cmpd="sng" algn="ctr">
-          <a:solidFill>
-            <a:schemeClr val="phClr"/>
-          </a:solidFill>
-          <a:prstDash val="solid"/>
-          <a:miter lim="800000"/>
-        </a:ln>
-        <a:ln w="12700" cap="flat" cmpd="sng" algn="ctr">
-          <a:solidFill>
-            <a:schemeClr val="phClr"/>
-          </a:solidFill>
-          <a:prstDash val="solid"/>
-          <a:miter lim="800000"/>
-        </a:ln>
-        <a:ln w="19050" cap="flat" cmpd="sng" algn="ctr">
-          <a:solidFill>
-            <a:schemeClr val="phClr"/>
-          </a:solidFill>
-          <a:prstDash val="solid"/>
-          <a:miter lim="800000"/>
-        </a:ln>
-      </a:lnStyleLst>
-      <a:effectStyleLst>
-        <a:effectStyle>
-          <a:effectLst/>
-        </a:effectStyle>
-        <a:effectStyle>
-          <a:effectLst/>
-        </a:effectStyle>
-        <a:effectStyle>
-          <a:effectLst>
-            <a:outerShdw blurRad="57150" dist="19050" dir="5400000" algn="ctr" rotWithShape="0">
-              <a:srgbClr val="000000">
-                <a:alpha val="63000"/>
-              </a:srgbClr>
-            </a:outerShdw>
-          </a:effectLst>
-        </a:effectStyle>
-      </a:effectStyleLst>
-      <a:bgFillStyleLst>
-        <a:solidFill>
-          <a:schemeClr val="phClr"/>
-        </a:solidFill>
-        <a:solidFill>
-          <a:schemeClr val="phClr">
-            <a:tint val="95000"/>
-            <a:satMod val="170000"/>
-          </a:schemeClr>
-        </a:solidFill>
-        <a:gradFill rotWithShape="1">
-          <a:gsLst>
-            <a:gs pos="0">
-              <a:schemeClr val="phClr">
-                <a:tint val="93000"/>
-                <a:satMod val="150000"/>
-                <a:shade val="98000"/>
-                <a:lumMod val="102000"/>
-              </a:schemeClr>
-            </a:gs>
-            <a:gs pos="50000">
-              <a:schemeClr val="phClr">
-                <a:tint val="98000"/>
-                <a:satMod val="130000"/>
-                <a:shade val="90000"/>
-                <a:lumMod val="103000"/>
-              </a:schemeClr>
-            </a:gs>
-            <a:gs pos="100000">
-              <a:schemeClr val="phClr">
-                <a:shade val="63000"/>
-                <a:satMod val="120000"/>
-              </a:schemeClr>
-            </a:gs>
-          </a:gsLst>
-          <a:lin ang="5400000" scaled="0"/>
-        </a:gradFill>
-      </a:bgFillStyleLst>
-    </a:fmtScheme>
-  </a:themeElements>
-  <a:objectDefaults/>
-  <a:extraClrSchemeLst/>
-  <a:extLst>
-    <a:ext uri="{05A4C25C-085E-4340-85A3-A5531E510DB2}">
-      <thm15:themeFamily xmlns:thm15="http://schemas.microsoft.com/office/thememl/2012/main" name="Office Theme" id="{62F939B6-93AF-4DB8-9C6B-D6C7DFDC589F}" vid="{4A3C46E8-61CC-4603-A589-7422A47A8E4A}"/>
-    </a:ext>
-  </a:extLst>
-</a:theme>
 </file>
</xml_diff>

<commit_message>
Added visualization review slides and examples
</commit_message>
<xml_diff>
--- a/LectureSlides/06b_IntroductionToBootstrap.pptx
+++ b/LectureSlides/06b_IntroductionToBootstrap.pptx
@@ -235,7 +235,7 @@
           <a:p>
             <a:fld id="{04109FAC-1BEC-4087-B676-5D9DDF25C61E}" type="datetimeFigureOut">
               <a:rPr lang="en-US" smtClean="0"/>
-              <a:t>9/15/2024</a:t>
+              <a:t>9/17/2024</a:t>
             </a:fld>
             <a:endParaRPr lang="en-US"/>
           </a:p>
@@ -768,7 +768,7 @@
           <a:p>
             <a:fld id="{241EB5C9-1307-BA42-ABA2-0BC069CD8E7F}" type="datetimeFigureOut">
               <a:rPr lang="en-US" smtClean="0"/>
-              <a:t>9/15/2024</a:t>
+              <a:t>9/17/2024</a:t>
             </a:fld>
             <a:endParaRPr lang="en-US"/>
           </a:p>
@@ -936,7 +936,7 @@
           <a:p>
             <a:fld id="{241EB5C9-1307-BA42-ABA2-0BC069CD8E7F}" type="datetimeFigureOut">
               <a:rPr lang="en-US" smtClean="0"/>
-              <a:t>9/15/2024</a:t>
+              <a:t>9/17/2024</a:t>
             </a:fld>
             <a:endParaRPr lang="en-US"/>
           </a:p>
@@ -1114,7 +1114,7 @@
           <a:p>
             <a:fld id="{241EB5C9-1307-BA42-ABA2-0BC069CD8E7F}" type="datetimeFigureOut">
               <a:rPr lang="en-US" smtClean="0"/>
-              <a:t>9/15/2024</a:t>
+              <a:t>9/17/2024</a:t>
             </a:fld>
             <a:endParaRPr lang="en-US"/>
           </a:p>
@@ -1282,7 +1282,7 @@
           <a:p>
             <a:fld id="{241EB5C9-1307-BA42-ABA2-0BC069CD8E7F}" type="datetimeFigureOut">
               <a:rPr lang="en-US" smtClean="0"/>
-              <a:t>9/15/2024</a:t>
+              <a:t>9/17/2024</a:t>
             </a:fld>
             <a:endParaRPr lang="en-US"/>
           </a:p>
@@ -1527,7 +1527,7 @@
           <a:p>
             <a:fld id="{241EB5C9-1307-BA42-ABA2-0BC069CD8E7F}" type="datetimeFigureOut">
               <a:rPr lang="en-US" smtClean="0"/>
-              <a:t>9/15/2024</a:t>
+              <a:t>9/17/2024</a:t>
             </a:fld>
             <a:endParaRPr lang="en-US"/>
           </a:p>
@@ -1812,7 +1812,7 @@
           <a:p>
             <a:fld id="{241EB5C9-1307-BA42-ABA2-0BC069CD8E7F}" type="datetimeFigureOut">
               <a:rPr lang="en-US" smtClean="0"/>
-              <a:t>9/15/2024</a:t>
+              <a:t>9/17/2024</a:t>
             </a:fld>
             <a:endParaRPr lang="en-US"/>
           </a:p>
@@ -2231,7 +2231,7 @@
           <a:p>
             <a:fld id="{241EB5C9-1307-BA42-ABA2-0BC069CD8E7F}" type="datetimeFigureOut">
               <a:rPr lang="en-US" smtClean="0"/>
-              <a:t>9/15/2024</a:t>
+              <a:t>9/17/2024</a:t>
             </a:fld>
             <a:endParaRPr lang="en-US"/>
           </a:p>
@@ -2348,7 +2348,7 @@
           <a:p>
             <a:fld id="{241EB5C9-1307-BA42-ABA2-0BC069CD8E7F}" type="datetimeFigureOut">
               <a:rPr lang="en-US" smtClean="0"/>
-              <a:t>9/15/2024</a:t>
+              <a:t>9/17/2024</a:t>
             </a:fld>
             <a:endParaRPr lang="en-US"/>
           </a:p>
@@ -2443,7 +2443,7 @@
           <a:p>
             <a:fld id="{241EB5C9-1307-BA42-ABA2-0BC069CD8E7F}" type="datetimeFigureOut">
               <a:rPr lang="en-US" smtClean="0"/>
-              <a:t>9/15/2024</a:t>
+              <a:t>9/17/2024</a:t>
             </a:fld>
             <a:endParaRPr lang="en-US"/>
           </a:p>
@@ -2718,7 +2718,7 @@
           <a:p>
             <a:fld id="{241EB5C9-1307-BA42-ABA2-0BC069CD8E7F}" type="datetimeFigureOut">
               <a:rPr lang="en-US" smtClean="0"/>
-              <a:t>9/15/2024</a:t>
+              <a:t>9/17/2024</a:t>
             </a:fld>
             <a:endParaRPr lang="en-US"/>
           </a:p>
@@ -2970,7 +2970,7 @@
           <a:p>
             <a:fld id="{241EB5C9-1307-BA42-ABA2-0BC069CD8E7F}" type="datetimeFigureOut">
               <a:rPr lang="en-US" smtClean="0"/>
-              <a:t>9/15/2024</a:t>
+              <a:t>9/17/2024</a:t>
             </a:fld>
             <a:endParaRPr lang="en-US"/>
           </a:p>
@@ -3181,7 +3181,7 @@
           <a:p>
             <a:fld id="{241EB5C9-1307-BA42-ABA2-0BC069CD8E7F}" type="datetimeFigureOut">
               <a:rPr lang="en-US" smtClean="0"/>
-              <a:t>9/15/2024</a:t>
+              <a:t>9/17/2024</a:t>
             </a:fld>
             <a:endParaRPr lang="en-US"/>
           </a:p>
@@ -10267,8 +10267,8 @@
           </a:p>
         </p:txBody>
       </p:sp>
-      <mc:AlternateContent xmlns:mc="http://schemas.openxmlformats.org/markup-compatibility/2006" xmlns:a14="http://schemas.microsoft.com/office/drawing/2010/main">
-        <mc:Choice Requires="a14">
+      <mc:AlternateContent xmlns:mc="http://schemas.openxmlformats.org/markup-compatibility/2006">
+        <mc:Choice xmlns:a14="http://schemas.microsoft.com/office/drawing/2010/main" Requires="a14">
           <p:sp>
             <p:nvSpPr>
               <p:cNvPr id="3" name="Content Placeholder 2"/>
@@ -10279,10 +10279,15 @@
                 <p:ph idx="1"/>
               </p:nvPr>
             </p:nvSpPr>
-            <p:spPr/>
+            <p:spPr>
+              <a:xfrm>
+                <a:off x="457200" y="1200151"/>
+                <a:ext cx="8229600" cy="3705678"/>
+              </a:xfrm>
+            </p:spPr>
             <p:txBody>
               <a:bodyPr>
-                <a:normAutofit fontScale="77500" lnSpcReduction="20000"/>
+                <a:normAutofit fontScale="85000" lnSpcReduction="20000"/>
               </a:bodyPr>
               <a:lstStyle/>
               <a:p>
@@ -10553,7 +10558,7 @@
             </p:txBody>
           </p:sp>
         </mc:Choice>
-        <mc:Fallback xmlns="">
+        <mc:Fallback>
           <p:sp>
             <p:nvSpPr>
               <p:cNvPr id="3" name="Content Placeholder 2"/>
@@ -10565,10 +10570,14 @@
               </p:nvPr>
             </p:nvSpPr>
             <p:spPr>
+              <a:xfrm>
+                <a:off x="457200" y="1200151"/>
+                <a:ext cx="8229600" cy="3705678"/>
+              </a:xfrm>
               <a:blipFill>
                 <a:blip r:embed="rId2"/>
                 <a:stretch>
-                  <a:fillRect l="-667" t="-2334"/>
+                  <a:fillRect l="-741" t="-2467"/>
                 </a:stretch>
               </a:blipFill>
             </p:spPr>
@@ -10994,7 +11003,7 @@
         </p:blipFill>
         <p:spPr>
           <a:xfrm>
-            <a:off x="4111171" y="1371445"/>
+            <a:off x="4144206" y="1371445"/>
             <a:ext cx="4999794" cy="3285040"/>
           </a:xfrm>
           <a:prstGeom prst="rect">
@@ -11368,17 +11377,24 @@
         <p:spPr>
           <a:xfrm>
             <a:off x="457201" y="204787"/>
-            <a:ext cx="3008313" cy="871538"/>
+            <a:ext cx="8483599" cy="871538"/>
           </a:xfrm>
         </p:spPr>
         <p:txBody>
-          <a:bodyPr/>
-          <a:lstStyle/>
-          <a:p>
-            <a:pPr marL="0" lvl="0" indent="0">
+          <a:bodyPr>
+            <a:normAutofit/>
+          </a:bodyPr>
+          <a:lstStyle/>
+          <a:p>
+            <a:pPr marL="0" lvl="0" indent="0" algn="ctr">
               <a:buNone/>
             </a:pPr>
             <a:r>
+              <a:rPr lang="en-US" sz="3200" b="0" dirty="0"/>
+              <a:t>Example, </a:t>
+            </a:r>
+            <a:r>
+              <a:rPr sz="3200" b="0" dirty="0"/>
               <a:t>Two Sample Bootstrap</a:t>
             </a:r>
           </a:p>
@@ -11394,25 +11410,59 @@
             <p:ph type="body" sz="half" idx="2"/>
           </p:nvPr>
         </p:nvSpPr>
-        <p:spPr/>
-        <p:txBody>
-          <a:bodyPr/>
+        <p:spPr>
+          <a:xfrm>
+            <a:off x="457201" y="1135743"/>
+            <a:ext cx="8519885" cy="1204686"/>
+          </a:xfrm>
+        </p:spPr>
+        <p:txBody>
+          <a:bodyPr>
+            <a:normAutofit/>
+          </a:bodyPr>
           <a:lstStyle/>
           <a:p>
             <a:pPr marL="0" lvl="0" indent="0">
               <a:buNone/>
             </a:pPr>
             <a:r>
-              <a:t>Example; find the bootstrap distribution of the difference in math scores between low and middle SES students.</a:t>
-            </a:r>
+              <a:rPr sz="2200" dirty="0"/>
+              <a:t>Example; find the bootstrap distribution of the difference in math scores </a:t>
+            </a:r>
+            <a:r>
+              <a:rPr lang="en-US" sz="2200" dirty="0"/>
+              <a:t>of different </a:t>
+            </a:r>
+            <a:r>
+              <a:rPr sz="2200" dirty="0"/>
+              <a:t>SES students</a:t>
+            </a:r>
+            <a:endParaRPr lang="en-US" sz="2200" dirty="0"/>
+          </a:p>
+          <a:p>
+            <a:pPr marL="342900" lvl="0" indent="-342900">
+              <a:buFont typeface="Arial" panose="020B0604020202020204" pitchFamily="34" charset="0"/>
+              <a:buChar char="•"/>
+            </a:pPr>
+            <a:r>
+              <a:rPr lang="en-US" sz="2200" dirty="0"/>
+              <a:t>Is this difference statistically significant?  </a:t>
+            </a:r>
+            <a:endParaRPr sz="2200" dirty="0"/>
           </a:p>
         </p:txBody>
       </p:sp>
       <p:pic>
         <p:nvPicPr>
-          <p:cNvPr id="3" name="Picture 1" descr="06b_IntroductionToBootstrap_files/figure-pptx/unnamed-chunk-6-7.png"/>
+          <p:cNvPr id="6" name="Picture 5">
+            <a:extLst>
+              <a:ext uri="{FF2B5EF4-FFF2-40B4-BE49-F238E27FC236}">
+                <a16:creationId xmlns:a16="http://schemas.microsoft.com/office/drawing/2014/main" id="{0431D218-1BBF-B9AB-8E37-64ADD45DF1F7}"/>
+              </a:ext>
+            </a:extLst>
+          </p:cNvPr>
           <p:cNvPicPr>
-            <a:picLocks noGrp="1" noChangeAspect="1"/>
+            <a:picLocks noChangeAspect="1"/>
           </p:cNvPicPr>
           <p:nvPr/>
         </p:nvPicPr>
@@ -11422,20 +11472,14 @@
             <a:fillRect/>
           </a:stretch>
         </p:blipFill>
-        <p:spPr bwMode="auto">
+        <p:spPr>
           <a:xfrm>
-            <a:off x="5183413" y="598714"/>
-            <a:ext cx="3289300" cy="4381500"/>
+            <a:off x="682171" y="2495550"/>
+            <a:ext cx="7779657" cy="2500177"/>
           </a:xfrm>
           <a:prstGeom prst="rect">
             <a:avLst/>
           </a:prstGeom>
-          <a:noFill/>
-          <a:ln w="9525">
-            <a:noFill/>
-            <a:headEnd/>
-            <a:tailEnd/>
-          </a:ln>
         </p:spPr>
       </p:pic>
     </p:spTree>
@@ -11482,6 +11526,7 @@
               <a:buNone/>
             </a:pPr>
             <a:r>
+              <a:rPr dirty="0"/>
               <a:t>Example, Two Sample Bootstrap</a:t>
             </a:r>
           </a:p>
@@ -11497,10 +11542,15 @@
             <p:ph idx="1"/>
           </p:nvPr>
         </p:nvSpPr>
-        <p:spPr/>
+        <p:spPr>
+          <a:xfrm>
+            <a:off x="457200" y="932542"/>
+            <a:ext cx="8229600" cy="4172857"/>
+          </a:xfrm>
+        </p:spPr>
         <p:txBody>
           <a:bodyPr>
-            <a:normAutofit fontScale="40000" lnSpcReduction="20000"/>
+            <a:noAutofit/>
           </a:bodyPr>
           <a:lstStyle/>
           <a:p>
@@ -11508,7 +11558,7 @@
               <a:buNone/>
             </a:pPr>
             <a:r>
-              <a:rPr b="1">
+              <a:rPr sz="1100" b="1" dirty="0">
                 <a:solidFill>
                   <a:srgbClr val="007020"/>
                 </a:solidFill>
@@ -11517,20 +11567,46 @@
               <a:t>def</a:t>
             </a:r>
             <a:r>
-              <a:rPr>
-                <a:latin typeface="Courier"/>
-              </a:rPr>
-              <a:t> two_boot_two_stat(sample_1, sample_2, b, statistic_1, two_samp_statistic):</a:t>
-            </a:r>
-            <a:br/>
-            <a:r>
-              <a:rPr>
+              <a:rPr sz="1100" dirty="0">
+                <a:latin typeface="Courier"/>
+              </a:rPr>
+              <a:t> </a:t>
+            </a:r>
+            <a:r>
+              <a:rPr sz="1100" dirty="0" err="1">
+                <a:latin typeface="Courier"/>
+              </a:rPr>
+              <a:t>two_boot_two_stat</a:t>
+            </a:r>
+            <a:r>
+              <a:rPr sz="1100" dirty="0">
+                <a:latin typeface="Courier"/>
+              </a:rPr>
+              <a:t>(sample_1, sample_2, b, statistic_1, </a:t>
+            </a:r>
+            <a:r>
+              <a:rPr sz="1100" dirty="0" err="1">
+                <a:latin typeface="Courier"/>
+              </a:rPr>
+              <a:t>two_samp_statistic</a:t>
+            </a:r>
+            <a:r>
+              <a:rPr sz="1100" dirty="0">
+                <a:latin typeface="Courier"/>
+              </a:rPr>
+              <a:t>):</a:t>
+            </a:r>
+            <a:br>
+              <a:rPr sz="1100" dirty="0"/>
+            </a:br>
+            <a:r>
+              <a:rPr sz="1100" dirty="0">
                 <a:latin typeface="Courier"/>
               </a:rPr>
               <a:t>    </a:t>
             </a:r>
             <a:r>
-              <a:rPr i="1">
+              <a:rPr sz="1100" i="1" dirty="0">
                 <a:solidFill>
                   <a:srgbClr val="60A0B0"/>
                 </a:solidFill>
@@ -11538,9 +11614,11 @@
               </a:rPr>
               <a:t>'''</a:t>
             </a:r>
-            <a:br/>
-            <a:r>
-              <a:rPr i="1">
+            <a:br>
+              <a:rPr sz="1100" dirty="0"/>
+            </a:br>
+            <a:r>
+              <a:rPr sz="1100" i="1" dirty="0">
                 <a:solidFill>
                   <a:srgbClr val="60A0B0"/>
                 </a:solidFill>
@@ -11548,65 +11626,125 @@
               </a:rPr>
               <a:t>    Function computes two sample and two statistic bootstrap estimate.   </a:t>
             </a:r>
-            <a:br/>
-            <a:r>
-              <a:rPr i="1">
+            <a:br>
+              <a:rPr sz="1100" dirty="0"/>
+            </a:br>
+            <a:r>
+              <a:rPr sz="1100" i="1" dirty="0">
                 <a:solidFill>
                   <a:srgbClr val="60A0B0"/>
                 </a:solidFill>
                 <a:latin typeface="Courier"/>
               </a:rPr>
-              <a:t>    - sample_1 and sample_2, independent obervation vectors   </a:t>
-            </a:r>
-            <a:br/>
-            <a:r>
-              <a:rPr i="1">
+              <a:t>    - sample_1 and sample_2, independent </a:t>
+            </a:r>
+            <a:r>
+              <a:rPr sz="1100" i="1" dirty="0" err="1">
                 <a:solidFill>
                   <a:srgbClr val="60A0B0"/>
                 </a:solidFill>
                 <a:latin typeface="Courier"/>
               </a:rPr>
-              <a:t>    - b, number of bootstrap samples to compute</a:t>
-            </a:r>
-            <a:br/>
-            <a:r>
-              <a:rPr i="1">
+              <a:t>obervation</a:t>
+            </a:r>
+            <a:r>
+              <a:rPr sz="1100" i="1" dirty="0">
                 <a:solidFill>
                   <a:srgbClr val="60A0B0"/>
                 </a:solidFill>
                 <a:latin typeface="Courier"/>
               </a:rPr>
-              <a:t>    - statistic 1, statistic applied to the two independent bootstrap samples</a:t>
-            </a:r>
-            <a:br/>
-            <a:r>
-              <a:rPr i="1">
+              <a:t> vectors   </a:t>
+            </a:r>
+            <a:br>
+              <a:rPr sz="1100" dirty="0"/>
+            </a:br>
+            <a:r>
+              <a:rPr sz="1100" i="1" dirty="0">
                 <a:solidFill>
                   <a:srgbClr val="60A0B0"/>
                 </a:solidFill>
                 <a:latin typeface="Courier"/>
               </a:rPr>
-              <a:t>    - two_sample_statistic, statistic applied to the independent bootstrap statistics</a:t>
-            </a:r>
-            <a:br/>
-            <a:r>
-              <a:rPr i="1">
+              <a:t>    - b, number of bootstrap samples to compute</a:t>
+            </a:r>
+            <a:br>
+              <a:rPr sz="1100" dirty="0"/>
+            </a:br>
+            <a:r>
+              <a:rPr sz="1100" i="1" dirty="0">
                 <a:solidFill>
                   <a:srgbClr val="60A0B0"/>
                 </a:solidFill>
                 <a:latin typeface="Courier"/>
               </a:rPr>
+              <a:t>    - statistic 1, statistic applied to the two independent bootstrap samples</a:t>
+            </a:r>
+            <a:br>
+              <a:rPr sz="1100" dirty="0"/>
+            </a:br>
+            <a:r>
+              <a:rPr sz="1100" i="1" dirty="0">
+                <a:solidFill>
+                  <a:srgbClr val="60A0B0"/>
+                </a:solidFill>
+                <a:latin typeface="Courier"/>
+              </a:rPr>
+              <a:t>    - </a:t>
+            </a:r>
+            <a:r>
+              <a:rPr sz="1100" i="1" dirty="0" err="1">
+                <a:solidFill>
+                  <a:srgbClr val="60A0B0"/>
+                </a:solidFill>
+                <a:latin typeface="Courier"/>
+              </a:rPr>
+              <a:t>two_sample_statistic</a:t>
+            </a:r>
+            <a:r>
+              <a:rPr sz="1100" i="1" dirty="0">
+                <a:solidFill>
+                  <a:srgbClr val="60A0B0"/>
+                </a:solidFill>
+                <a:latin typeface="Courier"/>
+              </a:rPr>
+              <a:t>, statistic applied to the independent bootstrap statistics</a:t>
+            </a:r>
+            <a:br>
+              <a:rPr sz="1100" dirty="0"/>
+            </a:br>
+            <a:r>
+              <a:rPr sz="1100" i="1" dirty="0">
+                <a:solidFill>
+                  <a:srgbClr val="60A0B0"/>
+                </a:solidFill>
+                <a:latin typeface="Courier"/>
+              </a:rPr>
               <a:t>    '''</a:t>
             </a:r>
-            <a:br/>
-            <a:r>
-              <a:rPr>
-                <a:latin typeface="Courier"/>
-              </a:rPr>
-              <a:t>    two_boot_values </a:t>
-            </a:r>
-            <a:r>
-              <a:rPr>
+            <a:br>
+              <a:rPr sz="1100" dirty="0"/>
+            </a:br>
+            <a:r>
+              <a:rPr sz="1100" dirty="0">
+                <a:latin typeface="Courier"/>
+              </a:rPr>
+              <a:t>    </a:t>
+            </a:r>
+            <a:r>
+              <a:rPr sz="1100" dirty="0" err="1">
+                <a:latin typeface="Courier"/>
+              </a:rPr>
+              <a:t>two_boot_values</a:t>
+            </a:r>
+            <a:r>
+              <a:rPr sz="1100" dirty="0">
+                <a:latin typeface="Courier"/>
+              </a:rPr>
+              <a:t> </a:t>
+            </a:r>
+            <a:r>
+              <a:rPr sz="1100" dirty="0">
                 <a:solidFill>
                   <a:srgbClr val="666666"/>
                 </a:solidFill>
@@ -11615,20 +11753,22 @@
               <a:t>=</a:t>
             </a:r>
             <a:r>
-              <a:rPr>
+              <a:rPr sz="1100" dirty="0">
                 <a:latin typeface="Courier"/>
               </a:rPr>
               <a:t> []</a:t>
             </a:r>
-            <a:br/>
-            <a:r>
-              <a:rPr>
+            <a:br>
+              <a:rPr sz="1100" dirty="0"/>
+            </a:br>
+            <a:r>
+              <a:rPr sz="1100" dirty="0">
                 <a:latin typeface="Courier"/>
               </a:rPr>
               <a:t>    n_samps_1 </a:t>
             </a:r>
             <a:r>
-              <a:rPr>
+              <a:rPr sz="1100" dirty="0">
                 <a:solidFill>
                   <a:srgbClr val="666666"/>
                 </a:solidFill>
@@ -11637,13 +11777,13 @@
               <a:t>=</a:t>
             </a:r>
             <a:r>
-              <a:rPr>
+              <a:rPr sz="1100" dirty="0">
                 <a:latin typeface="Courier"/>
               </a:rPr>
               <a:t> </a:t>
             </a:r>
             <a:r>
-              <a:rPr>
+              <a:rPr sz="1100" dirty="0" err="1">
                 <a:solidFill>
                   <a:srgbClr val="008000"/>
                 </a:solidFill>
@@ -11652,20 +11792,22 @@
               <a:t>len</a:t>
             </a:r>
             <a:r>
-              <a:rPr>
+              <a:rPr sz="1100" dirty="0">
                 <a:latin typeface="Courier"/>
               </a:rPr>
               <a:t>(sample_1)</a:t>
             </a:r>
-            <a:br/>
-            <a:r>
-              <a:rPr>
+            <a:br>
+              <a:rPr sz="1100" dirty="0"/>
+            </a:br>
+            <a:r>
+              <a:rPr sz="1100" dirty="0">
                 <a:latin typeface="Courier"/>
               </a:rPr>
               <a:t>    n_samps_2 </a:t>
             </a:r>
             <a:r>
-              <a:rPr>
+              <a:rPr sz="1100" dirty="0">
                 <a:solidFill>
                   <a:srgbClr val="666666"/>
                 </a:solidFill>
@@ -11674,13 +11816,13 @@
               <a:t>=</a:t>
             </a:r>
             <a:r>
-              <a:rPr>
+              <a:rPr sz="1100" dirty="0">
                 <a:latin typeface="Courier"/>
               </a:rPr>
               <a:t> </a:t>
             </a:r>
             <a:r>
-              <a:rPr>
+              <a:rPr sz="1100" dirty="0" err="1">
                 <a:solidFill>
                   <a:srgbClr val="008000"/>
                 </a:solidFill>
@@ -11689,20 +11831,22 @@
               <a:t>len</a:t>
             </a:r>
             <a:r>
-              <a:rPr>
+              <a:rPr sz="1100" dirty="0">
                 <a:latin typeface="Courier"/>
               </a:rPr>
               <a:t>(sample_2)</a:t>
             </a:r>
-            <a:br/>
-            <a:r>
-              <a:rPr>
+            <a:br>
+              <a:rPr sz="1100" dirty="0"/>
+            </a:br>
+            <a:r>
+              <a:rPr sz="1100" dirty="0">
                 <a:latin typeface="Courier"/>
               </a:rPr>
               <a:t>    </a:t>
             </a:r>
             <a:r>
-              <a:rPr b="1">
+              <a:rPr sz="1100" b="1" dirty="0">
                 <a:solidFill>
                   <a:srgbClr val="007020"/>
                 </a:solidFill>
@@ -11711,13 +11855,13 @@
               <a:t>for</a:t>
             </a:r>
             <a:r>
-              <a:rPr>
+              <a:rPr sz="1100" dirty="0">
                 <a:latin typeface="Courier"/>
               </a:rPr>
               <a:t> _ </a:t>
             </a:r>
             <a:r>
-              <a:rPr b="1">
+              <a:rPr sz="1100" b="1" dirty="0">
                 <a:solidFill>
                   <a:srgbClr val="007020"/>
                 </a:solidFill>
@@ -11726,13 +11870,13 @@
               <a:t>in</a:t>
             </a:r>
             <a:r>
-              <a:rPr>
+              <a:rPr sz="1100" dirty="0">
                 <a:latin typeface="Courier"/>
               </a:rPr>
               <a:t> </a:t>
             </a:r>
             <a:r>
-              <a:rPr>
+              <a:rPr sz="1100" dirty="0">
                 <a:solidFill>
                   <a:srgbClr val="008000"/>
                 </a:solidFill>
@@ -11741,68 +11885,94 @@
               <a:t>range</a:t>
             </a:r>
             <a:r>
-              <a:rPr>
+              <a:rPr sz="1100" dirty="0">
                 <a:latin typeface="Courier"/>
               </a:rPr>
               <a:t>(b):  </a:t>
             </a:r>
-            <a:br/>
-            <a:r>
-              <a:rPr>
+            <a:br>
+              <a:rPr sz="1100" dirty="0"/>
+            </a:br>
+            <a:r>
+              <a:rPr sz="1100" dirty="0">
                 <a:latin typeface="Courier"/>
               </a:rPr>
               <a:t>        </a:t>
             </a:r>
             <a:r>
-              <a:rPr i="1">
+              <a:rPr sz="1100" i="1" dirty="0">
                 <a:solidFill>
                   <a:srgbClr val="60A0B0"/>
                 </a:solidFill>
                 <a:latin typeface="Courier"/>
               </a:rPr>
-              <a:t>## Heavy lisfting is done here. First, the two independent bootstrap estimates</a:t>
-            </a:r>
-            <a:br/>
-            <a:r>
-              <a:rPr>
-                <a:latin typeface="Courier"/>
-              </a:rPr>
-              <a:t>        </a:t>
-            </a:r>
-            <a:r>
-              <a:rPr i="1">
+              <a:t>## Heavy </a:t>
+            </a:r>
+            <a:r>
+              <a:rPr sz="1100" i="1" dirty="0" err="1">
                 <a:solidFill>
                   <a:srgbClr val="60A0B0"/>
                 </a:solidFill>
                 <a:latin typeface="Courier"/>
               </a:rPr>
-              <a:t>## are computed from independent bootstrap resamples. Second, the statistic </a:t>
-            </a:r>
-            <a:br/>
-            <a:r>
-              <a:rPr>
-                <a:latin typeface="Courier"/>
-              </a:rPr>
-              <a:t>        </a:t>
-            </a:r>
-            <a:r>
-              <a:rPr i="1">
+              <a:t>lisfting</a:t>
+            </a:r>
+            <a:r>
+              <a:rPr sz="1100" i="1" dirty="0">
                 <a:solidFill>
                   <a:srgbClr val="60A0B0"/>
                 </a:solidFill>
                 <a:latin typeface="Courier"/>
               </a:rPr>
+              <a:t> is done here. First, the two independent bootstrap estimates</a:t>
+            </a:r>
+            <a:br>
+              <a:rPr sz="1100" dirty="0"/>
+            </a:br>
+            <a:r>
+              <a:rPr sz="1100" dirty="0">
+                <a:latin typeface="Courier"/>
+              </a:rPr>
+              <a:t>        </a:t>
+            </a:r>
+            <a:r>
+              <a:rPr sz="1100" i="1" dirty="0">
+                <a:solidFill>
+                  <a:srgbClr val="60A0B0"/>
+                </a:solidFill>
+                <a:latin typeface="Courier"/>
+              </a:rPr>
+              <a:t>## are computed from independent bootstrap resamples. Second, the statistic </a:t>
+            </a:r>
+            <a:br>
+              <a:rPr sz="1100" dirty="0"/>
+            </a:br>
+            <a:r>
+              <a:rPr sz="1100" dirty="0">
+                <a:latin typeface="Courier"/>
+              </a:rPr>
+              <a:t>        </a:t>
+            </a:r>
+            <a:r>
+              <a:rPr sz="1100" i="1" dirty="0">
+                <a:solidFill>
+                  <a:srgbClr val="60A0B0"/>
+                </a:solidFill>
+                <a:latin typeface="Courier"/>
+              </a:rPr>
               <a:t>## of the two bootstrap estimates is computed.  </a:t>
             </a:r>
-            <a:br/>
-            <a:r>
-              <a:rPr>
+            <a:br>
+              <a:rPr sz="1100" dirty="0"/>
+            </a:br>
+            <a:r>
+              <a:rPr sz="1100" dirty="0">
                 <a:latin typeface="Courier"/>
               </a:rPr>
               <a:t>        boot_estimate_1 </a:t>
             </a:r>
             <a:r>
-              <a:rPr>
+              <a:rPr sz="1100" dirty="0">
                 <a:solidFill>
                   <a:srgbClr val="666666"/>
                 </a:solidFill>
@@ -11811,13 +11981,25 @@
               <a:t>=</a:t>
             </a:r>
             <a:r>
-              <a:rPr>
-                <a:latin typeface="Courier"/>
-              </a:rPr>
-              <a:t> statistic_1(nr.choice(sample_1, size</a:t>
-            </a:r>
-            <a:r>
-              <a:rPr>
+              <a:rPr sz="1100" dirty="0">
+                <a:latin typeface="Courier"/>
+              </a:rPr>
+              <a:t> statistic_1(</a:t>
+            </a:r>
+            <a:r>
+              <a:rPr sz="1100" dirty="0" err="1">
+                <a:latin typeface="Courier"/>
+              </a:rPr>
+              <a:t>nr.choice</a:t>
+            </a:r>
+            <a:r>
+              <a:rPr sz="1100" dirty="0">
+                <a:latin typeface="Courier"/>
+              </a:rPr>
+              <a:t>(sample_1, size</a:t>
+            </a:r>
+            <a:r>
+              <a:rPr sz="1100" dirty="0">
                 <a:solidFill>
                   <a:srgbClr val="666666"/>
                 </a:solidFill>
@@ -11826,13 +12008,13 @@
               <a:t>=</a:t>
             </a:r>
             <a:r>
-              <a:rPr>
+              <a:rPr sz="1100" dirty="0">
                 <a:latin typeface="Courier"/>
               </a:rPr>
               <a:t>n_samps_1, replace</a:t>
             </a:r>
             <a:r>
-              <a:rPr>
+              <a:rPr sz="1100" dirty="0">
                 <a:solidFill>
                   <a:srgbClr val="666666"/>
                 </a:solidFill>
@@ -11841,7 +12023,7 @@
               <a:t>=</a:t>
             </a:r>
             <a:r>
-              <a:rPr>
+              <a:rPr sz="1100" dirty="0">
                 <a:solidFill>
                   <a:srgbClr val="19177C"/>
                 </a:solidFill>
@@ -11850,20 +12032,22 @@
               <a:t>True</a:t>
             </a:r>
             <a:r>
-              <a:rPr>
+              <a:rPr sz="1100" dirty="0">
                 <a:latin typeface="Courier"/>
               </a:rPr>
               <a:t>))</a:t>
             </a:r>
-            <a:br/>
-            <a:r>
-              <a:rPr>
+            <a:br>
+              <a:rPr sz="1100" dirty="0"/>
+            </a:br>
+            <a:r>
+              <a:rPr sz="1100" dirty="0">
                 <a:latin typeface="Courier"/>
               </a:rPr>
               <a:t>        boot_estimate_2 </a:t>
             </a:r>
             <a:r>
-              <a:rPr>
+              <a:rPr sz="1100" dirty="0">
                 <a:solidFill>
                   <a:srgbClr val="666666"/>
                 </a:solidFill>
@@ -11872,13 +12056,25 @@
               <a:t>=</a:t>
             </a:r>
             <a:r>
-              <a:rPr>
-                <a:latin typeface="Courier"/>
-              </a:rPr>
-              <a:t> statistic_1(nr.choice(sample_2, size</a:t>
-            </a:r>
-            <a:r>
-              <a:rPr>
+              <a:rPr sz="1100" dirty="0">
+                <a:latin typeface="Courier"/>
+              </a:rPr>
+              <a:t> statistic_1(</a:t>
+            </a:r>
+            <a:r>
+              <a:rPr sz="1100" dirty="0" err="1">
+                <a:latin typeface="Courier"/>
+              </a:rPr>
+              <a:t>nr.choice</a:t>
+            </a:r>
+            <a:r>
+              <a:rPr sz="1100" dirty="0">
+                <a:latin typeface="Courier"/>
+              </a:rPr>
+              <a:t>(sample_2, size</a:t>
+            </a:r>
+            <a:r>
+              <a:rPr sz="1100" dirty="0">
                 <a:solidFill>
                   <a:srgbClr val="666666"/>
                 </a:solidFill>
@@ -11887,13 +12083,13 @@
               <a:t>=</a:t>
             </a:r>
             <a:r>
-              <a:rPr>
+              <a:rPr sz="1100" dirty="0">
                 <a:latin typeface="Courier"/>
               </a:rPr>
               <a:t>n_samps_2, replace</a:t>
             </a:r>
             <a:r>
-              <a:rPr>
+              <a:rPr sz="1100" dirty="0">
                 <a:solidFill>
                   <a:srgbClr val="666666"/>
                 </a:solidFill>
@@ -11902,7 +12098,7 @@
               <a:t>=</a:t>
             </a:r>
             <a:r>
-              <a:rPr>
+              <a:rPr sz="1100" dirty="0">
                 <a:solidFill>
                   <a:srgbClr val="19177C"/>
                 </a:solidFill>
@@ -11911,27 +12107,67 @@
               <a:t>True</a:t>
             </a:r>
             <a:r>
-              <a:rPr>
+              <a:rPr sz="1100" dirty="0">
                 <a:latin typeface="Courier"/>
               </a:rPr>
               <a:t>))</a:t>
             </a:r>
-            <a:br/>
-            <a:r>
-              <a:rPr>
-                <a:latin typeface="Courier"/>
-              </a:rPr>
-              <a:t>        two_boot_values.append(two_samp_statistic(boot_estimate_1, boot_estimate_2))</a:t>
-            </a:r>
-            <a:br/>
-            <a:r>
-              <a:rPr>
-                <a:latin typeface="Courier"/>
-              </a:rPr>
-              <a:t>    boot_estimate </a:t>
-            </a:r>
-            <a:r>
-              <a:rPr>
+            <a:br>
+              <a:rPr sz="1100" dirty="0"/>
+            </a:br>
+            <a:r>
+              <a:rPr sz="1100" dirty="0">
+                <a:latin typeface="Courier"/>
+              </a:rPr>
+              <a:t>        </a:t>
+            </a:r>
+            <a:r>
+              <a:rPr sz="1100" dirty="0" err="1">
+                <a:latin typeface="Courier"/>
+              </a:rPr>
+              <a:t>two_boot_values.append</a:t>
+            </a:r>
+            <a:r>
+              <a:rPr sz="1100" dirty="0">
+                <a:latin typeface="Courier"/>
+              </a:rPr>
+              <a:t>(</a:t>
+            </a:r>
+            <a:r>
+              <a:rPr sz="1100" dirty="0" err="1">
+                <a:latin typeface="Courier"/>
+              </a:rPr>
+              <a:t>two_samp_statistic</a:t>
+            </a:r>
+            <a:r>
+              <a:rPr sz="1100" dirty="0">
+                <a:latin typeface="Courier"/>
+              </a:rPr>
+              <a:t>(boot_estimate_1, boot_estimate_2))</a:t>
+            </a:r>
+            <a:br>
+              <a:rPr sz="1100" dirty="0"/>
+            </a:br>
+            <a:r>
+              <a:rPr sz="1100" dirty="0">
+                <a:latin typeface="Courier"/>
+              </a:rPr>
+              <a:t>    </a:t>
+            </a:r>
+            <a:r>
+              <a:rPr sz="1100" dirty="0" err="1">
+                <a:latin typeface="Courier"/>
+              </a:rPr>
+              <a:t>boot_estimate</a:t>
+            </a:r>
+            <a:r>
+              <a:rPr sz="1100" dirty="0">
+                <a:latin typeface="Courier"/>
+              </a:rPr>
+              <a:t> </a:t>
+            </a:r>
+            <a:r>
+              <a:rPr sz="1100" dirty="0">
                 <a:solidFill>
                   <a:srgbClr val="666666"/>
                 </a:solidFill>
@@ -11940,20 +12176,46 @@
               <a:t>=</a:t>
             </a:r>
             <a:r>
-              <a:rPr>
-                <a:latin typeface="Courier"/>
-              </a:rPr>
-              <a:t> np.mean(two_boot_values)</a:t>
-            </a:r>
-            <a:br/>
-            <a:r>
-              <a:rPr>
+              <a:rPr sz="1100" dirty="0">
+                <a:latin typeface="Courier"/>
+              </a:rPr>
+              <a:t> </a:t>
+            </a:r>
+            <a:r>
+              <a:rPr sz="1100" dirty="0" err="1">
+                <a:latin typeface="Courier"/>
+              </a:rPr>
+              <a:t>np.mean</a:t>
+            </a:r>
+            <a:r>
+              <a:rPr sz="1100" dirty="0">
+                <a:latin typeface="Courier"/>
+              </a:rPr>
+              <a:t>(</a:t>
+            </a:r>
+            <a:r>
+              <a:rPr sz="1100" dirty="0" err="1">
+                <a:latin typeface="Courier"/>
+              </a:rPr>
+              <a:t>two_boot_values</a:t>
+            </a:r>
+            <a:r>
+              <a:rPr sz="1100" dirty="0">
+                <a:latin typeface="Courier"/>
+              </a:rPr>
+              <a:t>)</a:t>
+            </a:r>
+            <a:br>
+              <a:rPr sz="1100" dirty="0"/>
+            </a:br>
+            <a:r>
+              <a:rPr sz="1100" dirty="0">
                 <a:latin typeface="Courier"/>
               </a:rPr>
               <a:t>    </a:t>
             </a:r>
             <a:r>
-              <a:rPr>
+              <a:rPr sz="1100" dirty="0">
                 <a:solidFill>
                   <a:srgbClr val="008000"/>
                 </a:solidFill>
@@ -11962,13 +12224,13 @@
               <a:t>print</a:t>
             </a:r>
             <a:r>
-              <a:rPr>
+              <a:rPr sz="1100" dirty="0">
                 <a:latin typeface="Courier"/>
               </a:rPr>
               <a:t>(</a:t>
             </a:r>
             <a:r>
-              <a:rPr>
+              <a:rPr sz="1100" dirty="0">
                 <a:solidFill>
                   <a:srgbClr val="4070A0"/>
                 </a:solidFill>
@@ -11977,13 +12239,13 @@
               <a:t>'bootstrap point estimate = {:6.2f}'</a:t>
             </a:r>
             <a:r>
-              <a:rPr>
+              <a:rPr sz="1100" dirty="0">
                 <a:latin typeface="Courier"/>
               </a:rPr>
               <a:t>.</a:t>
             </a:r>
             <a:r>
-              <a:rPr>
+              <a:rPr sz="1100" dirty="0">
                 <a:solidFill>
                   <a:srgbClr val="008000"/>
                 </a:solidFill>
@@ -11992,20 +12254,34 @@
               <a:t>format</a:t>
             </a:r>
             <a:r>
-              <a:rPr>
-                <a:latin typeface="Courier"/>
-              </a:rPr>
-              <a:t>(boot_estimate))</a:t>
-            </a:r>
-            <a:br/>
-            <a:r>
-              <a:rPr>
+              <a:rPr sz="1100" dirty="0">
+                <a:latin typeface="Courier"/>
+              </a:rPr>
+              <a:t>(</a:t>
+            </a:r>
+            <a:r>
+              <a:rPr sz="1100" dirty="0" err="1">
+                <a:latin typeface="Courier"/>
+              </a:rPr>
+              <a:t>boot_estimate</a:t>
+            </a:r>
+            <a:r>
+              <a:rPr sz="1100" dirty="0">
+                <a:latin typeface="Courier"/>
+              </a:rPr>
+              <a:t>))</a:t>
+            </a:r>
+            <a:br>
+              <a:rPr sz="1100" dirty="0"/>
+            </a:br>
+            <a:r>
+              <a:rPr sz="1100" dirty="0">
                 <a:latin typeface="Courier"/>
               </a:rPr>
               <a:t>    </a:t>
             </a:r>
             <a:r>
-              <a:rPr b="1">
+              <a:rPr sz="1100" b="1" dirty="0">
                 <a:solidFill>
                   <a:srgbClr val="007020"/>
                 </a:solidFill>
@@ -12014,230 +12290,34 @@
               <a:t>return</a:t>
             </a:r>
             <a:r>
-              <a:rPr>
-                <a:latin typeface="Courier"/>
-              </a:rPr>
-              <a:t>(boot_estimate, two_boot_values)    </a:t>
-            </a:r>
-            <a:br/>
-            <a:br/>
-            <a:r>
-              <a:rPr>
-                <a:latin typeface="Courier"/>
-              </a:rPr>
-              <a:t>math_low_ses </a:t>
-            </a:r>
-            <a:r>
-              <a:rPr>
-                <a:solidFill>
-                  <a:srgbClr val="666666"/>
-                </a:solidFill>
-                <a:latin typeface="Courier"/>
-              </a:rPr>
-              <a:t>=</a:t>
-            </a:r>
-            <a:r>
-              <a:rPr>
-                <a:latin typeface="Courier"/>
-              </a:rPr>
-              <a:t> test_scores.loc[test_scores.loc[:,</a:t>
-            </a:r>
-            <a:r>
-              <a:rPr>
-                <a:solidFill>
-                  <a:srgbClr val="4070A0"/>
-                </a:solidFill>
-                <a:latin typeface="Courier"/>
-              </a:rPr>
-              <a:t>'ses'</a:t>
-            </a:r>
-            <a:r>
-              <a:rPr>
-                <a:latin typeface="Courier"/>
-              </a:rPr>
-              <a:t>]</a:t>
-            </a:r>
-            <a:r>
-              <a:rPr>
-                <a:solidFill>
-                  <a:srgbClr val="666666"/>
-                </a:solidFill>
-                <a:latin typeface="Courier"/>
-              </a:rPr>
-              <a:t>==</a:t>
-            </a:r>
-            <a:r>
-              <a:rPr>
-                <a:solidFill>
-                  <a:srgbClr val="40A070"/>
-                </a:solidFill>
-                <a:latin typeface="Courier"/>
-              </a:rPr>
-              <a:t>1</a:t>
-            </a:r>
-            <a:r>
-              <a:rPr>
-                <a:latin typeface="Courier"/>
-              </a:rPr>
-              <a:t>,</a:t>
-            </a:r>
-            <a:r>
-              <a:rPr>
-                <a:solidFill>
-                  <a:srgbClr val="4070A0"/>
-                </a:solidFill>
-                <a:latin typeface="Courier"/>
-              </a:rPr>
-              <a:t>'math'</a:t>
-            </a:r>
-            <a:r>
-              <a:rPr>
-                <a:latin typeface="Courier"/>
-              </a:rPr>
-              <a:t>] </a:t>
-            </a:r>
-            <a:br/>
-            <a:r>
-              <a:rPr>
-                <a:latin typeface="Courier"/>
-              </a:rPr>
-              <a:t>math_mid_ses </a:t>
-            </a:r>
-            <a:r>
-              <a:rPr>
-                <a:solidFill>
-                  <a:srgbClr val="666666"/>
-                </a:solidFill>
-                <a:latin typeface="Courier"/>
-              </a:rPr>
-              <a:t>=</a:t>
-            </a:r>
-            <a:r>
-              <a:rPr>
-                <a:latin typeface="Courier"/>
-              </a:rPr>
-              <a:t> test_scores.loc[test_scores.loc[:,</a:t>
-            </a:r>
-            <a:r>
-              <a:rPr>
-                <a:solidFill>
-                  <a:srgbClr val="4070A0"/>
-                </a:solidFill>
-                <a:latin typeface="Courier"/>
-              </a:rPr>
-              <a:t>'ses'</a:t>
-            </a:r>
-            <a:r>
-              <a:rPr>
-                <a:latin typeface="Courier"/>
-              </a:rPr>
-              <a:t>]</a:t>
-            </a:r>
-            <a:r>
-              <a:rPr>
-                <a:solidFill>
-                  <a:srgbClr val="666666"/>
-                </a:solidFill>
-                <a:latin typeface="Courier"/>
-              </a:rPr>
-              <a:t>==</a:t>
-            </a:r>
-            <a:r>
-              <a:rPr>
-                <a:solidFill>
-                  <a:srgbClr val="40A070"/>
-                </a:solidFill>
-                <a:latin typeface="Courier"/>
-              </a:rPr>
-              <a:t>2</a:t>
-            </a:r>
-            <a:r>
-              <a:rPr>
-                <a:latin typeface="Courier"/>
-              </a:rPr>
-              <a:t>,</a:t>
-            </a:r>
-            <a:r>
-              <a:rPr>
-                <a:solidFill>
-                  <a:srgbClr val="4070A0"/>
-                </a:solidFill>
-                <a:latin typeface="Courier"/>
-              </a:rPr>
-              <a:t>'math'</a:t>
-            </a:r>
-            <a:r>
-              <a:rPr>
-                <a:latin typeface="Courier"/>
-              </a:rPr>
-              <a:t>]</a:t>
-            </a:r>
-            <a:br/>
-            <a:r>
-              <a:rPr>
-                <a:latin typeface="Courier"/>
-              </a:rPr>
-              <a:t>bootstrap_diff_of_mean, boot_diffs </a:t>
-            </a:r>
-            <a:r>
-              <a:rPr>
-                <a:solidFill>
-                  <a:srgbClr val="666666"/>
-                </a:solidFill>
-                <a:latin typeface="Courier"/>
-              </a:rPr>
-              <a:t>=</a:t>
-            </a:r>
-            <a:r>
-              <a:rPr>
-                <a:latin typeface="Courier"/>
-              </a:rPr>
-              <a:t> two_boot_two_stat(math_low_ses, math_mid_ses, </a:t>
-            </a:r>
-            <a:r>
-              <a:rPr>
-                <a:solidFill>
-                  <a:srgbClr val="40A070"/>
-                </a:solidFill>
-                <a:latin typeface="Courier"/>
-              </a:rPr>
-              <a:t>2000</a:t>
-            </a:r>
-            <a:r>
-              <a:rPr>
-                <a:latin typeface="Courier"/>
-              </a:rPr>
-              <a:t>, np.mean, </a:t>
-            </a:r>
-            <a:r>
-              <a:rPr b="1">
-                <a:solidFill>
-                  <a:srgbClr val="007020"/>
-                </a:solidFill>
-                <a:latin typeface="Courier"/>
-              </a:rPr>
-              <a:t>lambda</a:t>
-            </a:r>
-            <a:r>
-              <a:rPr>
-                <a:latin typeface="Courier"/>
-              </a:rPr>
-              <a:t> x,y: x</a:t>
-            </a:r>
-            <a:r>
-              <a:rPr>
-                <a:solidFill>
-                  <a:srgbClr val="666666"/>
-                </a:solidFill>
-                <a:latin typeface="Courier"/>
-              </a:rPr>
-              <a:t>-</a:t>
-            </a:r>
-            <a:r>
-              <a:rPr>
-                <a:latin typeface="Courier"/>
-              </a:rPr>
-              <a:t>y)</a:t>
+              <a:rPr sz="1100" dirty="0">
+                <a:latin typeface="Courier"/>
+              </a:rPr>
+              <a:t>(</a:t>
+            </a:r>
+            <a:r>
+              <a:rPr sz="1100" dirty="0" err="1">
+                <a:latin typeface="Courier"/>
+              </a:rPr>
+              <a:t>boot_estimate</a:t>
+            </a:r>
+            <a:r>
+              <a:rPr sz="1100" dirty="0">
+                <a:latin typeface="Courier"/>
+              </a:rPr>
+              <a:t>, </a:t>
+            </a:r>
+            <a:r>
+              <a:rPr sz="1100" dirty="0" err="1">
+                <a:latin typeface="Courier"/>
+              </a:rPr>
+              <a:t>two_boot_values</a:t>
+            </a:r>
+            <a:r>
+              <a:rPr sz="1100" dirty="0">
+                <a:latin typeface="Courier"/>
+              </a:rPr>
+              <a:t>)    </a:t>
             </a:r>
           </a:p>
         </p:txBody>
@@ -12280,17 +12360,20 @@
         <p:spPr>
           <a:xfrm>
             <a:off x="457201" y="204787"/>
-            <a:ext cx="3008313" cy="871538"/>
+            <a:ext cx="8258628" cy="510042"/>
           </a:xfrm>
         </p:spPr>
         <p:txBody>
-          <a:bodyPr/>
-          <a:lstStyle/>
-          <a:p>
-            <a:pPr marL="0" lvl="0" indent="0">
+          <a:bodyPr>
+            <a:noAutofit/>
+          </a:bodyPr>
+          <a:lstStyle/>
+          <a:p>
+            <a:pPr marL="0" lvl="0" indent="0" algn="ctr">
               <a:buNone/>
             </a:pPr>
             <a:r>
+              <a:rPr sz="3300" b="0" dirty="0"/>
               <a:t>Example, Two Sample Bootstrap</a:t>
             </a:r>
           </a:p>
@@ -12306,47 +12389,116 @@
             <p:ph type="body" sz="half" idx="2"/>
           </p:nvPr>
         </p:nvSpPr>
-        <p:spPr/>
-        <p:txBody>
-          <a:bodyPr/>
+        <p:spPr>
+          <a:xfrm>
+            <a:off x="457202" y="1076326"/>
+            <a:ext cx="5439228" cy="3518297"/>
+          </a:xfrm>
+        </p:spPr>
+        <p:txBody>
+          <a:bodyPr>
+            <a:noAutofit/>
+          </a:bodyPr>
           <a:lstStyle/>
           <a:p>
             <a:pPr marL="0" lvl="0" indent="0">
               <a:buNone/>
             </a:pPr>
             <a:r>
-              <a:t>Compute and display the bootstrap distribution of the difference of student scores</a:t>
-            </a:r>
+              <a:rPr sz="2000" dirty="0"/>
+              <a:t>Compute and display the bootstrap distribution of the difference </a:t>
+            </a:r>
+            <a:r>
+              <a:rPr lang="en-US" sz="2000" dirty="0"/>
+              <a:t>of means</a:t>
+            </a:r>
+          </a:p>
+          <a:p>
+            <a:pPr marL="285750" lvl="0" indent="-285750">
+              <a:buFont typeface="Arial" panose="020B0604020202020204" pitchFamily="34" charset="0"/>
+              <a:buChar char="•"/>
+            </a:pPr>
+            <a:r>
+              <a:rPr lang="en-US" sz="2000" dirty="0"/>
+              <a:t>Test significance of Math scores for low and medium SES students</a:t>
+            </a:r>
+          </a:p>
+          <a:p>
+            <a:pPr marL="285750" lvl="0" indent="-285750">
+              <a:buFont typeface="Arial" panose="020B0604020202020204" pitchFamily="34" charset="0"/>
+              <a:buChar char="•"/>
+            </a:pPr>
+            <a:r>
+              <a:rPr lang="en-US" sz="2000" dirty="0"/>
+              <a:t>10000 bootstrap samples of difference of means</a:t>
+            </a:r>
+            <a:endParaRPr sz="2000" dirty="0"/>
           </a:p>
           <a:p>
             <a:pPr lvl="0" indent="0">
               <a:buNone/>
             </a:pPr>
             <a:r>
-              <a:rPr>
-                <a:latin typeface="Courier"/>
-              </a:rPr>
-              <a:t>## bootstrap point estimate =  -3.03</a:t>
-            </a:r>
+              <a:rPr sz="2000" dirty="0">
+                <a:latin typeface="Courier"/>
+              </a:rPr>
+              <a:t>## bootstrap point estimate =  -3.0</a:t>
+            </a:r>
+            <a:r>
+              <a:rPr lang="en-US" sz="2000" dirty="0">
+                <a:latin typeface="Courier"/>
+              </a:rPr>
+              <a:t>1</a:t>
+            </a:r>
+            <a:endParaRPr sz="2000" dirty="0">
+              <a:latin typeface="Courier"/>
+            </a:endParaRPr>
           </a:p>
           <a:p>
             <a:pPr lvl="0" indent="0">
               <a:buNone/>
             </a:pPr>
             <a:r>
-              <a:rPr>
-                <a:latin typeface="Courier"/>
-              </a:rPr>
-              <a:t>## At alpha = 0.05, lower and upper bootstrap confidence intervals =  -6.19     0.30</a:t>
-            </a:r>
+              <a:rPr sz="2000" dirty="0">
+                <a:latin typeface="Courier"/>
+              </a:rPr>
+              <a:t>## At alpha = 0.05, lower and upper bootstrap confidence intervals =  -6.</a:t>
+            </a:r>
+            <a:r>
+              <a:rPr lang="en-US" sz="2000" dirty="0">
+                <a:latin typeface="Courier"/>
+              </a:rPr>
+              <a:t>08</a:t>
+            </a:r>
+            <a:r>
+              <a:rPr sz="2000" dirty="0">
+                <a:latin typeface="Courier"/>
+              </a:rPr>
+              <a:t>     0.</a:t>
+            </a:r>
+            <a:r>
+              <a:rPr lang="en-US" sz="2000" dirty="0">
+                <a:latin typeface="Courier"/>
+              </a:rPr>
+              <a:t>18</a:t>
+            </a:r>
+            <a:endParaRPr sz="2000" dirty="0">
+              <a:latin typeface="Courier"/>
+            </a:endParaRPr>
           </a:p>
         </p:txBody>
       </p:sp>
       <p:pic>
         <p:nvPicPr>
-          <p:cNvPr id="3" name="Picture 1" descr="06b_IntroductionToBootstrap_files/figure-pptx/unnamed-chunk-8-9.png"/>
+          <p:cNvPr id="6" name="Picture 5">
+            <a:extLst>
+              <a:ext uri="{FF2B5EF4-FFF2-40B4-BE49-F238E27FC236}">
+                <a16:creationId xmlns:a16="http://schemas.microsoft.com/office/drawing/2014/main" id="{EBC90591-F254-F8B0-D316-053670C8034F}"/>
+              </a:ext>
+            </a:extLst>
+          </p:cNvPr>
           <p:cNvPicPr>
-            <a:picLocks noGrp="1" noChangeAspect="1"/>
+            <a:picLocks noChangeAspect="1"/>
           </p:cNvPicPr>
           <p:nvPr/>
         </p:nvPicPr>
@@ -12356,20 +12508,14 @@
             <a:fillRect/>
           </a:stretch>
         </p:blipFill>
-        <p:spPr bwMode="auto">
+        <p:spPr>
           <a:xfrm>
-            <a:off x="3568700" y="571500"/>
-            <a:ext cx="5105400" cy="3644900"/>
+            <a:off x="6273036" y="841829"/>
+            <a:ext cx="2831050" cy="4276271"/>
           </a:xfrm>
           <a:prstGeom prst="rect">
             <a:avLst/>
           </a:prstGeom>
-          <a:noFill/>
-          <a:ln w="9525">
-            <a:noFill/>
-            <a:headEnd/>
-            <a:tailEnd/>
-          </a:ln>
         </p:spPr>
       </p:pic>
     </p:spTree>
@@ -12431,10 +12577,15 @@
             <p:ph idx="1"/>
           </p:nvPr>
         </p:nvSpPr>
-        <p:spPr/>
+        <p:spPr>
+          <a:xfrm>
+            <a:off x="457200" y="1063229"/>
+            <a:ext cx="8229600" cy="3643028"/>
+          </a:xfrm>
+        </p:spPr>
         <p:txBody>
           <a:bodyPr>
-            <a:normAutofit fontScale="85000" lnSpcReduction="10000"/>
+            <a:normAutofit fontScale="92500" lnSpcReduction="20000"/>
           </a:bodyPr>
           <a:lstStyle/>
           <a:p>
@@ -12442,56 +12593,82 @@
               <a:buNone/>
             </a:pPr>
             <a:r>
+              <a:rPr dirty="0"/>
               <a:t>Bootstrap estimation is widely useful and requires minimal assumption</a:t>
             </a:r>
           </a:p>
           <a:p>
             <a:pPr lvl="0"/>
             <a:r>
-              <a:t>Bootstrap distribution is comprised of values of the statistic computed from bootstrap resamples of the original observations (data sample)</a:t>
+              <a:rPr dirty="0"/>
+              <a:t>Bootstrap distribution comprise</a:t>
+            </a:r>
+            <a:r>
+              <a:rPr lang="en-US" dirty="0"/>
+              <a:t>s</a:t>
+            </a:r>
+            <a:r>
+              <a:rPr dirty="0"/>
+              <a:t> values of </a:t>
+            </a:r>
+            <a:r>
+              <a:rPr lang="en-US" dirty="0"/>
+              <a:t>a</a:t>
+            </a:r>
+            <a:r>
+              <a:rPr dirty="0"/>
+              <a:t> statistic computed from bootstrap resamples of the original observations (data sample)</a:t>
             </a:r>
           </a:p>
           <a:p>
             <a:pPr lvl="0"/>
             <a:r>
+              <a:rPr dirty="0"/>
               <a:t>Computing bootstrap distribution requires </a:t>
             </a:r>
             <a:r>
-              <a:rPr b="1"/>
+              <a:rPr b="1" dirty="0"/>
               <a:t>no assumptions about population distribution!</a:t>
             </a:r>
           </a:p>
           <a:p>
             <a:pPr lvl="1"/>
             <a:r>
+              <a:rPr dirty="0"/>
               <a:t>Bootstrap resampling substitutes computer power for paper and pencil statistician power</a:t>
             </a:r>
           </a:p>
           <a:p>
             <a:pPr lvl="0"/>
             <a:r>
+              <a:rPr dirty="0"/>
               <a:t>Bootstrap resampling estimates the </a:t>
             </a:r>
             <a:r>
-              <a:rPr b="1"/>
+              <a:rPr b="1" dirty="0"/>
               <a:t>bootstrap distribution</a:t>
             </a:r>
             <a:r>
+              <a:rPr dirty="0"/>
               <a:t> of a statistic</a:t>
             </a:r>
           </a:p>
           <a:p>
             <a:pPr lvl="1"/>
             <a:r>
-              <a:t>Compute mostly likely point estimate of the statistic, or bootstrap estimate</a:t>
-            </a:r>
-            <a:br/>
-            <a:endParaRPr/>
+              <a:rPr dirty="0"/>
+              <a:t>Compute point estimate of the statistic, or bootstrap estimate</a:t>
+            </a:r>
           </a:p>
           <a:p>
             <a:pPr lvl="1"/>
             <a:r>
-              <a:t>The bootstrap confidence interval is computed from the bootstrap distribution</a:t>
+              <a:rPr lang="en-US" dirty="0"/>
+              <a:t>Compute </a:t>
+            </a:r>
+            <a:r>
+              <a:rPr dirty="0"/>
+              <a:t>bootstrap confidence interval from the bootstrap distribution</a:t>
             </a:r>
           </a:p>
         </p:txBody>
@@ -12555,51 +12732,91 @@
             <p:ph idx="1"/>
           </p:nvPr>
         </p:nvSpPr>
-        <p:spPr/>
-        <p:txBody>
-          <a:bodyPr/>
+        <p:spPr>
+          <a:xfrm>
+            <a:off x="457200" y="1106714"/>
+            <a:ext cx="8229600" cy="3693885"/>
+          </a:xfrm>
+        </p:spPr>
+        <p:txBody>
+          <a:bodyPr>
+            <a:normAutofit fontScale="92500" lnSpcReduction="10000"/>
+          </a:bodyPr>
           <a:lstStyle/>
           <a:p>
             <a:pPr marL="0" lvl="0" indent="0">
               <a:buNone/>
             </a:pPr>
             <a:r>
-              <a:t>There are several variations of the basi nonparametric bootstrap algorithm</a:t>
+              <a:rPr dirty="0"/>
+              <a:t>There are several variations of the basi</a:t>
+            </a:r>
+            <a:r>
+              <a:rPr lang="en-US" dirty="0"/>
+              <a:t>c</a:t>
+            </a:r>
+            <a:r>
+              <a:rPr dirty="0"/>
+              <a:t> nonparametric bootstrap algorithm</a:t>
             </a:r>
           </a:p>
           <a:p>
             <a:pPr lvl="0"/>
             <a:r>
+              <a:rPr dirty="0"/>
               <a:t>One sample bootstrap</a:t>
             </a:r>
           </a:p>
           <a:p>
             <a:pPr lvl="1"/>
             <a:r>
-              <a:t>Inference on single populations</a:t>
-            </a:r>
+              <a:rPr dirty="0"/>
+              <a:t>Inference on single population</a:t>
+            </a:r>
+            <a:endParaRPr lang="en-US" dirty="0"/>
+          </a:p>
+          <a:p>
+            <a:pPr lvl="1"/>
+            <a:r>
+              <a:rPr lang="en-US" dirty="0"/>
+              <a:t>One sample statistics</a:t>
+            </a:r>
+            <a:endParaRPr dirty="0"/>
           </a:p>
           <a:p>
             <a:pPr lvl="0"/>
             <a:r>
+              <a:rPr dirty="0"/>
               <a:t>Two sample bootstrap</a:t>
             </a:r>
           </a:p>
           <a:p>
             <a:pPr lvl="1"/>
             <a:r>
+              <a:rPr dirty="0"/>
               <a:t>Inference on different populations</a:t>
             </a:r>
+            <a:endParaRPr lang="en-US" dirty="0"/>
+          </a:p>
+          <a:p>
+            <a:pPr lvl="1"/>
+            <a:r>
+              <a:rPr lang="en-US" dirty="0"/>
+              <a:t>Two sample statistics</a:t>
+            </a:r>
+            <a:endParaRPr dirty="0"/>
           </a:p>
           <a:p>
             <a:pPr lvl="0"/>
             <a:r>
+              <a:rPr dirty="0"/>
               <a:t>Special cases</a:t>
             </a:r>
           </a:p>
           <a:p>
             <a:pPr lvl="1"/>
             <a:r>
+              <a:rPr dirty="0"/>
               <a:t>Correlation coefficients - part of your assignment</a:t>
             </a:r>
           </a:p>
@@ -12654,8 +12871,8 @@
           </a:p>
         </p:txBody>
       </p:sp>
-      <mc:AlternateContent xmlns:mc="http://schemas.openxmlformats.org/markup-compatibility/2006" xmlns:a14="http://schemas.microsoft.com/office/drawing/2010/main">
-        <mc:Choice Requires="a14">
+      <mc:AlternateContent xmlns:mc="http://schemas.openxmlformats.org/markup-compatibility/2006">
+        <mc:Choice xmlns:a14="http://schemas.microsoft.com/office/drawing/2010/main" Requires="a14">
           <p:sp>
             <p:nvSpPr>
               <p:cNvPr id="3" name="Content Placeholder 2"/>
@@ -12669,7 +12886,7 @@
             <p:spPr/>
             <p:txBody>
               <a:bodyPr>
-                <a:normAutofit fontScale="70000" lnSpcReduction="20000"/>
+                <a:normAutofit fontScale="92500" lnSpcReduction="10000"/>
               </a:bodyPr>
               <a:lstStyle/>
               <a:p>
@@ -12677,26 +12894,36 @@
                   <a:buNone/>
                 </a:pPr>
                 <a:r>
+                  <a:rPr dirty="0"/>
                   <a:t>Re-sampling methods are general and powerful but, there is no magic involved! There are pitfalls!</a:t>
                 </a:r>
               </a:p>
               <a:p>
                 <a:pPr lvl="0"/>
                 <a:r>
-                  <a:t>If a sample is biased, the resampled statistic estimate based on that sample will be biased</a:t>
+                  <a:rPr dirty="0"/>
+                  <a:t>If a sample is biased, the resampled statistic estimate </a:t>
+                </a:r>
+                <a:r>
+                  <a:rPr lang="en-US" dirty="0"/>
+                  <a:t>is</a:t>
+                </a:r>
+                <a:r>
+                  <a:rPr dirty="0"/>
+                  <a:t> biased</a:t>
                 </a:r>
               </a:p>
               <a:p>
                 <a:pPr lvl="1"/>
                 <a:r>
+                  <a:rPr dirty="0"/>
                   <a:t>Results can be no better than the sample you start with</a:t>
                 </a:r>
-                <a:br/>
-                <a:endParaRPr/>
               </a:p>
               <a:p>
                 <a:pPr lvl="1"/>
                 <a:r>
+                  <a:rPr dirty="0"/>
                   <a:t>Example; the bootstrap estimate of mean is the unbiased sample estimate, </a:t>
                 </a:r>
                 <a14:m>
@@ -12722,6 +12949,7 @@
                   </m:oMath>
                 </a14:m>
                 <a:r>
+                  <a:rPr dirty="0"/>
                   <a:t>, not the population parameter, </a:t>
                 </a:r>
                 <a14:m>
@@ -12734,38 +12962,41 @@
                     </m:r>
                   </m:oMath>
                 </a14:m>
-                <a:endParaRPr/>
+                <a:endParaRPr dirty="0"/>
               </a:p>
               <a:p>
                 <a:pPr lvl="0"/>
                 <a:r>
-                  <a:t>The sample variance and Cis can be no better than the sample distribution allows</a:t>
+                  <a:rPr dirty="0"/>
+                  <a:t>The sample variance and C</a:t>
+                </a:r>
+                <a:r>
+                  <a:rPr lang="en-US" dirty="0"/>
+                  <a:t>I</a:t>
+                </a:r>
+                <a:r>
+                  <a:rPr dirty="0"/>
+                  <a:t>s can be no better than the sample distribution allows</a:t>
                 </a:r>
               </a:p>
               <a:p>
                 <a:pPr lvl="1"/>
                 <a:r>
+                  <a:rPr dirty="0"/>
                   <a:t>Be suspicious of overly optimistic confidence intervals</a:t>
-                </a:r>
-                <a:br/>
-                <a:endParaRPr/>
-              </a:p>
-              <a:p>
-                <a:pPr lvl="1"/>
-                <a:r>
-                  <a:t>CIs can be optimistically biased</a:t>
                 </a:r>
               </a:p>
               <a:p>
                 <a:pPr lvl="0"/>
                 <a:r>
+                  <a:rPr dirty="0"/>
                   <a:t>Are computationally intensive, but often highly parallelizable</a:t>
                 </a:r>
               </a:p>
             </p:txBody>
           </p:sp>
         </mc:Choice>
-        <mc:Fallback xmlns="">
+        <mc:Fallback>
           <p:sp>
             <p:nvSpPr>
               <p:cNvPr id="3" name="Content Placeholder 2"/>
@@ -12780,7 +13011,7 @@
               <a:blipFill>
                 <a:blip r:embed="rId2"/>
                 <a:stretch>
-                  <a:fillRect l="-444" t="-1975"/>
+                  <a:fillRect l="-963" t="-2334" r="-815" b="-1257"/>
                 </a:stretch>
               </a:blipFill>
             </p:spPr>

</xml_diff>

<commit_message>
Updates and small corrections to slides
</commit_message>
<xml_diff>
--- a/LectureSlides/06b_IntroductionToBootstrap.pptx
+++ b/LectureSlides/06b_IntroductionToBootstrap.pptx
@@ -235,7 +235,7 @@
           <a:p>
             <a:fld id="{04109FAC-1BEC-4087-B676-5D9DDF25C61E}" type="datetimeFigureOut">
               <a:rPr lang="en-US" smtClean="0"/>
-              <a:t>9/17/2024</a:t>
+              <a:t>9/24/2024</a:t>
             </a:fld>
             <a:endParaRPr lang="en-US"/>
           </a:p>
@@ -768,7 +768,7 @@
           <a:p>
             <a:fld id="{241EB5C9-1307-BA42-ABA2-0BC069CD8E7F}" type="datetimeFigureOut">
               <a:rPr lang="en-US" smtClean="0"/>
-              <a:t>9/17/2024</a:t>
+              <a:t>9/24/2024</a:t>
             </a:fld>
             <a:endParaRPr lang="en-US"/>
           </a:p>
@@ -936,7 +936,7 @@
           <a:p>
             <a:fld id="{241EB5C9-1307-BA42-ABA2-0BC069CD8E7F}" type="datetimeFigureOut">
               <a:rPr lang="en-US" smtClean="0"/>
-              <a:t>9/17/2024</a:t>
+              <a:t>9/24/2024</a:t>
             </a:fld>
             <a:endParaRPr lang="en-US"/>
           </a:p>
@@ -1114,7 +1114,7 @@
           <a:p>
             <a:fld id="{241EB5C9-1307-BA42-ABA2-0BC069CD8E7F}" type="datetimeFigureOut">
               <a:rPr lang="en-US" smtClean="0"/>
-              <a:t>9/17/2024</a:t>
+              <a:t>9/24/2024</a:t>
             </a:fld>
             <a:endParaRPr lang="en-US"/>
           </a:p>
@@ -1282,7 +1282,7 @@
           <a:p>
             <a:fld id="{241EB5C9-1307-BA42-ABA2-0BC069CD8E7F}" type="datetimeFigureOut">
               <a:rPr lang="en-US" smtClean="0"/>
-              <a:t>9/17/2024</a:t>
+              <a:t>9/24/2024</a:t>
             </a:fld>
             <a:endParaRPr lang="en-US"/>
           </a:p>
@@ -1527,7 +1527,7 @@
           <a:p>
             <a:fld id="{241EB5C9-1307-BA42-ABA2-0BC069CD8E7F}" type="datetimeFigureOut">
               <a:rPr lang="en-US" smtClean="0"/>
-              <a:t>9/17/2024</a:t>
+              <a:t>9/24/2024</a:t>
             </a:fld>
             <a:endParaRPr lang="en-US"/>
           </a:p>
@@ -1812,7 +1812,7 @@
           <a:p>
             <a:fld id="{241EB5C9-1307-BA42-ABA2-0BC069CD8E7F}" type="datetimeFigureOut">
               <a:rPr lang="en-US" smtClean="0"/>
-              <a:t>9/17/2024</a:t>
+              <a:t>9/24/2024</a:t>
             </a:fld>
             <a:endParaRPr lang="en-US"/>
           </a:p>
@@ -2231,7 +2231,7 @@
           <a:p>
             <a:fld id="{241EB5C9-1307-BA42-ABA2-0BC069CD8E7F}" type="datetimeFigureOut">
               <a:rPr lang="en-US" smtClean="0"/>
-              <a:t>9/17/2024</a:t>
+              <a:t>9/24/2024</a:t>
             </a:fld>
             <a:endParaRPr lang="en-US"/>
           </a:p>
@@ -2348,7 +2348,7 @@
           <a:p>
             <a:fld id="{241EB5C9-1307-BA42-ABA2-0BC069CD8E7F}" type="datetimeFigureOut">
               <a:rPr lang="en-US" smtClean="0"/>
-              <a:t>9/17/2024</a:t>
+              <a:t>9/24/2024</a:t>
             </a:fld>
             <a:endParaRPr lang="en-US"/>
           </a:p>
@@ -2443,7 +2443,7 @@
           <a:p>
             <a:fld id="{241EB5C9-1307-BA42-ABA2-0BC069CD8E7F}" type="datetimeFigureOut">
               <a:rPr lang="en-US" smtClean="0"/>
-              <a:t>9/17/2024</a:t>
+              <a:t>9/24/2024</a:t>
             </a:fld>
             <a:endParaRPr lang="en-US"/>
           </a:p>
@@ -2718,7 +2718,7 @@
           <a:p>
             <a:fld id="{241EB5C9-1307-BA42-ABA2-0BC069CD8E7F}" type="datetimeFigureOut">
               <a:rPr lang="en-US" smtClean="0"/>
-              <a:t>9/17/2024</a:t>
+              <a:t>9/24/2024</a:t>
             </a:fld>
             <a:endParaRPr lang="en-US"/>
           </a:p>
@@ -2970,7 +2970,7 @@
           <a:p>
             <a:fld id="{241EB5C9-1307-BA42-ABA2-0BC069CD8E7F}" type="datetimeFigureOut">
               <a:rPr lang="en-US" smtClean="0"/>
-              <a:t>9/17/2024</a:t>
+              <a:t>9/24/2024</a:t>
             </a:fld>
             <a:endParaRPr lang="en-US"/>
           </a:p>
@@ -3181,7 +3181,7 @@
           <a:p>
             <a:fld id="{241EB5C9-1307-BA42-ABA2-0BC069CD8E7F}" type="datetimeFigureOut">
               <a:rPr lang="en-US" smtClean="0"/>
-              <a:t>9/17/2024</a:t>
+              <a:t>9/24/2024</a:t>
             </a:fld>
             <a:endParaRPr lang="en-US"/>
           </a:p>
@@ -8969,7 +8969,15 @@
             <a:pPr lvl="0"/>
             <a:r>
               <a:rPr dirty="0"/>
-              <a:t>By law of large numbers, bootstrap point estimate</a:t>
+              <a:t>By </a:t>
+            </a:r>
+            <a:r>
+              <a:rPr b="1" dirty="0"/>
+              <a:t>law of large numbers</a:t>
+            </a:r>
+            <a:r>
+              <a:rPr dirty="0"/>
+              <a:t>, bootstrap point estimate</a:t>
             </a:r>
             <a:r>
               <a:rPr lang="en-US" dirty="0"/>
@@ -10267,8 +10275,8 @@
           </a:p>
         </p:txBody>
       </p:sp>
-      <mc:AlternateContent xmlns:mc="http://schemas.openxmlformats.org/markup-compatibility/2006">
-        <mc:Choice xmlns:a14="http://schemas.microsoft.com/office/drawing/2010/main" Requires="a14">
+      <mc:AlternateContent xmlns:mc="http://schemas.openxmlformats.org/markup-compatibility/2006" xmlns:a14="http://schemas.microsoft.com/office/drawing/2010/main">
+        <mc:Choice Requires="a14">
           <p:sp>
             <p:nvSpPr>
               <p:cNvPr id="3" name="Content Placeholder 2"/>
@@ -10558,7 +10566,7 @@
             </p:txBody>
           </p:sp>
         </mc:Choice>
-        <mc:Fallback>
+        <mc:Fallback xmlns="">
           <p:sp>
             <p:nvSpPr>
               <p:cNvPr id="3" name="Content Placeholder 2"/>
@@ -12871,8 +12879,8 @@
           </a:p>
         </p:txBody>
       </p:sp>
-      <mc:AlternateContent xmlns:mc="http://schemas.openxmlformats.org/markup-compatibility/2006">
-        <mc:Choice xmlns:a14="http://schemas.microsoft.com/office/drawing/2010/main" Requires="a14">
+      <mc:AlternateContent xmlns:mc="http://schemas.openxmlformats.org/markup-compatibility/2006" xmlns:a14="http://schemas.microsoft.com/office/drawing/2010/main">
+        <mc:Choice Requires="a14">
           <p:sp>
             <p:nvSpPr>
               <p:cNvPr id="3" name="Content Placeholder 2"/>
@@ -12996,7 +13004,7 @@
             </p:txBody>
           </p:sp>
         </mc:Choice>
-        <mc:Fallback>
+        <mc:Fallback xmlns="">
           <p:sp>
             <p:nvSpPr>
               <p:cNvPr id="3" name="Content Placeholder 2"/>
@@ -13336,7 +13344,7 @@
             <a:pPr lvl="1"/>
             <a:r>
               <a:rPr dirty="0"/>
-              <a:t>Parameters which must be estimated</a:t>
+              <a:t>Parameters must be estimated</a:t>
             </a:r>
           </a:p>
           <a:p>
@@ -13465,6 +13473,13 @@
           <a:p>
             <a:pPr lvl="1"/>
             <a:r>
+              <a:rPr lang="en-US" dirty="0"/>
+              <a:t>Example, mean and variance estimates</a:t>
+            </a:r>
+          </a:p>
+          <a:p>
+            <a:pPr lvl="1"/>
+            <a:r>
               <a:rPr dirty="0"/>
               <a:t>Potentially high variance estimates</a:t>
             </a:r>
@@ -13477,13 +13492,6 @@
             </a:r>
           </a:p>
           <a:p>
-            <a:pPr lvl="1"/>
-            <a:r>
-              <a:rPr dirty="0"/>
-              <a:t>Example, mean and variance estimates</a:t>
-            </a:r>
-          </a:p>
-          <a:p>
             <a:pPr lvl="0"/>
             <a:r>
               <a:rPr dirty="0"/>
@@ -13507,9 +13515,14 @@
           <a:p>
             <a:pPr lvl="1"/>
             <a:r>
-              <a:rPr dirty="0"/>
+              <a:rPr b="1" dirty="0"/>
               <a:t>Nonparametric bootstrap</a:t>
             </a:r>
+            <a:r>
+              <a:rPr lang="en-US" dirty="0"/>
+              <a:t> – today’s topic</a:t>
+            </a:r>
+            <a:endParaRPr b="1" dirty="0"/>
           </a:p>
         </p:txBody>
       </p:sp>
@@ -13577,7 +13590,7 @@
         <p:spPr/>
         <p:txBody>
           <a:bodyPr>
-            <a:normAutofit fontScale="92500"/>
+            <a:normAutofit/>
           </a:bodyPr>
           <a:lstStyle/>
           <a:p>
@@ -13585,30 +13598,64 @@
               <a:buNone/>
             </a:pPr>
             <a:r>
-              <a:t>General characteristics of nonparametric resampling methods include</a:t>
+              <a:rPr lang="en-US" dirty="0"/>
+              <a:t>Compute</a:t>
+            </a:r>
+            <a:r>
+              <a:rPr dirty="0"/>
+              <a:t> statistics</a:t>
+            </a:r>
+            <a:r>
+              <a:rPr lang="en-US" dirty="0"/>
+              <a:t> with </a:t>
+            </a:r>
+            <a:r>
+              <a:rPr lang="en-US" b="1" dirty="0"/>
+              <a:t>continuous derivatives</a:t>
+            </a:r>
+            <a:r>
+              <a:rPr b="1" dirty="0"/>
+              <a:t> </a:t>
+            </a:r>
+            <a:r>
+              <a:rPr dirty="0"/>
+              <a:t>from data samples</a:t>
             </a:r>
           </a:p>
           <a:p>
             <a:pPr lvl="0"/>
             <a:r>
-              <a:t>Allow computation of statistics from data samples for statistics with continuous derivatives</a:t>
+              <a:rPr dirty="0"/>
+              <a:t>Repeatedly compute statistics from </a:t>
+            </a:r>
+            <a:r>
+              <a:rPr b="1" dirty="0"/>
+              <a:t>multiple resamples </a:t>
+            </a:r>
+            <a:r>
+              <a:rPr dirty="0"/>
+              <a:t>of dataset</a:t>
             </a:r>
           </a:p>
           <a:p>
             <a:pPr lvl="0"/>
             <a:r>
-              <a:t>Repeatedly compute statistics from multiple resamples of dataset</a:t>
+              <a:rPr dirty="0"/>
+              <a:t>The result converges to the </a:t>
+            </a:r>
+            <a:r>
+              <a:rPr b="1" dirty="0"/>
+              <a:t>sample distribution </a:t>
+            </a:r>
+            <a:r>
+              <a:rPr dirty="0"/>
+              <a:t>of the statistic being computed</a:t>
             </a:r>
           </a:p>
           <a:p>
             <a:pPr lvl="0"/>
             <a:r>
-              <a:t>The result converges to the sample distribution of the statistic being computed</a:t>
-            </a:r>
-          </a:p>
-          <a:p>
-            <a:pPr lvl="0"/>
-            <a:r>
+              <a:rPr dirty="0"/>
               <a:t>Make minimal distributional assumptions, when compared to classical frequentist statistics</a:t>
             </a:r>
           </a:p>
@@ -14090,8 +14137,12 @@
           <a:p>
             <a:pPr lvl="0"/>
             <a:r>
+              <a:rPr b="1" dirty="0"/>
+              <a:t>Bootstrap distribution </a:t>
+            </a:r>
+            <a:r>
               <a:rPr dirty="0"/>
-              <a:t>Bootstrap distribution comprise</a:t>
+              <a:t>comprise</a:t>
             </a:r>
             <a:r>
               <a:rPr lang="en-US" dirty="0"/>
@@ -14148,14 +14199,26 @@
             <a:pPr lvl="1"/>
             <a:r>
               <a:rPr dirty="0"/>
-              <a:t>Compute mostly likely point estimate of the statistic, or bootstrap estimate</a:t>
+              <a:t>Compute mostly likely point estimate of the statistic, or </a:t>
+            </a:r>
+            <a:r>
+              <a:rPr b="1" dirty="0"/>
+              <a:t>bootstrap estimate</a:t>
             </a:r>
           </a:p>
           <a:p>
             <a:pPr lvl="1"/>
             <a:r>
               <a:rPr dirty="0"/>
-              <a:t>The bootstrap confidence interval is computed from the bootstrap distribution</a:t>
+              <a:t>The </a:t>
+            </a:r>
+            <a:r>
+              <a:rPr b="1" dirty="0"/>
+              <a:t>bootstrap confidence interval </a:t>
+            </a:r>
+            <a:r>
+              <a:rPr dirty="0"/>
+              <a:t>is computed from the bootstrap distribution</a:t>
             </a:r>
           </a:p>
         </p:txBody>

</xml_diff>

<commit_message>
Clarifications and corrections in slides
</commit_message>
<xml_diff>
--- a/LectureSlides/06b_IntroductionToBootstrap.pptx
+++ b/LectureSlides/06b_IntroductionToBootstrap.pptx
@@ -5,7 +5,7 @@
     <p:sldMasterId id="2147483648" r:id="rId1"/>
   </p:sldMasterIdLst>
   <p:notesMasterIdLst>
-    <p:notesMasterId r:id="rId30"/>
+    <p:notesMasterId r:id="rId31"/>
   </p:notesMasterIdLst>
   <p:sldIdLst>
     <p:sldId id="299" r:id="rId2"/>
@@ -33,9 +33,10 @@
     <p:sldId id="278" r:id="rId24"/>
     <p:sldId id="279" r:id="rId25"/>
     <p:sldId id="280" r:id="rId26"/>
-    <p:sldId id="281" r:id="rId27"/>
-    <p:sldId id="282" r:id="rId28"/>
-    <p:sldId id="283" r:id="rId29"/>
+    <p:sldId id="300" r:id="rId27"/>
+    <p:sldId id="281" r:id="rId28"/>
+    <p:sldId id="282" r:id="rId29"/>
+    <p:sldId id="283" r:id="rId30"/>
   </p:sldIdLst>
   <p:sldSz cx="9144000" cy="5143500" type="screen16x9"/>
   <p:notesSz cx="6858000" cy="9144000"/>
@@ -235,7 +236,7 @@
           <a:p>
             <a:fld id="{04109FAC-1BEC-4087-B676-5D9DDF25C61E}" type="datetimeFigureOut">
               <a:rPr lang="en-US" smtClean="0"/>
-              <a:t>9/24/2024</a:t>
+              <a:t>9/25/2024</a:t>
             </a:fld>
             <a:endParaRPr lang="en-US"/>
           </a:p>
@@ -768,7 +769,7 @@
           <a:p>
             <a:fld id="{241EB5C9-1307-BA42-ABA2-0BC069CD8E7F}" type="datetimeFigureOut">
               <a:rPr lang="en-US" smtClean="0"/>
-              <a:t>9/24/2024</a:t>
+              <a:t>9/25/2024</a:t>
             </a:fld>
             <a:endParaRPr lang="en-US"/>
           </a:p>
@@ -936,7 +937,7 @@
           <a:p>
             <a:fld id="{241EB5C9-1307-BA42-ABA2-0BC069CD8E7F}" type="datetimeFigureOut">
               <a:rPr lang="en-US" smtClean="0"/>
-              <a:t>9/24/2024</a:t>
+              <a:t>9/25/2024</a:t>
             </a:fld>
             <a:endParaRPr lang="en-US"/>
           </a:p>
@@ -1114,7 +1115,7 @@
           <a:p>
             <a:fld id="{241EB5C9-1307-BA42-ABA2-0BC069CD8E7F}" type="datetimeFigureOut">
               <a:rPr lang="en-US" smtClean="0"/>
-              <a:t>9/24/2024</a:t>
+              <a:t>9/25/2024</a:t>
             </a:fld>
             <a:endParaRPr lang="en-US"/>
           </a:p>
@@ -1282,7 +1283,7 @@
           <a:p>
             <a:fld id="{241EB5C9-1307-BA42-ABA2-0BC069CD8E7F}" type="datetimeFigureOut">
               <a:rPr lang="en-US" smtClean="0"/>
-              <a:t>9/24/2024</a:t>
+              <a:t>9/25/2024</a:t>
             </a:fld>
             <a:endParaRPr lang="en-US"/>
           </a:p>
@@ -1527,7 +1528,7 @@
           <a:p>
             <a:fld id="{241EB5C9-1307-BA42-ABA2-0BC069CD8E7F}" type="datetimeFigureOut">
               <a:rPr lang="en-US" smtClean="0"/>
-              <a:t>9/24/2024</a:t>
+              <a:t>9/25/2024</a:t>
             </a:fld>
             <a:endParaRPr lang="en-US"/>
           </a:p>
@@ -1812,7 +1813,7 @@
           <a:p>
             <a:fld id="{241EB5C9-1307-BA42-ABA2-0BC069CD8E7F}" type="datetimeFigureOut">
               <a:rPr lang="en-US" smtClean="0"/>
-              <a:t>9/24/2024</a:t>
+              <a:t>9/25/2024</a:t>
             </a:fld>
             <a:endParaRPr lang="en-US"/>
           </a:p>
@@ -2231,7 +2232,7 @@
           <a:p>
             <a:fld id="{241EB5C9-1307-BA42-ABA2-0BC069CD8E7F}" type="datetimeFigureOut">
               <a:rPr lang="en-US" smtClean="0"/>
-              <a:t>9/24/2024</a:t>
+              <a:t>9/25/2024</a:t>
             </a:fld>
             <a:endParaRPr lang="en-US"/>
           </a:p>
@@ -2348,7 +2349,7 @@
           <a:p>
             <a:fld id="{241EB5C9-1307-BA42-ABA2-0BC069CD8E7F}" type="datetimeFigureOut">
               <a:rPr lang="en-US" smtClean="0"/>
-              <a:t>9/24/2024</a:t>
+              <a:t>9/25/2024</a:t>
             </a:fld>
             <a:endParaRPr lang="en-US"/>
           </a:p>
@@ -2443,7 +2444,7 @@
           <a:p>
             <a:fld id="{241EB5C9-1307-BA42-ABA2-0BC069CD8E7F}" type="datetimeFigureOut">
               <a:rPr lang="en-US" smtClean="0"/>
-              <a:t>9/24/2024</a:t>
+              <a:t>9/25/2024</a:t>
             </a:fld>
             <a:endParaRPr lang="en-US"/>
           </a:p>
@@ -2718,7 +2719,7 @@
           <a:p>
             <a:fld id="{241EB5C9-1307-BA42-ABA2-0BC069CD8E7F}" type="datetimeFigureOut">
               <a:rPr lang="en-US" smtClean="0"/>
-              <a:t>9/24/2024</a:t>
+              <a:t>9/25/2024</a:t>
             </a:fld>
             <a:endParaRPr lang="en-US"/>
           </a:p>
@@ -2970,7 +2971,7 @@
           <a:p>
             <a:fld id="{241EB5C9-1307-BA42-ABA2-0BC069CD8E7F}" type="datetimeFigureOut">
               <a:rPr lang="en-US" smtClean="0"/>
-              <a:t>9/24/2024</a:t>
+              <a:t>9/25/2024</a:t>
             </a:fld>
             <a:endParaRPr lang="en-US"/>
           </a:p>
@@ -3181,7 +3182,7 @@
           <a:p>
             <a:fld id="{241EB5C9-1307-BA42-ABA2-0BC069CD8E7F}" type="datetimeFigureOut">
               <a:rPr lang="en-US" smtClean="0"/>
-              <a:t>9/24/2024</a:t>
+              <a:t>9/25/2024</a:t>
             </a:fld>
             <a:endParaRPr lang="en-US"/>
           </a:p>
@@ -10350,7 +10351,25 @@
                       <a:rPr>
                         <a:latin typeface="Cambria Math" panose="02040503050406030204" pitchFamily="18" charset="0"/>
                       </a:rPr>
-                      <m:t>=0.05</m:t>
+                      <m:t>=</m:t>
+                    </m:r>
+                    <m:r>
+                      <a:rPr>
+                        <a:latin typeface="Cambria Math" panose="02040503050406030204" pitchFamily="18" charset="0"/>
+                      </a:rPr>
+                      <m:t>0</m:t>
+                    </m:r>
+                    <m:r>
+                      <a:rPr>
+                        <a:latin typeface="Cambria Math" panose="02040503050406030204" pitchFamily="18" charset="0"/>
+                      </a:rPr>
+                      <m:t>.</m:t>
+                    </m:r>
+                    <m:r>
+                      <a:rPr>
+                        <a:latin typeface="Cambria Math" panose="02040503050406030204" pitchFamily="18" charset="0"/>
+                      </a:rPr>
+                      <m:t>05</m:t>
                     </m:r>
                   </m:oMath>
                 </a14:m>
@@ -10442,7 +10461,13 @@
                       <a:rPr>
                         <a:latin typeface="Cambria Math" panose="02040503050406030204" pitchFamily="18" charset="0"/>
                       </a:rPr>
-                      <m:t>/2</m:t>
+                      <m:t>/</m:t>
+                    </m:r>
+                    <m:r>
+                      <a:rPr>
+                        <a:latin typeface="Cambria Math" panose="02040503050406030204" pitchFamily="18" charset="0"/>
+                      </a:rPr>
+                      <m:t>2</m:t>
                     </m:r>
                   </m:oMath>
                 </a14:m>
@@ -10495,7 +10520,13 @@
                           <a:rPr>
                             <a:latin typeface="Cambria Math" panose="02040503050406030204" pitchFamily="18" charset="0"/>
                           </a:rPr>
-                          <m:t>1−</m:t>
+                          <m:t>1</m:t>
+                        </m:r>
+                        <m:r>
+                          <a:rPr>
+                            <a:latin typeface="Cambria Math" panose="02040503050406030204" pitchFamily="18" charset="0"/>
+                          </a:rPr>
+                          <m:t>−</m:t>
                         </m:r>
                         <m:r>
                           <a:rPr>
@@ -10507,7 +10538,13 @@
                           <a:rPr>
                             <a:latin typeface="Cambria Math" panose="02040503050406030204" pitchFamily="18" charset="0"/>
                           </a:rPr>
-                          <m:t>/2</m:t>
+                          <m:t>/</m:t>
+                        </m:r>
+                        <m:r>
+                          <a:rPr>
+                            <a:latin typeface="Cambria Math" panose="02040503050406030204" pitchFamily="18" charset="0"/>
+                          </a:rPr>
+                          <m:t>2</m:t>
                         </m:r>
                       </m:e>
                     </m:d>
@@ -12561,39 +12598,47 @@
             <p:ph type="title"/>
           </p:nvPr>
         </p:nvSpPr>
-        <p:spPr/>
-        <p:txBody>
-          <a:bodyPr/>
-          <a:lstStyle/>
-          <a:p>
-            <a:pPr marL="0" lvl="0" indent="0">
+        <p:spPr>
+          <a:xfrm>
+            <a:off x="457201" y="204787"/>
+            <a:ext cx="8258628" cy="510042"/>
+          </a:xfrm>
+        </p:spPr>
+        <p:txBody>
+          <a:bodyPr>
+            <a:noAutofit/>
+          </a:bodyPr>
+          <a:lstStyle/>
+          <a:p>
+            <a:pPr marL="0" lvl="0" indent="0" algn="ctr">
               <a:buNone/>
             </a:pPr>
             <a:r>
-              <a:t>Summary</a:t>
-            </a:r>
-          </a:p>
-        </p:txBody>
-      </p:sp>
-      <p:sp>
-        <p:nvSpPr>
-          <p:cNvPr id="3" name="Content Placeholder 2"/>
+              <a:rPr sz="3300" b="0" dirty="0"/>
+              <a:t>Example, Two Sample Bootstrap</a:t>
+            </a:r>
+          </a:p>
+        </p:txBody>
+      </p:sp>
+      <p:sp>
+        <p:nvSpPr>
+          <p:cNvPr id="4" name="Text Placeholder 3"/>
           <p:cNvSpPr>
             <a:spLocks noGrp="1"/>
           </p:cNvSpPr>
           <p:nvPr>
-            <p:ph idx="1"/>
+            <p:ph type="body" sz="half" idx="2"/>
           </p:nvPr>
         </p:nvSpPr>
         <p:spPr>
           <a:xfrm>
-            <a:off x="457200" y="1063229"/>
-            <a:ext cx="8229600" cy="3643028"/>
+            <a:off x="457202" y="1076326"/>
+            <a:ext cx="5439228" cy="3518297"/>
           </a:xfrm>
         </p:spPr>
         <p:txBody>
           <a:bodyPr>
-            <a:normAutofit fontScale="92500" lnSpcReduction="20000"/>
+            <a:noAutofit/>
           </a:bodyPr>
           <a:lstStyle/>
           <a:p>
@@ -12601,87 +12646,136 @@
               <a:buNone/>
             </a:pPr>
             <a:r>
-              <a:rPr dirty="0"/>
-              <a:t>Bootstrap estimation is widely useful and requires minimal assumption</a:t>
-            </a:r>
-          </a:p>
-          <a:p>
-            <a:pPr lvl="0"/>
-            <a:r>
-              <a:rPr dirty="0"/>
-              <a:t>Bootstrap distribution comprise</a:t>
-            </a:r>
-            <a:r>
-              <a:rPr lang="en-US" dirty="0"/>
-              <a:t>s</a:t>
-            </a:r>
-            <a:r>
-              <a:rPr dirty="0"/>
-              <a:t> values of </a:t>
-            </a:r>
-            <a:r>
-              <a:rPr lang="en-US" dirty="0"/>
-              <a:t>a</a:t>
-            </a:r>
-            <a:r>
-              <a:rPr dirty="0"/>
-              <a:t> statistic computed from bootstrap resamples of the original observations (data sample)</a:t>
-            </a:r>
-          </a:p>
-          <a:p>
-            <a:pPr lvl="0"/>
-            <a:r>
-              <a:rPr dirty="0"/>
-              <a:t>Computing bootstrap distribution requires </a:t>
-            </a:r>
-            <a:r>
-              <a:rPr b="1" dirty="0"/>
-              <a:t>no assumptions about population distribution!</a:t>
-            </a:r>
-          </a:p>
-          <a:p>
-            <a:pPr lvl="1"/>
-            <a:r>
-              <a:rPr dirty="0"/>
-              <a:t>Bootstrap resampling substitutes computer power for paper and pencil statistician power</a:t>
-            </a:r>
-          </a:p>
-          <a:p>
-            <a:pPr lvl="0"/>
-            <a:r>
-              <a:rPr dirty="0"/>
-              <a:t>Bootstrap resampling estimates the </a:t>
-            </a:r>
-            <a:r>
-              <a:rPr b="1" dirty="0"/>
-              <a:t>bootstrap distribution</a:t>
-            </a:r>
-            <a:r>
-              <a:rPr dirty="0"/>
-              <a:t> of a statistic</a:t>
-            </a:r>
-          </a:p>
-          <a:p>
-            <a:pPr lvl="1"/>
-            <a:r>
-              <a:rPr dirty="0"/>
-              <a:t>Compute point estimate of the statistic, or bootstrap estimate</a:t>
-            </a:r>
-          </a:p>
-          <a:p>
-            <a:pPr lvl="1"/>
-            <a:r>
-              <a:rPr lang="en-US" dirty="0"/>
-              <a:t>Compute </a:t>
-            </a:r>
-            <a:r>
-              <a:rPr dirty="0"/>
-              <a:t>bootstrap confidence interval from the bootstrap distribution</a:t>
-            </a:r>
-          </a:p>
-        </p:txBody>
-      </p:sp>
+              <a:rPr lang="en-US" sz="2000" dirty="0"/>
+              <a:t>How can we interpret this result? </a:t>
+            </a:r>
+          </a:p>
+          <a:p>
+            <a:pPr lvl="0" indent="0">
+              <a:buNone/>
+            </a:pPr>
+            <a:r>
+              <a:rPr sz="2000" dirty="0">
+                <a:latin typeface="Courier"/>
+              </a:rPr>
+              <a:t>## bootstrap point estimate =  -3.0</a:t>
+            </a:r>
+            <a:r>
+              <a:rPr lang="en-US" sz="2000" dirty="0">
+                <a:latin typeface="Courier"/>
+              </a:rPr>
+              <a:t>1</a:t>
+            </a:r>
+            <a:endParaRPr sz="2000" dirty="0">
+              <a:latin typeface="Courier"/>
+            </a:endParaRPr>
+          </a:p>
+          <a:p>
+            <a:pPr lvl="0" indent="0">
+              <a:buNone/>
+            </a:pPr>
+            <a:r>
+              <a:rPr sz="2000" dirty="0">
+                <a:latin typeface="Courier"/>
+              </a:rPr>
+              <a:t>## At alpha = 0.05, lower and upper bootstrap confidence intervals =  -6.</a:t>
+            </a:r>
+            <a:r>
+              <a:rPr lang="en-US" sz="2000" dirty="0">
+                <a:latin typeface="Courier"/>
+              </a:rPr>
+              <a:t>08</a:t>
+            </a:r>
+            <a:r>
+              <a:rPr sz="2000" dirty="0">
+                <a:latin typeface="Courier"/>
+              </a:rPr>
+              <a:t>     0.</a:t>
+            </a:r>
+            <a:r>
+              <a:rPr lang="en-US" sz="2000" dirty="0">
+                <a:latin typeface="Courier"/>
+              </a:rPr>
+              <a:t>18</a:t>
+            </a:r>
+          </a:p>
+          <a:p>
+            <a:pPr marL="342900" lvl="0" indent="-342900">
+              <a:buFont typeface="Arial" panose="020B0604020202020204" pitchFamily="34" charset="0"/>
+              <a:buChar char="•"/>
+            </a:pPr>
+            <a:r>
+              <a:rPr lang="en-US" sz="2000" dirty="0"/>
+              <a:t>The CI limits have opposite signs and the CI includes 0 </a:t>
+            </a:r>
+          </a:p>
+          <a:p>
+            <a:pPr marL="342900" lvl="0" indent="-342900">
+              <a:buFont typeface="Arial" panose="020B0604020202020204" pitchFamily="34" charset="0"/>
+              <a:buChar char="•"/>
+            </a:pPr>
+            <a:r>
+              <a:rPr lang="en-US" sz="2000" dirty="0"/>
+              <a:t>Within 95% confidence we cannot say there is a significant difference in means </a:t>
+            </a:r>
+          </a:p>
+          <a:p>
+            <a:pPr marL="342900" lvl="0" indent="-342900">
+              <a:buFont typeface="Arial" panose="020B0604020202020204" pitchFamily="34" charset="0"/>
+              <a:buChar char="•"/>
+            </a:pPr>
+            <a:r>
+              <a:rPr lang="en-US" sz="2000" dirty="0"/>
+              <a:t>We </a:t>
+            </a:r>
+            <a:r>
+              <a:rPr lang="en-US" sz="2000" b="1" dirty="0"/>
+              <a:t>cannot reject the </a:t>
+            </a:r>
+            <a:r>
+              <a:rPr lang="en-US" sz="2000" b="1"/>
+              <a:t>null hypothesis! </a:t>
+            </a:r>
+            <a:endParaRPr sz="2000" b="1" dirty="0"/>
+          </a:p>
+        </p:txBody>
+      </p:sp>
+      <p:pic>
+        <p:nvPicPr>
+          <p:cNvPr id="6" name="Picture 5">
+            <a:extLst>
+              <a:ext uri="{FF2B5EF4-FFF2-40B4-BE49-F238E27FC236}">
+                <a16:creationId xmlns:a16="http://schemas.microsoft.com/office/drawing/2014/main" id="{EBC90591-F254-F8B0-D316-053670C8034F}"/>
+              </a:ext>
+            </a:extLst>
+          </p:cNvPr>
+          <p:cNvPicPr>
+            <a:picLocks noChangeAspect="1"/>
+          </p:cNvPicPr>
+          <p:nvPr/>
+        </p:nvPicPr>
+        <p:blipFill>
+          <a:blip r:embed="rId2"/>
+          <a:stretch>
+            <a:fillRect/>
+          </a:stretch>
+        </p:blipFill>
+        <p:spPr>
+          <a:xfrm>
+            <a:off x="6273036" y="841829"/>
+            <a:ext cx="2831050" cy="4276271"/>
+          </a:xfrm>
+          <a:prstGeom prst="rect">
+            <a:avLst/>
+          </a:prstGeom>
+        </p:spPr>
+      </p:pic>
     </p:spTree>
+    <p:extLst>
+      <p:ext uri="{BB962C8B-B14F-4D97-AF65-F5344CB8AC3E}">
+        <p14:creationId xmlns:p14="http://schemas.microsoft.com/office/powerpoint/2010/main" val="85583088"/>
+      </p:ext>
+    </p:extLst>
   </p:cSld>
   <p:clrMapOvr>
     <a:masterClrMapping/>
@@ -12742,13 +12836,13 @@
         </p:nvSpPr>
         <p:spPr>
           <a:xfrm>
-            <a:off x="457200" y="1106714"/>
-            <a:ext cx="8229600" cy="3693885"/>
+            <a:off x="457200" y="1063229"/>
+            <a:ext cx="8229600" cy="3643028"/>
           </a:xfrm>
         </p:spPr>
         <p:txBody>
           <a:bodyPr>
-            <a:normAutofit fontScale="92500" lnSpcReduction="10000"/>
+            <a:normAutofit fontScale="92500" lnSpcReduction="20000"/>
           </a:bodyPr>
           <a:lstStyle/>
           <a:p>
@@ -12757,75 +12851,81 @@
             </a:pPr>
             <a:r>
               <a:rPr dirty="0"/>
-              <a:t>There are several variations of the basi</a:t>
+              <a:t>Bootstrap estimation is widely useful and requires minimal assumption</a:t>
+            </a:r>
+          </a:p>
+          <a:p>
+            <a:pPr lvl="0"/>
+            <a:r>
+              <a:rPr dirty="0"/>
+              <a:t>Bootstrap distribution comprise</a:t>
             </a:r>
             <a:r>
               <a:rPr lang="en-US" dirty="0"/>
-              <a:t>c</a:t>
+              <a:t>s</a:t>
             </a:r>
             <a:r>
               <a:rPr dirty="0"/>
-              <a:t> nonparametric bootstrap algorithm</a:t>
+              <a:t> values of </a:t>
+            </a:r>
+            <a:r>
+              <a:rPr lang="en-US" dirty="0"/>
+              <a:t>a</a:t>
+            </a:r>
+            <a:r>
+              <a:rPr dirty="0"/>
+              <a:t> statistic computed from bootstrap resamples of the original observations (data sample)</a:t>
             </a:r>
           </a:p>
           <a:p>
             <a:pPr lvl="0"/>
             <a:r>
               <a:rPr dirty="0"/>
-              <a:t>One sample bootstrap</a:t>
+              <a:t>Computing bootstrap distribution requires </a:t>
+            </a:r>
+            <a:r>
+              <a:rPr b="1" dirty="0"/>
+              <a:t>no assumptions about population distribution!</a:t>
             </a:r>
           </a:p>
           <a:p>
             <a:pPr lvl="1"/>
             <a:r>
               <a:rPr dirty="0"/>
-              <a:t>Inference on single population</a:t>
-            </a:r>
-            <a:endParaRPr lang="en-US" dirty="0"/>
+              <a:t>Bootstrap resampling substitutes computer power for paper and pencil statistician power</a:t>
+            </a:r>
+          </a:p>
+          <a:p>
+            <a:pPr lvl="0"/>
+            <a:r>
+              <a:rPr dirty="0"/>
+              <a:t>Bootstrap resampling estimates the </a:t>
+            </a:r>
+            <a:r>
+              <a:rPr b="1" dirty="0"/>
+              <a:t>bootstrap distribution</a:t>
+            </a:r>
+            <a:r>
+              <a:rPr dirty="0"/>
+              <a:t> of a statistic</a:t>
+            </a:r>
           </a:p>
           <a:p>
             <a:pPr lvl="1"/>
             <a:r>
+              <a:rPr dirty="0"/>
+              <a:t>Compute point estimate of the statistic, or bootstrap estimate</a:t>
+            </a:r>
+          </a:p>
+          <a:p>
+            <a:pPr lvl="1"/>
+            <a:r>
               <a:rPr lang="en-US" dirty="0"/>
-              <a:t>One sample statistics</a:t>
-            </a:r>
-            <a:endParaRPr dirty="0"/>
-          </a:p>
-          <a:p>
-            <a:pPr lvl="0"/>
+              <a:t>Compute </a:t>
+            </a:r>
             <a:r>
               <a:rPr dirty="0"/>
-              <a:t>Two sample bootstrap</a:t>
-            </a:r>
-          </a:p>
-          <a:p>
-            <a:pPr lvl="1"/>
-            <a:r>
-              <a:rPr dirty="0"/>
-              <a:t>Inference on different populations</a:t>
-            </a:r>
-            <a:endParaRPr lang="en-US" dirty="0"/>
-          </a:p>
-          <a:p>
-            <a:pPr lvl="1"/>
-            <a:r>
-              <a:rPr lang="en-US" dirty="0"/>
-              <a:t>Two sample statistics</a:t>
-            </a:r>
-            <a:endParaRPr dirty="0"/>
-          </a:p>
-          <a:p>
-            <a:pPr lvl="0"/>
-            <a:r>
-              <a:rPr dirty="0"/>
-              <a:t>Special cases</a:t>
-            </a:r>
-          </a:p>
-          <a:p>
-            <a:pPr lvl="1"/>
-            <a:r>
-              <a:rPr dirty="0"/>
-              <a:t>Correlation coefficients - part of your assignment</a:t>
+              <a:t>bootstrap confidence interval from the bootstrap distribution</a:t>
             </a:r>
           </a:p>
         </p:txBody>
@@ -12839,6 +12939,155 @@
 </file>
 
 <file path=ppt/slides/slide28.xml><?xml version="1.0" encoding="utf-8"?>
+<p:sld xmlns:a="http://schemas.openxmlformats.org/drawingml/2006/main" xmlns:r="http://schemas.openxmlformats.org/officeDocument/2006/relationships" xmlns:p="http://schemas.openxmlformats.org/presentationml/2006/main">
+  <p:cSld>
+    <p:spTree>
+      <p:nvGrpSpPr>
+        <p:cNvPr id="1" name=""/>
+        <p:cNvGrpSpPr/>
+        <p:nvPr/>
+      </p:nvGrpSpPr>
+      <p:grpSpPr>
+        <a:xfrm>
+          <a:off x="0" y="0"/>
+          <a:ext cx="0" cy="0"/>
+          <a:chOff x="0" y="0"/>
+          <a:chExt cx="0" cy="0"/>
+        </a:xfrm>
+      </p:grpSpPr>
+      <p:sp>
+        <p:nvSpPr>
+          <p:cNvPr id="2" name="Title 1"/>
+          <p:cNvSpPr>
+            <a:spLocks noGrp="1"/>
+          </p:cNvSpPr>
+          <p:nvPr>
+            <p:ph type="title"/>
+          </p:nvPr>
+        </p:nvSpPr>
+        <p:spPr/>
+        <p:txBody>
+          <a:bodyPr/>
+          <a:lstStyle/>
+          <a:p>
+            <a:pPr marL="0" lvl="0" indent="0">
+              <a:buNone/>
+            </a:pPr>
+            <a:r>
+              <a:t>Summary</a:t>
+            </a:r>
+          </a:p>
+        </p:txBody>
+      </p:sp>
+      <p:sp>
+        <p:nvSpPr>
+          <p:cNvPr id="3" name="Content Placeholder 2"/>
+          <p:cNvSpPr>
+            <a:spLocks noGrp="1"/>
+          </p:cNvSpPr>
+          <p:nvPr>
+            <p:ph idx="1"/>
+          </p:nvPr>
+        </p:nvSpPr>
+        <p:spPr>
+          <a:xfrm>
+            <a:off x="457200" y="1106714"/>
+            <a:ext cx="8229600" cy="3693885"/>
+          </a:xfrm>
+        </p:spPr>
+        <p:txBody>
+          <a:bodyPr>
+            <a:normAutofit fontScale="92500" lnSpcReduction="10000"/>
+          </a:bodyPr>
+          <a:lstStyle/>
+          <a:p>
+            <a:pPr marL="0" lvl="0" indent="0">
+              <a:buNone/>
+            </a:pPr>
+            <a:r>
+              <a:rPr dirty="0"/>
+              <a:t>There are several variations of the basi</a:t>
+            </a:r>
+            <a:r>
+              <a:rPr lang="en-US" dirty="0"/>
+              <a:t>c</a:t>
+            </a:r>
+            <a:r>
+              <a:rPr dirty="0"/>
+              <a:t> nonparametric bootstrap algorithm</a:t>
+            </a:r>
+          </a:p>
+          <a:p>
+            <a:pPr lvl="0"/>
+            <a:r>
+              <a:rPr dirty="0"/>
+              <a:t>One sample bootstrap</a:t>
+            </a:r>
+          </a:p>
+          <a:p>
+            <a:pPr lvl="1"/>
+            <a:r>
+              <a:rPr dirty="0"/>
+              <a:t>Inference on single population</a:t>
+            </a:r>
+            <a:endParaRPr lang="en-US" dirty="0"/>
+          </a:p>
+          <a:p>
+            <a:pPr lvl="1"/>
+            <a:r>
+              <a:rPr lang="en-US" dirty="0"/>
+              <a:t>One sample statistics</a:t>
+            </a:r>
+            <a:endParaRPr dirty="0"/>
+          </a:p>
+          <a:p>
+            <a:pPr lvl="0"/>
+            <a:r>
+              <a:rPr dirty="0"/>
+              <a:t>Two sample bootstrap</a:t>
+            </a:r>
+          </a:p>
+          <a:p>
+            <a:pPr lvl="1"/>
+            <a:r>
+              <a:rPr dirty="0"/>
+              <a:t>Inference on different populations</a:t>
+            </a:r>
+            <a:endParaRPr lang="en-US" dirty="0"/>
+          </a:p>
+          <a:p>
+            <a:pPr lvl="1"/>
+            <a:r>
+              <a:rPr lang="en-US" dirty="0"/>
+              <a:t>Two sample statistics</a:t>
+            </a:r>
+            <a:endParaRPr dirty="0"/>
+          </a:p>
+          <a:p>
+            <a:pPr lvl="0"/>
+            <a:r>
+              <a:rPr dirty="0"/>
+              <a:t>Special cases</a:t>
+            </a:r>
+          </a:p>
+          <a:p>
+            <a:pPr lvl="1"/>
+            <a:r>
+              <a:rPr dirty="0"/>
+              <a:t>Correlation coefficients - part of your assignment</a:t>
+            </a:r>
+          </a:p>
+        </p:txBody>
+      </p:sp>
+    </p:spTree>
+  </p:cSld>
+  <p:clrMapOvr>
+    <a:masterClrMapping/>
+  </p:clrMapOvr>
+</p:sld>
+</file>
+
+<file path=ppt/slides/slide29.xml><?xml version="1.0" encoding="utf-8"?>
 <p:sld xmlns:a="http://schemas.openxmlformats.org/drawingml/2006/main" xmlns:r="http://schemas.openxmlformats.org/officeDocument/2006/relationships" xmlns:p="http://schemas.openxmlformats.org/presentationml/2006/main">
   <p:cSld>
     <p:spTree>

</xml_diff>

<commit_message>
Added explainatory slide to deck
</commit_message>
<xml_diff>
--- a/LectureSlides/06b_IntroductionToBootstrap.pptx
+++ b/LectureSlides/06b_IntroductionToBootstrap.pptx
@@ -5,7 +5,7 @@
     <p:sldMasterId id="2147483648" r:id="rId1"/>
   </p:sldMasterIdLst>
   <p:notesMasterIdLst>
-    <p:notesMasterId r:id="rId31"/>
+    <p:notesMasterId r:id="rId32"/>
   </p:notesMasterIdLst>
   <p:sldIdLst>
     <p:sldId id="299" r:id="rId2"/>
@@ -28,15 +28,16 @@
     <p:sldId id="273" r:id="rId19"/>
     <p:sldId id="274" r:id="rId20"/>
     <p:sldId id="275" r:id="rId21"/>
-    <p:sldId id="276" r:id="rId22"/>
-    <p:sldId id="277" r:id="rId23"/>
-    <p:sldId id="278" r:id="rId24"/>
-    <p:sldId id="279" r:id="rId25"/>
-    <p:sldId id="280" r:id="rId26"/>
-    <p:sldId id="300" r:id="rId27"/>
-    <p:sldId id="281" r:id="rId28"/>
-    <p:sldId id="282" r:id="rId29"/>
-    <p:sldId id="283" r:id="rId30"/>
+    <p:sldId id="301" r:id="rId22"/>
+    <p:sldId id="276" r:id="rId23"/>
+    <p:sldId id="277" r:id="rId24"/>
+    <p:sldId id="278" r:id="rId25"/>
+    <p:sldId id="279" r:id="rId26"/>
+    <p:sldId id="280" r:id="rId27"/>
+    <p:sldId id="300" r:id="rId28"/>
+    <p:sldId id="281" r:id="rId29"/>
+    <p:sldId id="282" r:id="rId30"/>
+    <p:sldId id="283" r:id="rId31"/>
   </p:sldIdLst>
   <p:sldSz cx="9144000" cy="5143500" type="screen16x9"/>
   <p:notesSz cx="6858000" cy="9144000"/>
@@ -11083,7 +11084,129 @@
       </p:grpSpPr>
       <p:sp>
         <p:nvSpPr>
-          <p:cNvPr id="2" name="Title 1"/>
+          <p:cNvPr id="4" name="Text Placeholder 3"/>
+          <p:cNvSpPr>
+            <a:spLocks noGrp="1"/>
+          </p:cNvSpPr>
+          <p:nvPr>
+            <p:ph type="body" sz="half" idx="2"/>
+          </p:nvPr>
+        </p:nvSpPr>
+        <p:spPr>
+          <a:xfrm>
+            <a:off x="457201" y="1076326"/>
+            <a:ext cx="3653970" cy="3861195"/>
+          </a:xfrm>
+        </p:spPr>
+        <p:txBody>
+          <a:bodyPr>
+            <a:normAutofit fontScale="92500" lnSpcReduction="10000"/>
+          </a:bodyPr>
+          <a:lstStyle/>
+          <a:p>
+            <a:pPr marL="0" lvl="0" indent="0">
+              <a:buNone/>
+            </a:pPr>
+            <a:r>
+              <a:rPr lang="en-US" sz="1800" dirty="0"/>
+              <a:t>How can we interpret this result? </a:t>
+            </a:r>
+            <a:endParaRPr sz="1800" dirty="0"/>
+          </a:p>
+          <a:p>
+            <a:pPr lvl="0" indent="0">
+              <a:buNone/>
+            </a:pPr>
+            <a:r>
+              <a:rPr sz="1800" dirty="0">
+                <a:latin typeface="Courier"/>
+              </a:rPr>
+              <a:t>## bootstrap point estimate =  52.64</a:t>
+            </a:r>
+          </a:p>
+          <a:p>
+            <a:pPr lvl="0" indent="0">
+              <a:buNone/>
+            </a:pPr>
+            <a:r>
+              <a:rPr sz="1800" dirty="0">
+                <a:latin typeface="Courier"/>
+              </a:rPr>
+              <a:t>## At alpha = 0.05, lower and upper bootstrap confidence intervals =  51.</a:t>
+            </a:r>
+            <a:r>
+              <a:rPr lang="en-US" sz="1800" dirty="0">
+                <a:latin typeface="Courier"/>
+              </a:rPr>
+              <a:t>38</a:t>
+            </a:r>
+            <a:r>
+              <a:rPr sz="1800" dirty="0">
+                <a:latin typeface="Courier"/>
+              </a:rPr>
+              <a:t>    53.9</a:t>
+            </a:r>
+            <a:r>
+              <a:rPr lang="en-US" sz="1800" dirty="0">
+                <a:latin typeface="Courier"/>
+              </a:rPr>
+              <a:t>6</a:t>
+            </a:r>
+          </a:p>
+          <a:p>
+            <a:pPr marL="285750" lvl="0" indent="-285750">
+              <a:buFont typeface="Arial" panose="020B0604020202020204" pitchFamily="34" charset="0"/>
+              <a:buChar char="•"/>
+            </a:pPr>
+            <a:r>
+              <a:rPr lang="en-US" sz="1800" dirty="0"/>
+              <a:t>The limits of the CI has the same sign and the CI does not include 0</a:t>
+            </a:r>
+          </a:p>
+          <a:p>
+            <a:pPr marL="285750" lvl="0" indent="-285750">
+              <a:buFont typeface="Arial" panose="020B0604020202020204" pitchFamily="34" charset="0"/>
+              <a:buChar char="•"/>
+            </a:pPr>
+            <a:r>
+              <a:rPr lang="en-US" sz="1800" dirty="0"/>
+              <a:t>With 95% confidence we can say the </a:t>
+            </a:r>
+            <a:r>
+              <a:rPr lang="en-US" sz="1800" b="1" dirty="0"/>
+              <a:t>mean is significantly different from 0 </a:t>
+            </a:r>
+          </a:p>
+          <a:p>
+            <a:pPr marL="285750" lvl="0" indent="-285750">
+              <a:buFont typeface="Arial" panose="020B0604020202020204" pitchFamily="34" charset="0"/>
+              <a:buChar char="•"/>
+            </a:pPr>
+            <a:r>
+              <a:rPr lang="en-US" sz="1800" dirty="0"/>
+              <a:t>We can </a:t>
+            </a:r>
+            <a:r>
+              <a:rPr lang="en-US" sz="1800" b="1" dirty="0"/>
+              <a:t>reject the null hypothesis </a:t>
+            </a:r>
+            <a:r>
+              <a:rPr lang="en-US" sz="1800" dirty="0"/>
+              <a:t>that the mean is 0</a:t>
+            </a:r>
+            <a:endParaRPr sz="1800" dirty="0"/>
+          </a:p>
+        </p:txBody>
+      </p:sp>
+      <p:sp>
+        <p:nvSpPr>
+          <p:cNvPr id="7" name="Title 1">
+            <a:extLst>
+              <a:ext uri="{FF2B5EF4-FFF2-40B4-BE49-F238E27FC236}">
+                <a16:creationId xmlns:a16="http://schemas.microsoft.com/office/drawing/2014/main" id="{C21BD3DB-53BB-E8A7-1936-2716879E2C24}"/>
+              </a:ext>
+            </a:extLst>
+          </p:cNvPr>
           <p:cNvSpPr>
             <a:spLocks noGrp="1"/>
           </p:cNvSpPr>
@@ -11091,112 +11214,64 @@
             <p:ph type="title"/>
           </p:nvPr>
         </p:nvSpPr>
-        <p:spPr/>
-        <p:txBody>
-          <a:bodyPr/>
-          <a:lstStyle/>
-          <a:p>
-            <a:pPr marL="0" lvl="0" indent="0">
+        <p:spPr>
+          <a:xfrm>
+            <a:off x="457200" y="205979"/>
+            <a:ext cx="8229600" cy="621335"/>
+          </a:xfrm>
+        </p:spPr>
+        <p:txBody>
+          <a:bodyPr>
+            <a:normAutofit/>
+          </a:bodyPr>
+          <a:lstStyle/>
+          <a:p>
+            <a:pPr marL="0" lvl="0" indent="0" algn="ctr">
               <a:buNone/>
             </a:pPr>
             <a:r>
-              <a:t>Two Sample Bootstrap</a:t>
-            </a:r>
-          </a:p>
-        </p:txBody>
-      </p:sp>
-      <p:sp>
-        <p:nvSpPr>
-          <p:cNvPr id="3" name="Content Placeholder 2"/>
-          <p:cNvSpPr>
-            <a:spLocks noGrp="1"/>
-          </p:cNvSpPr>
-          <p:nvPr>
-            <p:ph idx="1"/>
-          </p:nvPr>
-        </p:nvSpPr>
-        <p:spPr/>
-        <p:txBody>
-          <a:bodyPr>
-            <a:normAutofit fontScale="92500" lnSpcReduction="20000"/>
-          </a:bodyPr>
-          <a:lstStyle/>
-          <a:p>
-            <a:pPr marL="0" lvl="0" indent="0">
-              <a:buNone/>
-            </a:pPr>
-            <a:r>
-              <a:rPr dirty="0"/>
-              <a:t>How can we apply the bootstrap algorithm for two-sample statistics?</a:t>
-            </a:r>
-          </a:p>
-          <a:p>
-            <a:pPr lvl="0"/>
-            <a:r>
-              <a:rPr dirty="0"/>
-              <a:t>Example, difference of means of two independently sampled populations</a:t>
-            </a:r>
-          </a:p>
-          <a:p>
-            <a:pPr lvl="0"/>
-            <a:r>
-              <a:rPr dirty="0"/>
-              <a:t>How to generate bootstrap samples?</a:t>
-            </a:r>
-          </a:p>
-          <a:p>
-            <a:pPr lvl="0"/>
-            <a:r>
-              <a:rPr dirty="0"/>
-              <a:t>Can we just sample the concatenation of the two samples?</a:t>
-            </a:r>
-          </a:p>
-          <a:p>
-            <a:pPr lvl="0"/>
-            <a:r>
-              <a:rPr b="1" dirty="0"/>
-              <a:t>No!</a:t>
-            </a:r>
-          </a:p>
-          <a:p>
-            <a:pPr lvl="1"/>
-            <a:r>
-              <a:rPr dirty="0"/>
-              <a:t>There is no guarantee of a correct number of resamples for each group</a:t>
-            </a:r>
-          </a:p>
-          <a:p>
-            <a:pPr lvl="1"/>
-            <a:r>
-              <a:rPr dirty="0"/>
-              <a:t>Imbalanced sampling leads to bias</a:t>
-            </a:r>
-          </a:p>
-          <a:p>
-            <a:pPr lvl="0"/>
-            <a:r>
-              <a:rPr dirty="0"/>
-              <a:t>Must </a:t>
-            </a:r>
-            <a:r>
-              <a:rPr b="1" dirty="0"/>
-              <a:t>independently sample the two groups</a:t>
-            </a:r>
-            <a:r>
-              <a:rPr dirty="0"/>
-              <a:t> or populations</a:t>
-            </a:r>
-          </a:p>
-          <a:p>
-            <a:pPr lvl="0"/>
-            <a:r>
-              <a:rPr dirty="0"/>
-              <a:t>Compute the statistic from the two samples</a:t>
-            </a:r>
-          </a:p>
-        </p:txBody>
-      </p:sp>
+              <a:rPr sz="3200" dirty="0"/>
+              <a:t>Example; One Sample Bootstrap</a:t>
+            </a:r>
+          </a:p>
+        </p:txBody>
+      </p:sp>
+      <p:pic>
+        <p:nvPicPr>
+          <p:cNvPr id="9" name="Picture 8">
+            <a:extLst>
+              <a:ext uri="{FF2B5EF4-FFF2-40B4-BE49-F238E27FC236}">
+                <a16:creationId xmlns:a16="http://schemas.microsoft.com/office/drawing/2014/main" id="{D5276CF4-C540-B685-9C06-4091D3E55477}"/>
+              </a:ext>
+            </a:extLst>
+          </p:cNvPr>
+          <p:cNvPicPr>
+            <a:picLocks noChangeAspect="1"/>
+          </p:cNvPicPr>
+          <p:nvPr/>
+        </p:nvPicPr>
+        <p:blipFill>
+          <a:blip r:embed="rId2"/>
+          <a:stretch>
+            <a:fillRect/>
+          </a:stretch>
+        </p:blipFill>
+        <p:spPr>
+          <a:xfrm>
+            <a:off x="4144206" y="1371445"/>
+            <a:ext cx="4999794" cy="3285040"/>
+          </a:xfrm>
+          <a:prstGeom prst="rect">
+            <a:avLst/>
+          </a:prstGeom>
+        </p:spPr>
+      </p:pic>
     </p:spTree>
+    <p:extLst>
+      <p:ext uri="{BB962C8B-B14F-4D97-AF65-F5344CB8AC3E}">
+        <p14:creationId xmlns:p14="http://schemas.microsoft.com/office/powerpoint/2010/main" val="2373946948"/>
+      </p:ext>
+    </p:extLst>
   </p:cSld>
   <p:clrMapOvr>
     <a:masterClrMapping/>
@@ -11240,14 +11315,8 @@
               <a:buNone/>
             </a:pPr>
             <a:r>
-              <a:rPr dirty="0"/>
               <a:t>Two Sample Bootstrap</a:t>
             </a:r>
-            <a:r>
-              <a:rPr lang="en-US" dirty="0"/>
-              <a:t> Algorithm</a:t>
-            </a:r>
-            <a:endParaRPr dirty="0"/>
           </a:p>
         </p:txBody>
       </p:sp>
@@ -11264,7 +11333,7 @@
         <p:spPr/>
         <p:txBody>
           <a:bodyPr>
-            <a:normAutofit fontScale="92500" lnSpcReduction="10000"/>
+            <a:normAutofit fontScale="92500" lnSpcReduction="20000"/>
           </a:bodyPr>
           <a:lstStyle/>
           <a:p>
@@ -11273,114 +11342,72 @@
             </a:pPr>
             <a:r>
               <a:rPr dirty="0"/>
-              <a:t>Example: algorithm to compute difference of means:</a:t>
-            </a:r>
-          </a:p>
-          <a:p>
-            <a:pPr marL="342900" lvl="0" indent="-342900">
-              <a:buAutoNum type="arabicPeriod"/>
-            </a:pPr>
-            <a:r>
-              <a:rPr lang="en-US" dirty="0"/>
-              <a:t>From original observations of length n and m, </a:t>
-            </a:r>
+              <a:t>How can we apply the bootstrap algorithm for two-sample statistics?</a:t>
+            </a:r>
+          </a:p>
+          <a:p>
+            <a:pPr lvl="0"/>
+            <a:r>
+              <a:rPr dirty="0"/>
+              <a:t>Example, difference of means of two independently sampled populations</a:t>
+            </a:r>
+          </a:p>
+          <a:p>
+            <a:pPr lvl="0"/>
+            <a:r>
+              <a:rPr dirty="0"/>
+              <a:t>How to generate bootstrap samples?</a:t>
+            </a:r>
+          </a:p>
+          <a:p>
+            <a:pPr lvl="0"/>
+            <a:r>
+              <a:rPr dirty="0"/>
+              <a:t>Can we just sample the concatenation of the two samples?</a:t>
+            </a:r>
+          </a:p>
+          <a:p>
+            <a:pPr lvl="0"/>
             <a:r>
               <a:rPr b="1" dirty="0"/>
-              <a:t>Bernoulli sample</a:t>
-            </a:r>
+              <a:t>No!</a:t>
+            </a:r>
+          </a:p>
+          <a:p>
+            <a:pPr lvl="1"/>
             <a:r>
               <a:rPr dirty="0"/>
-              <a:t> n</a:t>
-            </a:r>
-            <a:r>
-              <a:rPr lang="en-US" dirty="0"/>
-              <a:t> and m</a:t>
-            </a:r>
+              <a:t>There is no guarantee of a correct number of resamples for each group</a:t>
+            </a:r>
+          </a:p>
+          <a:p>
+            <a:pPr lvl="1"/>
             <a:r>
               <a:rPr dirty="0"/>
-              <a:t> </a:t>
-            </a:r>
-            <a:r>
-              <a:rPr lang="en-US" dirty="0"/>
-              <a:t>values</a:t>
-            </a:r>
+              <a:t>Imbalanced sampling leads to bias</a:t>
+            </a:r>
+          </a:p>
+          <a:p>
+            <a:pPr lvl="0"/>
             <a:r>
               <a:rPr dirty="0"/>
-              <a:t> </a:t>
+              <a:t>Must </a:t>
             </a:r>
             <a:r>
               <a:rPr b="1" dirty="0"/>
-              <a:t>with replacement</a:t>
+              <a:t>independently sample the two groups</a:t>
             </a:r>
             <a:r>
               <a:rPr dirty="0"/>
-              <a:t> </a:t>
-            </a:r>
-            <a:endParaRPr lang="en-US" dirty="0"/>
-          </a:p>
-          <a:p>
-            <a:pPr lvl="1"/>
+              <a:t> or populations</a:t>
+            </a:r>
+          </a:p>
+          <a:p>
+            <a:pPr lvl="0"/>
             <a:r>
               <a:rPr dirty="0"/>
-              <a:t>The number of resamples for each </a:t>
-            </a:r>
-            <a:r>
-              <a:rPr lang="en-US" dirty="0"/>
-              <a:t>set of observations</a:t>
-            </a:r>
-            <a:r>
-              <a:rPr dirty="0"/>
-              <a:t> is the number of samples </a:t>
-            </a:r>
-            <a:r>
-              <a:rPr lang="en-US" dirty="0"/>
-              <a:t>from</a:t>
-            </a:r>
-            <a:r>
-              <a:rPr dirty="0"/>
-              <a:t> </a:t>
-            </a:r>
-            <a:r>
-              <a:rPr lang="en-US" dirty="0"/>
-              <a:t>each</a:t>
-            </a:r>
-            <a:r>
-              <a:rPr dirty="0"/>
-              <a:t> population</a:t>
-            </a:r>
-          </a:p>
-          <a:p>
-            <a:pPr marL="342900" lvl="0" indent="-342900">
-              <a:buAutoNum type="arabicPeriod"/>
-            </a:pPr>
-            <a:r>
-              <a:rPr dirty="0"/>
-              <a:t>Compute the two-sample statistic; e.g. difference of means</a:t>
-            </a:r>
-          </a:p>
-          <a:p>
-            <a:pPr marL="342900" lvl="0" indent="-342900">
-              <a:buAutoNum type="arabicPeriod"/>
-            </a:pPr>
-            <a:r>
-              <a:rPr lang="en-US" dirty="0"/>
-              <a:t>Repeat steps 1 and 2 to accumulate the required number of bootstrap samples</a:t>
-            </a:r>
-          </a:p>
-          <a:p>
-            <a:pPr marL="342900" lvl="0" indent="-342900">
-              <a:buAutoNum type="arabicPeriod"/>
-            </a:pPr>
-            <a:r>
-              <a:rPr lang="en-US" dirty="0"/>
-              <a:t>The mean of the bootstrap distribution is the bootstrap point estimate of the two-sample statistic</a:t>
-            </a:r>
-          </a:p>
-          <a:p>
-            <a:pPr marL="342900" lvl="0" indent="-342900">
-              <a:buAutoNum type="arabicPeriod"/>
-            </a:pPr>
-            <a:endParaRPr dirty="0"/>
+              <a:t>Compute the statistic from the two samples</a:t>
+            </a:r>
           </a:p>
         </p:txBody>
       </p:sp>
@@ -11393,6 +11420,194 @@
 </file>
 
 <file path=ppt/slides/slide23.xml><?xml version="1.0" encoding="utf-8"?>
+<p:sld xmlns:a="http://schemas.openxmlformats.org/drawingml/2006/main" xmlns:r="http://schemas.openxmlformats.org/officeDocument/2006/relationships" xmlns:p="http://schemas.openxmlformats.org/presentationml/2006/main">
+  <p:cSld>
+    <p:spTree>
+      <p:nvGrpSpPr>
+        <p:cNvPr id="1" name=""/>
+        <p:cNvGrpSpPr/>
+        <p:nvPr/>
+      </p:nvGrpSpPr>
+      <p:grpSpPr>
+        <a:xfrm>
+          <a:off x="0" y="0"/>
+          <a:ext cx="0" cy="0"/>
+          <a:chOff x="0" y="0"/>
+          <a:chExt cx="0" cy="0"/>
+        </a:xfrm>
+      </p:grpSpPr>
+      <p:sp>
+        <p:nvSpPr>
+          <p:cNvPr id="2" name="Title 1"/>
+          <p:cNvSpPr>
+            <a:spLocks noGrp="1"/>
+          </p:cNvSpPr>
+          <p:nvPr>
+            <p:ph type="title"/>
+          </p:nvPr>
+        </p:nvSpPr>
+        <p:spPr/>
+        <p:txBody>
+          <a:bodyPr/>
+          <a:lstStyle/>
+          <a:p>
+            <a:pPr marL="0" lvl="0" indent="0">
+              <a:buNone/>
+            </a:pPr>
+            <a:r>
+              <a:rPr dirty="0"/>
+              <a:t>Two Sample Bootstrap</a:t>
+            </a:r>
+            <a:r>
+              <a:rPr lang="en-US" dirty="0"/>
+              <a:t> Algorithm</a:t>
+            </a:r>
+            <a:endParaRPr dirty="0"/>
+          </a:p>
+        </p:txBody>
+      </p:sp>
+      <p:sp>
+        <p:nvSpPr>
+          <p:cNvPr id="3" name="Content Placeholder 2"/>
+          <p:cNvSpPr>
+            <a:spLocks noGrp="1"/>
+          </p:cNvSpPr>
+          <p:nvPr>
+            <p:ph idx="1"/>
+          </p:nvPr>
+        </p:nvSpPr>
+        <p:spPr/>
+        <p:txBody>
+          <a:bodyPr>
+            <a:normAutofit fontScale="92500" lnSpcReduction="10000"/>
+          </a:bodyPr>
+          <a:lstStyle/>
+          <a:p>
+            <a:pPr marL="0" lvl="0" indent="0">
+              <a:buNone/>
+            </a:pPr>
+            <a:r>
+              <a:rPr dirty="0"/>
+              <a:t>Example: algorithm to compute difference of means:</a:t>
+            </a:r>
+          </a:p>
+          <a:p>
+            <a:pPr marL="342900" lvl="0" indent="-342900">
+              <a:buAutoNum type="arabicPeriod"/>
+            </a:pPr>
+            <a:r>
+              <a:rPr lang="en-US" dirty="0"/>
+              <a:t>From original observations of length n and m, </a:t>
+            </a:r>
+            <a:r>
+              <a:rPr b="1" dirty="0"/>
+              <a:t>Bernoulli sample</a:t>
+            </a:r>
+            <a:r>
+              <a:rPr dirty="0"/>
+              <a:t> n</a:t>
+            </a:r>
+            <a:r>
+              <a:rPr lang="en-US" dirty="0"/>
+              <a:t> and m</a:t>
+            </a:r>
+            <a:r>
+              <a:rPr dirty="0"/>
+              <a:t> </a:t>
+            </a:r>
+            <a:r>
+              <a:rPr lang="en-US" dirty="0"/>
+              <a:t>values</a:t>
+            </a:r>
+            <a:r>
+              <a:rPr dirty="0"/>
+              <a:t> </a:t>
+            </a:r>
+            <a:r>
+              <a:rPr b="1" dirty="0"/>
+              <a:t>with replacement</a:t>
+            </a:r>
+            <a:r>
+              <a:rPr dirty="0"/>
+              <a:t> </a:t>
+            </a:r>
+            <a:endParaRPr lang="en-US" dirty="0"/>
+          </a:p>
+          <a:p>
+            <a:pPr lvl="1"/>
+            <a:r>
+              <a:rPr dirty="0"/>
+              <a:t>The number of resamples for each </a:t>
+            </a:r>
+            <a:r>
+              <a:rPr lang="en-US" dirty="0"/>
+              <a:t>set of observations</a:t>
+            </a:r>
+            <a:r>
+              <a:rPr dirty="0"/>
+              <a:t> is the number of samples </a:t>
+            </a:r>
+            <a:r>
+              <a:rPr lang="en-US" dirty="0"/>
+              <a:t>from</a:t>
+            </a:r>
+            <a:r>
+              <a:rPr dirty="0"/>
+              <a:t> </a:t>
+            </a:r>
+            <a:r>
+              <a:rPr lang="en-US" dirty="0"/>
+              <a:t>each</a:t>
+            </a:r>
+            <a:r>
+              <a:rPr dirty="0"/>
+              <a:t> population</a:t>
+            </a:r>
+          </a:p>
+          <a:p>
+            <a:pPr marL="342900" lvl="0" indent="-342900">
+              <a:buAutoNum type="arabicPeriod"/>
+            </a:pPr>
+            <a:r>
+              <a:rPr dirty="0"/>
+              <a:t>Compute the two-sample statistic; e.g. difference of means</a:t>
+            </a:r>
+          </a:p>
+          <a:p>
+            <a:pPr marL="342900" lvl="0" indent="-342900">
+              <a:buAutoNum type="arabicPeriod"/>
+            </a:pPr>
+            <a:r>
+              <a:rPr lang="en-US" dirty="0"/>
+              <a:t>Repeat steps 1 and 2 to accumulate the required number of bootstrap samples</a:t>
+            </a:r>
+          </a:p>
+          <a:p>
+            <a:pPr marL="342900" lvl="0" indent="-342900">
+              <a:buAutoNum type="arabicPeriod"/>
+            </a:pPr>
+            <a:r>
+              <a:rPr lang="en-US" dirty="0"/>
+              <a:t>The mean of the bootstrap distribution is the bootstrap point estimate of the two-sample statistic</a:t>
+            </a:r>
+          </a:p>
+          <a:p>
+            <a:pPr marL="342900" lvl="0" indent="-342900">
+              <a:buAutoNum type="arabicPeriod"/>
+            </a:pPr>
+            <a:endParaRPr dirty="0"/>
+          </a:p>
+        </p:txBody>
+      </p:sp>
+    </p:spTree>
+  </p:cSld>
+  <p:clrMapOvr>
+    <a:masterClrMapping/>
+  </p:clrMapOvr>
+</p:sld>
+</file>
+
+<file path=ppt/slides/slide24.xml><?xml version="1.0" encoding="utf-8"?>
 <p:sld xmlns:a="http://schemas.openxmlformats.org/drawingml/2006/main" xmlns:r="http://schemas.openxmlformats.org/officeDocument/2006/relationships" xmlns:p="http://schemas.openxmlformats.org/presentationml/2006/main">
   <p:cSld>
     <p:spTree>
@@ -11535,7 +11750,7 @@
 </p:sld>
 </file>
 
-<file path=ppt/slides/slide24.xml><?xml version="1.0" encoding="utf-8"?>
+<file path=ppt/slides/slide25.xml><?xml version="1.0" encoding="utf-8"?>
 <p:sld xmlns:a="http://schemas.openxmlformats.org/drawingml/2006/main" xmlns:r="http://schemas.openxmlformats.org/officeDocument/2006/relationships" xmlns:p="http://schemas.openxmlformats.org/presentationml/2006/main">
   <p:cSld>
     <p:spTree>
@@ -12375,7 +12590,7 @@
 </p:sld>
 </file>
 
-<file path=ppt/slides/slide25.xml><?xml version="1.0" encoding="utf-8"?>
+<file path=ppt/slides/slide26.xml><?xml version="1.0" encoding="utf-8"?>
 <p:sld xmlns:a="http://schemas.openxmlformats.org/drawingml/2006/main" xmlns:r="http://schemas.openxmlformats.org/officeDocument/2006/relationships" xmlns:p="http://schemas.openxmlformats.org/presentationml/2006/main">
   <p:cSld>
     <p:spTree>
@@ -12571,7 +12786,7 @@
 </p:sld>
 </file>
 
-<file path=ppt/slides/slide26.xml><?xml version="1.0" encoding="utf-8"?>
+<file path=ppt/slides/slide27.xml><?xml version="1.0" encoding="utf-8"?>
 <p:sld xmlns:a="http://schemas.openxmlformats.org/drawingml/2006/main" xmlns:r="http://schemas.openxmlformats.org/officeDocument/2006/relationships" xmlns:p="http://schemas.openxmlformats.org/presentationml/2006/main">
   <p:cSld>
     <p:spTree>
@@ -12730,11 +12945,7 @@
             </a:r>
             <a:r>
               <a:rPr lang="en-US" sz="2000" b="1" dirty="0"/>
-              <a:t>cannot reject the </a:t>
-            </a:r>
-            <a:r>
-              <a:rPr lang="en-US" sz="2000" b="1"/>
-              <a:t>null hypothesis! </a:t>
+              <a:t>cannot reject the null hypothesis! </a:t>
             </a:r>
             <a:endParaRPr sz="2000" b="1" dirty="0"/>
           </a:p>
@@ -12783,161 +12994,6 @@
 </p:sld>
 </file>
 
-<file path=ppt/slides/slide27.xml><?xml version="1.0" encoding="utf-8"?>
-<p:sld xmlns:a="http://schemas.openxmlformats.org/drawingml/2006/main" xmlns:r="http://schemas.openxmlformats.org/officeDocument/2006/relationships" xmlns:p="http://schemas.openxmlformats.org/presentationml/2006/main">
-  <p:cSld>
-    <p:spTree>
-      <p:nvGrpSpPr>
-        <p:cNvPr id="1" name=""/>
-        <p:cNvGrpSpPr/>
-        <p:nvPr/>
-      </p:nvGrpSpPr>
-      <p:grpSpPr>
-        <a:xfrm>
-          <a:off x="0" y="0"/>
-          <a:ext cx="0" cy="0"/>
-          <a:chOff x="0" y="0"/>
-          <a:chExt cx="0" cy="0"/>
-        </a:xfrm>
-      </p:grpSpPr>
-      <p:sp>
-        <p:nvSpPr>
-          <p:cNvPr id="2" name="Title 1"/>
-          <p:cNvSpPr>
-            <a:spLocks noGrp="1"/>
-          </p:cNvSpPr>
-          <p:nvPr>
-            <p:ph type="title"/>
-          </p:nvPr>
-        </p:nvSpPr>
-        <p:spPr/>
-        <p:txBody>
-          <a:bodyPr/>
-          <a:lstStyle/>
-          <a:p>
-            <a:pPr marL="0" lvl="0" indent="0">
-              <a:buNone/>
-            </a:pPr>
-            <a:r>
-              <a:t>Summary</a:t>
-            </a:r>
-          </a:p>
-        </p:txBody>
-      </p:sp>
-      <p:sp>
-        <p:nvSpPr>
-          <p:cNvPr id="3" name="Content Placeholder 2"/>
-          <p:cNvSpPr>
-            <a:spLocks noGrp="1"/>
-          </p:cNvSpPr>
-          <p:nvPr>
-            <p:ph idx="1"/>
-          </p:nvPr>
-        </p:nvSpPr>
-        <p:spPr>
-          <a:xfrm>
-            <a:off x="457200" y="1063229"/>
-            <a:ext cx="8229600" cy="3643028"/>
-          </a:xfrm>
-        </p:spPr>
-        <p:txBody>
-          <a:bodyPr>
-            <a:normAutofit fontScale="92500" lnSpcReduction="20000"/>
-          </a:bodyPr>
-          <a:lstStyle/>
-          <a:p>
-            <a:pPr marL="0" lvl="0" indent="0">
-              <a:buNone/>
-            </a:pPr>
-            <a:r>
-              <a:rPr dirty="0"/>
-              <a:t>Bootstrap estimation is widely useful and requires minimal assumption</a:t>
-            </a:r>
-          </a:p>
-          <a:p>
-            <a:pPr lvl="0"/>
-            <a:r>
-              <a:rPr dirty="0"/>
-              <a:t>Bootstrap distribution comprise</a:t>
-            </a:r>
-            <a:r>
-              <a:rPr lang="en-US" dirty="0"/>
-              <a:t>s</a:t>
-            </a:r>
-            <a:r>
-              <a:rPr dirty="0"/>
-              <a:t> values of </a:t>
-            </a:r>
-            <a:r>
-              <a:rPr lang="en-US" dirty="0"/>
-              <a:t>a</a:t>
-            </a:r>
-            <a:r>
-              <a:rPr dirty="0"/>
-              <a:t> statistic computed from bootstrap resamples of the original observations (data sample)</a:t>
-            </a:r>
-          </a:p>
-          <a:p>
-            <a:pPr lvl="0"/>
-            <a:r>
-              <a:rPr dirty="0"/>
-              <a:t>Computing bootstrap distribution requires </a:t>
-            </a:r>
-            <a:r>
-              <a:rPr b="1" dirty="0"/>
-              <a:t>no assumptions about population distribution!</a:t>
-            </a:r>
-          </a:p>
-          <a:p>
-            <a:pPr lvl="1"/>
-            <a:r>
-              <a:rPr dirty="0"/>
-              <a:t>Bootstrap resampling substitutes computer power for paper and pencil statistician power</a:t>
-            </a:r>
-          </a:p>
-          <a:p>
-            <a:pPr lvl="0"/>
-            <a:r>
-              <a:rPr dirty="0"/>
-              <a:t>Bootstrap resampling estimates the </a:t>
-            </a:r>
-            <a:r>
-              <a:rPr b="1" dirty="0"/>
-              <a:t>bootstrap distribution</a:t>
-            </a:r>
-            <a:r>
-              <a:rPr dirty="0"/>
-              <a:t> of a statistic</a:t>
-            </a:r>
-          </a:p>
-          <a:p>
-            <a:pPr lvl="1"/>
-            <a:r>
-              <a:rPr dirty="0"/>
-              <a:t>Compute point estimate of the statistic, or bootstrap estimate</a:t>
-            </a:r>
-          </a:p>
-          <a:p>
-            <a:pPr lvl="1"/>
-            <a:r>
-              <a:rPr lang="en-US" dirty="0"/>
-              <a:t>Compute </a:t>
-            </a:r>
-            <a:r>
-              <a:rPr dirty="0"/>
-              <a:t>bootstrap confidence interval from the bootstrap distribution</a:t>
-            </a:r>
-          </a:p>
-        </p:txBody>
-      </p:sp>
-    </p:spTree>
-  </p:cSld>
-  <p:clrMapOvr>
-    <a:masterClrMapping/>
-  </p:clrMapOvr>
-</p:sld>
-</file>
-
 <file path=ppt/slides/slide28.xml><?xml version="1.0" encoding="utf-8"?>
 <p:sld xmlns:a="http://schemas.openxmlformats.org/drawingml/2006/main" xmlns:r="http://schemas.openxmlformats.org/officeDocument/2006/relationships" xmlns:p="http://schemas.openxmlformats.org/presentationml/2006/main">
   <p:cSld>
@@ -12991,13 +13047,13 @@
         </p:nvSpPr>
         <p:spPr>
           <a:xfrm>
-            <a:off x="457200" y="1106714"/>
-            <a:ext cx="8229600" cy="3693885"/>
+            <a:off x="457200" y="1063229"/>
+            <a:ext cx="8229600" cy="3643028"/>
           </a:xfrm>
         </p:spPr>
         <p:txBody>
           <a:bodyPr>
-            <a:normAutofit fontScale="92500" lnSpcReduction="10000"/>
+            <a:normAutofit fontScale="92500" lnSpcReduction="20000"/>
           </a:bodyPr>
           <a:lstStyle/>
           <a:p>
@@ -13006,75 +13062,81 @@
             </a:pPr>
             <a:r>
               <a:rPr dirty="0"/>
-              <a:t>There are several variations of the basi</a:t>
+              <a:t>Bootstrap estimation is widely useful and requires minimal assumption</a:t>
+            </a:r>
+          </a:p>
+          <a:p>
+            <a:pPr lvl="0"/>
+            <a:r>
+              <a:rPr dirty="0"/>
+              <a:t>Bootstrap distribution comprise</a:t>
             </a:r>
             <a:r>
               <a:rPr lang="en-US" dirty="0"/>
-              <a:t>c</a:t>
+              <a:t>s</a:t>
             </a:r>
             <a:r>
               <a:rPr dirty="0"/>
-              <a:t> nonparametric bootstrap algorithm</a:t>
+              <a:t> values of </a:t>
+            </a:r>
+            <a:r>
+              <a:rPr lang="en-US" dirty="0"/>
+              <a:t>a</a:t>
+            </a:r>
+            <a:r>
+              <a:rPr dirty="0"/>
+              <a:t> statistic computed from bootstrap resamples of the original observations (data sample)</a:t>
             </a:r>
           </a:p>
           <a:p>
             <a:pPr lvl="0"/>
             <a:r>
               <a:rPr dirty="0"/>
-              <a:t>One sample bootstrap</a:t>
+              <a:t>Computing bootstrap distribution requires </a:t>
+            </a:r>
+            <a:r>
+              <a:rPr b="1" dirty="0"/>
+              <a:t>no assumptions about population distribution!</a:t>
             </a:r>
           </a:p>
           <a:p>
             <a:pPr lvl="1"/>
             <a:r>
               <a:rPr dirty="0"/>
-              <a:t>Inference on single population</a:t>
-            </a:r>
-            <a:endParaRPr lang="en-US" dirty="0"/>
+              <a:t>Bootstrap resampling substitutes computer power for paper and pencil statistician power</a:t>
+            </a:r>
+          </a:p>
+          <a:p>
+            <a:pPr lvl="0"/>
+            <a:r>
+              <a:rPr dirty="0"/>
+              <a:t>Bootstrap resampling estimates the </a:t>
+            </a:r>
+            <a:r>
+              <a:rPr b="1" dirty="0"/>
+              <a:t>bootstrap distribution</a:t>
+            </a:r>
+            <a:r>
+              <a:rPr dirty="0"/>
+              <a:t> of a statistic</a:t>
+            </a:r>
           </a:p>
           <a:p>
             <a:pPr lvl="1"/>
             <a:r>
+              <a:rPr dirty="0"/>
+              <a:t>Compute point estimate of the statistic, or bootstrap estimate</a:t>
+            </a:r>
+          </a:p>
+          <a:p>
+            <a:pPr lvl="1"/>
+            <a:r>
               <a:rPr lang="en-US" dirty="0"/>
-              <a:t>One sample statistics</a:t>
-            </a:r>
-            <a:endParaRPr dirty="0"/>
-          </a:p>
-          <a:p>
-            <a:pPr lvl="0"/>
+              <a:t>Compute </a:t>
+            </a:r>
             <a:r>
               <a:rPr dirty="0"/>
-              <a:t>Two sample bootstrap</a:t>
-            </a:r>
-          </a:p>
-          <a:p>
-            <a:pPr lvl="1"/>
-            <a:r>
-              <a:rPr dirty="0"/>
-              <a:t>Inference on different populations</a:t>
-            </a:r>
-            <a:endParaRPr lang="en-US" dirty="0"/>
-          </a:p>
-          <a:p>
-            <a:pPr lvl="1"/>
-            <a:r>
-              <a:rPr lang="en-US" dirty="0"/>
-              <a:t>Two sample statistics</a:t>
-            </a:r>
-            <a:endParaRPr dirty="0"/>
-          </a:p>
-          <a:p>
-            <a:pPr lvl="0"/>
-            <a:r>
-              <a:rPr dirty="0"/>
-              <a:t>Special cases</a:t>
-            </a:r>
-          </a:p>
-          <a:p>
-            <a:pPr lvl="1"/>
-            <a:r>
-              <a:rPr dirty="0"/>
-              <a:t>Correlation coefficients - part of your assignment</a:t>
+              <a:t>bootstrap confidence interval from the bootstrap distribution</a:t>
             </a:r>
           </a:p>
         </p:txBody>
@@ -13088,6 +13150,343 @@
 </file>
 
 <file path=ppt/slides/slide29.xml><?xml version="1.0" encoding="utf-8"?>
+<p:sld xmlns:a="http://schemas.openxmlformats.org/drawingml/2006/main" xmlns:r="http://schemas.openxmlformats.org/officeDocument/2006/relationships" xmlns:p="http://schemas.openxmlformats.org/presentationml/2006/main">
+  <p:cSld>
+    <p:spTree>
+      <p:nvGrpSpPr>
+        <p:cNvPr id="1" name=""/>
+        <p:cNvGrpSpPr/>
+        <p:nvPr/>
+      </p:nvGrpSpPr>
+      <p:grpSpPr>
+        <a:xfrm>
+          <a:off x="0" y="0"/>
+          <a:ext cx="0" cy="0"/>
+          <a:chOff x="0" y="0"/>
+          <a:chExt cx="0" cy="0"/>
+        </a:xfrm>
+      </p:grpSpPr>
+      <p:sp>
+        <p:nvSpPr>
+          <p:cNvPr id="2" name="Title 1"/>
+          <p:cNvSpPr>
+            <a:spLocks noGrp="1"/>
+          </p:cNvSpPr>
+          <p:nvPr>
+            <p:ph type="title"/>
+          </p:nvPr>
+        </p:nvSpPr>
+        <p:spPr/>
+        <p:txBody>
+          <a:bodyPr/>
+          <a:lstStyle/>
+          <a:p>
+            <a:pPr marL="0" lvl="0" indent="0">
+              <a:buNone/>
+            </a:pPr>
+            <a:r>
+              <a:t>Summary</a:t>
+            </a:r>
+          </a:p>
+        </p:txBody>
+      </p:sp>
+      <p:sp>
+        <p:nvSpPr>
+          <p:cNvPr id="3" name="Content Placeholder 2"/>
+          <p:cNvSpPr>
+            <a:spLocks noGrp="1"/>
+          </p:cNvSpPr>
+          <p:nvPr>
+            <p:ph idx="1"/>
+          </p:nvPr>
+        </p:nvSpPr>
+        <p:spPr>
+          <a:xfrm>
+            <a:off x="457200" y="1106714"/>
+            <a:ext cx="8229600" cy="3693885"/>
+          </a:xfrm>
+        </p:spPr>
+        <p:txBody>
+          <a:bodyPr>
+            <a:normAutofit fontScale="92500" lnSpcReduction="10000"/>
+          </a:bodyPr>
+          <a:lstStyle/>
+          <a:p>
+            <a:pPr marL="0" lvl="0" indent="0">
+              <a:buNone/>
+            </a:pPr>
+            <a:r>
+              <a:rPr dirty="0"/>
+              <a:t>There are several variations of the basi</a:t>
+            </a:r>
+            <a:r>
+              <a:rPr lang="en-US" dirty="0"/>
+              <a:t>c</a:t>
+            </a:r>
+            <a:r>
+              <a:rPr dirty="0"/>
+              <a:t> nonparametric bootstrap algorithm</a:t>
+            </a:r>
+          </a:p>
+          <a:p>
+            <a:pPr lvl="0"/>
+            <a:r>
+              <a:rPr dirty="0"/>
+              <a:t>One sample bootstrap</a:t>
+            </a:r>
+          </a:p>
+          <a:p>
+            <a:pPr lvl="1"/>
+            <a:r>
+              <a:rPr dirty="0"/>
+              <a:t>Inference on single population</a:t>
+            </a:r>
+            <a:endParaRPr lang="en-US" dirty="0"/>
+          </a:p>
+          <a:p>
+            <a:pPr lvl="1"/>
+            <a:r>
+              <a:rPr lang="en-US" dirty="0"/>
+              <a:t>One sample statistics</a:t>
+            </a:r>
+            <a:endParaRPr dirty="0"/>
+          </a:p>
+          <a:p>
+            <a:pPr lvl="0"/>
+            <a:r>
+              <a:rPr dirty="0"/>
+              <a:t>Two sample bootstrap</a:t>
+            </a:r>
+          </a:p>
+          <a:p>
+            <a:pPr lvl="1"/>
+            <a:r>
+              <a:rPr dirty="0"/>
+              <a:t>Inference on different populations</a:t>
+            </a:r>
+            <a:endParaRPr lang="en-US" dirty="0"/>
+          </a:p>
+          <a:p>
+            <a:pPr lvl="1"/>
+            <a:r>
+              <a:rPr lang="en-US" dirty="0"/>
+              <a:t>Two sample statistics</a:t>
+            </a:r>
+            <a:endParaRPr dirty="0"/>
+          </a:p>
+          <a:p>
+            <a:pPr lvl="0"/>
+            <a:r>
+              <a:rPr dirty="0"/>
+              <a:t>Special cases</a:t>
+            </a:r>
+          </a:p>
+          <a:p>
+            <a:pPr lvl="1"/>
+            <a:r>
+              <a:rPr dirty="0"/>
+              <a:t>Correlation coefficients - part of your assignment</a:t>
+            </a:r>
+          </a:p>
+        </p:txBody>
+      </p:sp>
+    </p:spTree>
+  </p:cSld>
+  <p:clrMapOvr>
+    <a:masterClrMapping/>
+  </p:clrMapOvr>
+</p:sld>
+</file>
+
+<file path=ppt/slides/slide3.xml><?xml version="1.0" encoding="utf-8"?>
+<p:sld xmlns:a="http://schemas.openxmlformats.org/drawingml/2006/main" xmlns:r="http://schemas.openxmlformats.org/officeDocument/2006/relationships" xmlns:p="http://schemas.openxmlformats.org/presentationml/2006/main">
+  <p:cSld>
+    <p:spTree>
+      <p:nvGrpSpPr>
+        <p:cNvPr id="1" name=""/>
+        <p:cNvGrpSpPr/>
+        <p:nvPr/>
+      </p:nvGrpSpPr>
+      <p:grpSpPr>
+        <a:xfrm>
+          <a:off x="0" y="0"/>
+          <a:ext cx="0" cy="0"/>
+          <a:chOff x="0" y="0"/>
+          <a:chExt cx="0" cy="0"/>
+        </a:xfrm>
+      </p:grpSpPr>
+      <p:sp>
+        <p:nvSpPr>
+          <p:cNvPr id="2" name="Title 1"/>
+          <p:cNvSpPr>
+            <a:spLocks noGrp="1"/>
+          </p:cNvSpPr>
+          <p:nvPr>
+            <p:ph type="title"/>
+          </p:nvPr>
+        </p:nvSpPr>
+        <p:spPr/>
+        <p:txBody>
+          <a:bodyPr/>
+          <a:lstStyle/>
+          <a:p>
+            <a:pPr marL="0" lvl="0" indent="0">
+              <a:buNone/>
+            </a:pPr>
+            <a:r>
+              <a:t>Types of Resampling Methods</a:t>
+            </a:r>
+          </a:p>
+        </p:txBody>
+      </p:sp>
+      <p:sp>
+        <p:nvSpPr>
+          <p:cNvPr id="3" name="Content Placeholder 2"/>
+          <p:cNvSpPr>
+            <a:spLocks noGrp="1"/>
+          </p:cNvSpPr>
+          <p:nvPr>
+            <p:ph idx="1"/>
+          </p:nvPr>
+        </p:nvSpPr>
+        <p:spPr>
+          <a:xfrm>
+            <a:off x="457200" y="1139371"/>
+            <a:ext cx="8229600" cy="3715658"/>
+          </a:xfrm>
+        </p:spPr>
+        <p:txBody>
+          <a:bodyPr>
+            <a:normAutofit fontScale="70000" lnSpcReduction="20000"/>
+          </a:bodyPr>
+          <a:lstStyle/>
+          <a:p>
+            <a:pPr marL="0" lvl="0" indent="0">
+              <a:buNone/>
+            </a:pPr>
+            <a:r>
+              <a:rPr dirty="0"/>
+              <a:t>Commonly used re-sampling methods include:</a:t>
+            </a:r>
+          </a:p>
+          <a:p>
+            <a:pPr lvl="0"/>
+            <a:r>
+              <a:rPr b="1" dirty="0"/>
+              <a:t>Randomization or Permutation methods:</a:t>
+            </a:r>
+            <a:r>
+              <a:rPr dirty="0"/>
+              <a:t> aka exact tests</a:t>
+            </a:r>
+          </a:p>
+          <a:p>
+            <a:pPr lvl="1"/>
+            <a:r>
+              <a:rPr dirty="0"/>
+              <a:t>Have a long history; e.g. Fisher’s exact test (1922)</a:t>
+            </a:r>
+          </a:p>
+          <a:p>
+            <a:pPr lvl="1"/>
+            <a:r>
+              <a:rPr dirty="0"/>
+              <a:t>Practical approximate algorithms for larger data sets in computer era</a:t>
+            </a:r>
+          </a:p>
+          <a:p>
+            <a:pPr lvl="0"/>
+            <a:r>
+              <a:rPr b="1" dirty="0"/>
+              <a:t>Cross validation:</a:t>
+            </a:r>
+            <a:r>
+              <a:rPr dirty="0"/>
+              <a:t> resample into multiple folds without replacement</a:t>
+            </a:r>
+          </a:p>
+          <a:p>
+            <a:pPr lvl="1"/>
+            <a:r>
+              <a:rPr dirty="0"/>
+              <a:t>Leave n out method</a:t>
+            </a:r>
+          </a:p>
+          <a:p>
+            <a:pPr lvl="1"/>
+            <a:r>
+              <a:rPr dirty="0"/>
+              <a:t>Has origins in the 1950s</a:t>
+            </a:r>
+          </a:p>
+          <a:p>
+            <a:pPr lvl="1"/>
+            <a:r>
+              <a:rPr dirty="0"/>
+              <a:t>Widely used to evaluate machine learning (ML) models</a:t>
+            </a:r>
+          </a:p>
+          <a:p>
+            <a:pPr lvl="0"/>
+            <a:r>
+              <a:rPr b="1" dirty="0"/>
+              <a:t>Jackknife:</a:t>
+            </a:r>
+            <a:r>
+              <a:rPr dirty="0"/>
+              <a:t> leave one out re-sampling</a:t>
+            </a:r>
+          </a:p>
+          <a:p>
+            <a:pPr lvl="1"/>
+            <a:r>
+              <a:rPr dirty="0"/>
+              <a:t>Leave one out method</a:t>
+            </a:r>
+          </a:p>
+          <a:p>
+            <a:pPr lvl="1"/>
+            <a:r>
+              <a:rPr dirty="0"/>
+              <a:t>Early general purpose resampling method</a:t>
+            </a:r>
+          </a:p>
+          <a:p>
+            <a:pPr lvl="1"/>
+            <a:r>
+              <a:rPr dirty="0"/>
+              <a:t>Has origins in the 1950s</a:t>
+            </a:r>
+          </a:p>
+          <a:p>
+            <a:pPr lvl="0"/>
+            <a:r>
+              <a:rPr b="1" dirty="0"/>
+              <a:t>Nonparametric Bootstrap:</a:t>
+            </a:r>
+            <a:r>
+              <a:rPr dirty="0"/>
+              <a:t> resample with equivalent size and replacement - our focus here</a:t>
+            </a:r>
+          </a:p>
+          <a:p>
+            <a:pPr lvl="1"/>
+            <a:r>
+              <a:rPr dirty="0"/>
+              <a:t>Published by Prof Brad Efron in 1979</a:t>
+            </a:r>
+          </a:p>
+        </p:txBody>
+      </p:sp>
+    </p:spTree>
+  </p:cSld>
+  <p:clrMapOvr>
+    <a:masterClrMapping/>
+  </p:clrMapOvr>
+</p:sld>
+</file>
+
+<file path=ppt/slides/slide30.xml><?xml version="1.0" encoding="utf-8"?>
 <p:sld xmlns:a="http://schemas.openxmlformats.org/drawingml/2006/main" xmlns:r="http://schemas.openxmlformats.org/officeDocument/2006/relationships" xmlns:p="http://schemas.openxmlformats.org/presentationml/2006/main">
   <p:cSld>
     <p:spTree>
@@ -13287,194 +13686,6 @@
           </p:sp>
         </mc:Fallback>
       </mc:AlternateContent>
-    </p:spTree>
-  </p:cSld>
-  <p:clrMapOvr>
-    <a:masterClrMapping/>
-  </p:clrMapOvr>
-</p:sld>
-</file>
-
-<file path=ppt/slides/slide3.xml><?xml version="1.0" encoding="utf-8"?>
-<p:sld xmlns:a="http://schemas.openxmlformats.org/drawingml/2006/main" xmlns:r="http://schemas.openxmlformats.org/officeDocument/2006/relationships" xmlns:p="http://schemas.openxmlformats.org/presentationml/2006/main">
-  <p:cSld>
-    <p:spTree>
-      <p:nvGrpSpPr>
-        <p:cNvPr id="1" name=""/>
-        <p:cNvGrpSpPr/>
-        <p:nvPr/>
-      </p:nvGrpSpPr>
-      <p:grpSpPr>
-        <a:xfrm>
-          <a:off x="0" y="0"/>
-          <a:ext cx="0" cy="0"/>
-          <a:chOff x="0" y="0"/>
-          <a:chExt cx="0" cy="0"/>
-        </a:xfrm>
-      </p:grpSpPr>
-      <p:sp>
-        <p:nvSpPr>
-          <p:cNvPr id="2" name="Title 1"/>
-          <p:cNvSpPr>
-            <a:spLocks noGrp="1"/>
-          </p:cNvSpPr>
-          <p:nvPr>
-            <p:ph type="title"/>
-          </p:nvPr>
-        </p:nvSpPr>
-        <p:spPr/>
-        <p:txBody>
-          <a:bodyPr/>
-          <a:lstStyle/>
-          <a:p>
-            <a:pPr marL="0" lvl="0" indent="0">
-              <a:buNone/>
-            </a:pPr>
-            <a:r>
-              <a:t>Types of Resampling Methods</a:t>
-            </a:r>
-          </a:p>
-        </p:txBody>
-      </p:sp>
-      <p:sp>
-        <p:nvSpPr>
-          <p:cNvPr id="3" name="Content Placeholder 2"/>
-          <p:cNvSpPr>
-            <a:spLocks noGrp="1"/>
-          </p:cNvSpPr>
-          <p:nvPr>
-            <p:ph idx="1"/>
-          </p:nvPr>
-        </p:nvSpPr>
-        <p:spPr>
-          <a:xfrm>
-            <a:off x="457200" y="1139371"/>
-            <a:ext cx="8229600" cy="3715658"/>
-          </a:xfrm>
-        </p:spPr>
-        <p:txBody>
-          <a:bodyPr>
-            <a:normAutofit fontScale="70000" lnSpcReduction="20000"/>
-          </a:bodyPr>
-          <a:lstStyle/>
-          <a:p>
-            <a:pPr marL="0" lvl="0" indent="0">
-              <a:buNone/>
-            </a:pPr>
-            <a:r>
-              <a:rPr dirty="0"/>
-              <a:t>Commonly used re-sampling methods include:</a:t>
-            </a:r>
-          </a:p>
-          <a:p>
-            <a:pPr lvl="0"/>
-            <a:r>
-              <a:rPr b="1" dirty="0"/>
-              <a:t>Randomization or Permutation methods:</a:t>
-            </a:r>
-            <a:r>
-              <a:rPr dirty="0"/>
-              <a:t> aka exact tests</a:t>
-            </a:r>
-          </a:p>
-          <a:p>
-            <a:pPr lvl="1"/>
-            <a:r>
-              <a:rPr dirty="0"/>
-              <a:t>Have a long history; e.g. Fisher’s exact test (1922)</a:t>
-            </a:r>
-          </a:p>
-          <a:p>
-            <a:pPr lvl="1"/>
-            <a:r>
-              <a:rPr dirty="0"/>
-              <a:t>Practical approximate algorithms for larger data sets in computer era</a:t>
-            </a:r>
-          </a:p>
-          <a:p>
-            <a:pPr lvl="0"/>
-            <a:r>
-              <a:rPr b="1" dirty="0"/>
-              <a:t>Cross validation:</a:t>
-            </a:r>
-            <a:r>
-              <a:rPr dirty="0"/>
-              <a:t> resample into multiple folds without replacement</a:t>
-            </a:r>
-          </a:p>
-          <a:p>
-            <a:pPr lvl="1"/>
-            <a:r>
-              <a:rPr dirty="0"/>
-              <a:t>Leave n out method</a:t>
-            </a:r>
-          </a:p>
-          <a:p>
-            <a:pPr lvl="1"/>
-            <a:r>
-              <a:rPr dirty="0"/>
-              <a:t>Has origins in the 1950s</a:t>
-            </a:r>
-          </a:p>
-          <a:p>
-            <a:pPr lvl="1"/>
-            <a:r>
-              <a:rPr dirty="0"/>
-              <a:t>Widely used to evaluate machine learning (ML) models</a:t>
-            </a:r>
-          </a:p>
-          <a:p>
-            <a:pPr lvl="0"/>
-            <a:r>
-              <a:rPr b="1" dirty="0"/>
-              <a:t>Jackknife:</a:t>
-            </a:r>
-            <a:r>
-              <a:rPr dirty="0"/>
-              <a:t> leave one out re-sampling</a:t>
-            </a:r>
-          </a:p>
-          <a:p>
-            <a:pPr lvl="1"/>
-            <a:r>
-              <a:rPr dirty="0"/>
-              <a:t>Leave one out method</a:t>
-            </a:r>
-          </a:p>
-          <a:p>
-            <a:pPr lvl="1"/>
-            <a:r>
-              <a:rPr dirty="0"/>
-              <a:t>Early general purpose resampling method</a:t>
-            </a:r>
-          </a:p>
-          <a:p>
-            <a:pPr lvl="1"/>
-            <a:r>
-              <a:rPr dirty="0"/>
-              <a:t>Has origins in the 1950s</a:t>
-            </a:r>
-          </a:p>
-          <a:p>
-            <a:pPr lvl="0"/>
-            <a:r>
-              <a:rPr b="1" dirty="0"/>
-              <a:t>Nonparametric Bootstrap:</a:t>
-            </a:r>
-            <a:r>
-              <a:rPr dirty="0"/>
-              <a:t> resample with equivalent size and replacement - our focus here</a:t>
-            </a:r>
-          </a:p>
-          <a:p>
-            <a:pPr lvl="1"/>
-            <a:r>
-              <a:rPr dirty="0"/>
-              <a:t>Published by Prof Brad Efron in 1979</a:t>
-            </a:r>
-          </a:p>
-        </p:txBody>
-      </p:sp>
     </p:spTree>
   </p:cSld>
   <p:clrMapOvr>

</xml_diff>

<commit_message>
Updates and corrections to slides
</commit_message>
<xml_diff>
--- a/LectureSlides/06b_IntroductionToBootstrap.pptx
+++ b/LectureSlides/06b_IntroductionToBootstrap.pptx
@@ -4059,6 +4059,11 @@
               <a:rPr dirty="0"/>
               <a:t>Repeat steps 1 and 2 to accumulate the required number of bootstrap samples</a:t>
             </a:r>
+            <a:r>
+              <a:rPr lang="en-US" dirty="0"/>
+              <a:t> of the statistic</a:t>
+            </a:r>
+            <a:endParaRPr dirty="0"/>
           </a:p>
           <a:p>
             <a:pPr marL="342900" lvl="0" indent="-342900">
@@ -10279,8 +10284,8 @@
           </a:p>
         </p:txBody>
       </p:sp>
-      <mc:AlternateContent xmlns:mc="http://schemas.openxmlformats.org/markup-compatibility/2006" xmlns:a14="http://schemas.microsoft.com/office/drawing/2010/main">
-        <mc:Choice Requires="a14">
+      <mc:AlternateContent xmlns:mc="http://schemas.openxmlformats.org/markup-compatibility/2006">
+        <mc:Choice xmlns:a14="http://schemas.microsoft.com/office/drawing/2010/main" Requires="a14">
           <p:sp>
             <p:nvSpPr>
               <p:cNvPr id="3" name="Content Placeholder 2"/>
@@ -10307,22 +10312,18 @@
                   <a:buNone/>
                 </a:pPr>
                 <a:r>
-                  <a:rPr dirty="0"/>
-                  <a:t>Distribution of 2000 bootstrap </a:t>
+                  <a:rPr lang="en-US" b="1" dirty="0"/>
+                  <a:t>Percentile method </a:t>
                 </a:r>
                 <a:r>
-                  <a:rPr dirty="0" err="1"/>
-                  <a:t>bootstrap</a:t>
-                </a:r>
-                <a:r>
-                  <a:rPr dirty="0"/>
-                  <a:t> confidence intervals?</a:t>
+                  <a:rPr lang="en-US" dirty="0"/>
+                  <a:t>is a simple algorithm for computing bootstrap CIs</a:t>
                 </a:r>
               </a:p>
               <a:p>
                 <a:pPr lvl="0"/>
                 <a:r>
-                  <a:rPr dirty="0"/>
+                  <a:rPr lang="en-US" dirty="0"/>
                   <a:t>Two sided CI percentile method:</a:t>
                 </a:r>
               </a:p>
@@ -10331,56 +10332,74 @@
                   <a:buAutoNum type="arabicPeriod"/>
                 </a:pPr>
                 <a:r>
-                  <a:rPr dirty="0"/>
+                  <a:rPr lang="en-US" dirty="0"/>
                   <a:t>Define confidence level, </a:t>
                 </a:r>
                 <a:r>
-                  <a:rPr dirty="0" err="1"/>
+                  <a:rPr lang="en-US" dirty="0" err="1"/>
                   <a:t>eg.</a:t>
                 </a:r>
                 <a:r>
-                  <a:rPr dirty="0"/>
+                  <a:rPr lang="en-US" dirty="0"/>
                   <a:t> 95% or </a:t>
                 </a:r>
                 <a14:m>
                   <m:oMath xmlns:m="http://schemas.openxmlformats.org/officeDocument/2006/math">
                     <m:r>
-                      <a:rPr>
+                      <a:rPr lang="en-US">
                         <a:latin typeface="Cambria Math" panose="02040503050406030204" pitchFamily="18" charset="0"/>
                       </a:rPr>
                       <m:t>𝛼</m:t>
                     </m:r>
                     <m:r>
-                      <a:rPr>
+                      <a:rPr lang="en-US">
                         <a:latin typeface="Cambria Math" panose="02040503050406030204" pitchFamily="18" charset="0"/>
                       </a:rPr>
-                      <m:t>=0.05</m:t>
+                      <m:t>=</m:t>
+                    </m:r>
+                    <m:r>
+                      <a:rPr lang="en-US">
+                        <a:latin typeface="Cambria Math" panose="02040503050406030204" pitchFamily="18" charset="0"/>
+                      </a:rPr>
+                      <m:t>0</m:t>
+                    </m:r>
+                    <m:r>
+                      <a:rPr lang="en-US">
+                        <a:latin typeface="Cambria Math" panose="02040503050406030204" pitchFamily="18" charset="0"/>
+                      </a:rPr>
+                      <m:t>.</m:t>
+                    </m:r>
+                    <m:r>
+                      <a:rPr lang="en-US">
+                        <a:latin typeface="Cambria Math" panose="02040503050406030204" pitchFamily="18" charset="0"/>
+                      </a:rPr>
+                      <m:t>05</m:t>
                     </m:r>
                   </m:oMath>
                 </a14:m>
-                <a:endParaRPr dirty="0"/>
+                <a:endParaRPr lang="en-US" dirty="0"/>
               </a:p>
               <a:p>
                 <a:pPr marL="685800" lvl="1" indent="-342900">
                   <a:buAutoNum type="arabicPeriod"/>
                 </a:pPr>
                 <a:r>
-                  <a:rPr dirty="0"/>
-                  <a:t>Order b bootstrap samples, </a:t>
+                  <a:rPr lang="en-US" dirty="0"/>
+                  <a:t>Sort b bootstrap samples, </a:t>
                 </a:r>
                 <a14:m>
                   <m:oMath xmlns:m="http://schemas.openxmlformats.org/officeDocument/2006/math">
                     <m:sSub>
                       <m:sSubPr>
                         <m:ctrlPr>
-                          <a:rPr i="1">
+                          <a:rPr lang="ar-AE" i="1">
                             <a:latin typeface="Cambria Math" panose="02040503050406030204" pitchFamily="18" charset="0"/>
                           </a:rPr>
                         </m:ctrlPr>
                       </m:sSubPr>
                       <m:e>
                         <m:r>
-                          <a:rPr>
+                          <a:rPr lang="ar-AE">
                             <a:latin typeface="Cambria Math" panose="02040503050406030204" pitchFamily="18" charset="0"/>
                           </a:rPr>
                           <m:t>𝑠</m:t>
@@ -10388,7 +10407,7 @@
                       </m:e>
                       <m:sub>
                         <m:r>
-                          <a:rPr>
+                          <a:rPr lang="ar-AE">
                             <a:latin typeface="Cambria Math" panose="02040503050406030204" pitchFamily="18" charset="0"/>
                           </a:rPr>
                           <m:t>𝑖</m:t>
@@ -10398,8 +10417,12 @@
                   </m:oMath>
                 </a14:m>
                 <a:r>
-                  <a:rPr dirty="0"/>
-                  <a:t>, by value</a:t>
+                  <a:rPr lang="ar-AE" dirty="0"/>
+                  <a:t>, </a:t>
+                </a:r>
+                <a:r>
+                  <a:rPr lang="en-US" dirty="0"/>
+                  <a:t>in ascending order</a:t>
                 </a:r>
               </a:p>
               <a:p>
@@ -10407,81 +10430,131 @@
                   <a:buAutoNum type="arabicPeriod"/>
                 </a:pPr>
                 <a:r>
-                  <a:rPr dirty="0"/>
+                  <a:rPr lang="en-US" dirty="0"/>
                   <a:t>Lower CI index; </a:t>
                 </a:r>
                 <a14:m>
                   <m:oMath xmlns:m="http://schemas.openxmlformats.org/officeDocument/2006/math">
+                    <m:sSub>
+                      <m:sSubPr>
+                        <m:ctrlPr>
+                          <a:rPr lang="ar-AE" i="1" smtClean="0">
+                            <a:latin typeface="Cambria Math" panose="02040503050406030204" pitchFamily="18" charset="0"/>
+                          </a:rPr>
+                        </m:ctrlPr>
+                      </m:sSubPr>
+                      <m:e>
+                        <m:r>
+                          <a:rPr lang="ar-AE" b="0" i="1" smtClean="0">
+                            <a:latin typeface="Cambria Math" panose="02040503050406030204" pitchFamily="18" charset="0"/>
+                          </a:rPr>
+                          <m:t>𝑖</m:t>
+                        </m:r>
+                      </m:e>
+                      <m:sub>
+                        <m:r>
+                          <a:rPr lang="en-US" b="0" i="1" smtClean="0">
+                            <a:latin typeface="Cambria Math" panose="02040503050406030204" pitchFamily="18" charset="0"/>
+                          </a:rPr>
+                          <m:t>𝑙𝑜𝑤𝑒𝑟</m:t>
+                        </m:r>
+                      </m:sub>
+                    </m:sSub>
                     <m:r>
-                      <a:rPr>
-                        <a:latin typeface="Cambria Math" panose="02040503050406030204" pitchFamily="18" charset="0"/>
-                      </a:rPr>
-                      <m:t>𝑖</m:t>
-                    </m:r>
-                    <m:r>
-                      <a:rPr>
+                      <a:rPr lang="ar-AE">
                         <a:latin typeface="Cambria Math" panose="02040503050406030204" pitchFamily="18" charset="0"/>
                       </a:rPr>
                       <m:t>=</m:t>
                     </m:r>
                     <m:r>
-                      <a:rPr>
+                      <a:rPr lang="ar-AE">
                         <a:latin typeface="Cambria Math" panose="02040503050406030204" pitchFamily="18" charset="0"/>
                       </a:rPr>
                       <m:t>𝑏</m:t>
                     </m:r>
                     <m:r>
-                      <a:rPr>
+                      <a:rPr lang="ar-AE">
                         <a:latin typeface="Cambria Math" panose="02040503050406030204" pitchFamily="18" charset="0"/>
                       </a:rPr>
                       <m:t>∗</m:t>
                     </m:r>
                     <m:r>
-                      <a:rPr>
+                      <a:rPr lang="ar-AE">
                         <a:latin typeface="Cambria Math" panose="02040503050406030204" pitchFamily="18" charset="0"/>
                       </a:rPr>
                       <m:t>𝛼</m:t>
                     </m:r>
                     <m:r>
-                      <a:rPr>
+                      <a:rPr lang="ar-AE">
                         <a:latin typeface="Cambria Math" panose="02040503050406030204" pitchFamily="18" charset="0"/>
                       </a:rPr>
-                      <m:t>/2</m:t>
+                      <m:t>/</m:t>
+                    </m:r>
+                    <m:r>
+                      <a:rPr lang="ar-AE">
+                        <a:latin typeface="Cambria Math" panose="02040503050406030204" pitchFamily="18" charset="0"/>
+                      </a:rPr>
+                      <m:t>2</m:t>
                     </m:r>
                   </m:oMath>
                 </a14:m>
-                <a:endParaRPr dirty="0"/>
+                <a:endParaRPr lang="ar-AE" dirty="0"/>
               </a:p>
               <a:p>
-                <a:pPr marL="685800" lvl="1" indent="-342900">
+                <a:pPr lvl="1">
                   <a:buAutoNum type="arabicPeriod"/>
                 </a:pPr>
                 <a:r>
-                  <a:rPr dirty="0"/>
+                  <a:rPr lang="en-US" dirty="0"/>
                   <a:t>Upper CI index; </a:t>
                 </a:r>
                 <a14:m>
                   <m:oMath xmlns:m="http://schemas.openxmlformats.org/officeDocument/2006/math">
+                    <m:sSub>
+                      <m:sSubPr>
+                        <m:ctrlPr>
+                          <a:rPr lang="ar-AE" i="1">
+                            <a:latin typeface="Cambria Math" panose="02040503050406030204" pitchFamily="18" charset="0"/>
+                          </a:rPr>
+                        </m:ctrlPr>
+                      </m:sSubPr>
+                      <m:e>
+                        <m:r>
+                          <a:rPr lang="ar-AE" i="1">
+                            <a:latin typeface="Cambria Math" panose="02040503050406030204" pitchFamily="18" charset="0"/>
+                          </a:rPr>
+                          <m:t>𝑖</m:t>
+                        </m:r>
+                      </m:e>
+                      <m:sub>
+                        <m:r>
+                          <a:rPr lang="en-US" b="0" i="1" smtClean="0">
+                            <a:latin typeface="Cambria Math" panose="02040503050406030204" pitchFamily="18" charset="0"/>
+                          </a:rPr>
+                          <m:t>𝑢𝑝𝑝</m:t>
+                        </m:r>
+                        <m:r>
+                          <a:rPr lang="en-US" i="1">
+                            <a:latin typeface="Cambria Math" panose="02040503050406030204" pitchFamily="18" charset="0"/>
+                          </a:rPr>
+                          <m:t>𝑒𝑟</m:t>
+                        </m:r>
+                      </m:sub>
+                    </m:sSub>
                     <m:r>
-                      <a:rPr>
-                        <a:latin typeface="Cambria Math" panose="02040503050406030204" pitchFamily="18" charset="0"/>
-                      </a:rPr>
-                      <m:t>𝑖</m:t>
-                    </m:r>
-                    <m:r>
-                      <a:rPr>
+                      <a:rPr lang="en-US">
                         <a:latin typeface="Cambria Math" panose="02040503050406030204" pitchFamily="18" charset="0"/>
                       </a:rPr>
                       <m:t>=</m:t>
                     </m:r>
                     <m:r>
-                      <a:rPr>
+                      <a:rPr lang="en-US">
                         <a:latin typeface="Cambria Math" panose="02040503050406030204" pitchFamily="18" charset="0"/>
                       </a:rPr>
                       <m:t>𝑏</m:t>
                     </m:r>
                     <m:r>
-                      <a:rPr>
+                      <a:rPr lang="en-US">
                         <a:latin typeface="Cambria Math" panose="02040503050406030204" pitchFamily="18" charset="0"/>
                       </a:rPr>
                       <m:t>∗</m:t>
@@ -10489,88 +10562,101 @@
                     <m:d>
                       <m:dPr>
                         <m:ctrlPr>
-                          <a:rPr i="1">
+                          <a:rPr lang="ar-AE" i="1">
                             <a:latin typeface="Cambria Math" panose="02040503050406030204" pitchFamily="18" charset="0"/>
                           </a:rPr>
                         </m:ctrlPr>
                       </m:dPr>
                       <m:e>
                         <m:r>
-                          <a:rPr>
+                          <a:rPr lang="ar-AE">
                             <a:latin typeface="Cambria Math" panose="02040503050406030204" pitchFamily="18" charset="0"/>
                           </a:rPr>
-                          <m:t>1−</m:t>
+                          <m:t>1</m:t>
                         </m:r>
                         <m:r>
-                          <a:rPr>
+                          <a:rPr lang="ar-AE">
+                            <a:latin typeface="Cambria Math" panose="02040503050406030204" pitchFamily="18" charset="0"/>
+                          </a:rPr>
+                          <m:t>−</m:t>
+                        </m:r>
+                        <m:r>
+                          <a:rPr lang="ar-AE">
                             <a:latin typeface="Cambria Math" panose="02040503050406030204" pitchFamily="18" charset="0"/>
                           </a:rPr>
                           <m:t>𝛼</m:t>
                         </m:r>
                         <m:r>
-                          <a:rPr>
+                          <a:rPr lang="ar-AE">
                             <a:latin typeface="Cambria Math" panose="02040503050406030204" pitchFamily="18" charset="0"/>
                           </a:rPr>
-                          <m:t>/2</m:t>
+                          <m:t>/</m:t>
+                        </m:r>
+                        <m:r>
+                          <a:rPr lang="ar-AE">
+                            <a:latin typeface="Cambria Math" panose="02040503050406030204" pitchFamily="18" charset="0"/>
+                          </a:rPr>
+                          <m:t>2</m:t>
                         </m:r>
                       </m:e>
                     </m:d>
                   </m:oMath>
                 </a14:m>
-                <a:endParaRPr dirty="0"/>
+                <a:endParaRPr lang="ar-AE" dirty="0"/>
               </a:p>
               <a:p>
                 <a:pPr lvl="0"/>
                 <a:r>
-                  <a:rPr dirty="0"/>
+                  <a:rPr lang="en-US" dirty="0"/>
                   <a:t>Percentile method is know to be biased</a:t>
                 </a:r>
               </a:p>
               <a:p>
                 <a:pPr lvl="1"/>
                 <a:r>
-                  <a:rPr dirty="0"/>
+                  <a:rPr lang="en-US" dirty="0"/>
                   <a:t>Bias correction methods available</a:t>
                 </a:r>
               </a:p>
               <a:p>
                 <a:pPr lvl="0"/>
                 <a:r>
-                  <a:rPr dirty="0" err="1"/>
+                  <a:rPr lang="en-US" dirty="0" err="1"/>
                   <a:t>Efrom</a:t>
                 </a:r>
                 <a:r>
-                  <a:rPr dirty="0"/>
+                  <a:rPr lang="en-US" dirty="0"/>
                   <a:t> and </a:t>
                 </a:r>
                 <a:r>
-                  <a:rPr dirty="0" err="1"/>
+                  <a:rPr lang="en-US" dirty="0" err="1"/>
                   <a:t>Tibshirani</a:t>
                 </a:r>
                 <a:r>
-                  <a:rPr dirty="0"/>
+                  <a:rPr lang="en-US" dirty="0"/>
                   <a:t> (1993) and Efron and </a:t>
                 </a:r>
                 <a:r>
-                  <a:rPr dirty="0" err="1"/>
+                  <a:rPr lang="en-US" dirty="0" err="1"/>
                   <a:t>Hasti</a:t>
                 </a:r>
                 <a:r>
-                  <a:rPr dirty="0"/>
+                  <a:rPr lang="en-US" dirty="0"/>
                   <a:t> (2016) recommend using at least 2,000 bootstrap samples to estimate confidence intervals</a:t>
                 </a:r>
               </a:p>
               <a:p>
                 <a:pPr lvl="0"/>
                 <a:r>
-                  <a:rPr dirty="0"/>
+                  <a:rPr lang="en-US" dirty="0"/>
                   <a:t>Other authors recommend a larger number (e.g. 5,000-20,000) of resamples given low computer cost</a:t>
                 </a:r>
+                <a:endParaRPr dirty="0"/>
               </a:p>
             </p:txBody>
           </p:sp>
         </mc:Choice>
-        <mc:Fallback xmlns="">
+        <mc:Fallback>
           <p:sp>
             <p:nvSpPr>
               <p:cNvPr id="3" name="Content Placeholder 2"/>
@@ -10698,7 +10784,15 @@
             <a:pPr lvl="0"/>
             <a:r>
               <a:rPr dirty="0"/>
-              <a:t>In practice, bias </a:t>
+              <a:t>In practice, bias</a:t>
+            </a:r>
+            <a:r>
+              <a:rPr lang="en-US" dirty="0"/>
+              <a:t> correction</a:t>
+            </a:r>
+            <a:r>
+              <a:rPr dirty="0"/>
+              <a:t> </a:t>
             </a:r>
             <a:r>
               <a:rPr lang="en-US" dirty="0"/>
@@ -10820,21 +10914,45 @@
             </a:r>
             <a:r>
               <a:rPr dirty="0"/>
-              <a:t>ble in the early 20th Century</a:t>
+              <a:t>ble </a:t>
+            </a:r>
+            <a:r>
+              <a:rPr lang="en-US" dirty="0"/>
+              <a:t>until late </a:t>
+            </a:r>
+            <a:r>
+              <a:rPr dirty="0"/>
+              <a:t>20th Century</a:t>
             </a:r>
           </a:p>
           <a:p>
             <a:pPr lvl="0"/>
             <a:r>
               <a:rPr dirty="0"/>
-              <a:t>Repeatedly re-sampling the data with nonparametric model relaxes some assumptions of classical statistical methods</a:t>
+              <a:t>Repeatedly re-sampling the data </a:t>
+            </a:r>
+            <a:r>
+              <a:rPr lang="en-US" dirty="0"/>
+              <a:t>using</a:t>
+            </a:r>
+            <a:r>
+              <a:rPr dirty="0"/>
+              <a:t> nonparametric model relaxes some assumptions of classical statistical methods</a:t>
             </a:r>
           </a:p>
           <a:p>
             <a:pPr lvl="0"/>
             <a:r>
               <a:rPr dirty="0"/>
-              <a:t>Re-sampling methods draw heavily on the law of large number and the central limit theorem</a:t>
+              <a:t>Re-sampling methods draw heavily on the law of large number</a:t>
+            </a:r>
+            <a:r>
+              <a:rPr lang="en-US" dirty="0"/>
+              <a:t>s</a:t>
+            </a:r>
+            <a:r>
+              <a:rPr dirty="0"/>
+              <a:t> and the central limit theorem</a:t>
             </a:r>
           </a:p>
         </p:txBody>
@@ -11126,7 +11244,7 @@
             </a:pPr>
             <a:r>
               <a:rPr lang="en-US" sz="1800" dirty="0"/>
-              <a:t>The limits of the CI has the same sign and the CI does not include 0</a:t>
+              <a:t>The limits of the CI have the same sign and the CI does not include 0</a:t>
             </a:r>
           </a:p>
           <a:p>
@@ -11308,7 +11426,7 @@
         </p:spPr>
         <p:txBody>
           <a:bodyPr>
-            <a:normAutofit/>
+            <a:normAutofit fontScale="85000" lnSpcReduction="10000"/>
           </a:bodyPr>
           <a:lstStyle/>
           <a:p>
@@ -11329,14 +11447,22 @@
           <a:p>
             <a:r>
               <a:rPr lang="en-US" dirty="0"/>
-              <a:t>But, is this distribution Normal? </a:t>
+              <a:t>Do we care if the distribution of the sample Normal? </a:t>
             </a:r>
           </a:p>
           <a:p>
             <a:r>
               <a:rPr lang="en-US" dirty="0"/>
-              <a:t>This distribution is close to Normal, but perhaps not </a:t>
-            </a:r>
+              <a:t>By the CLT we know the sampling distribution of the mean estimate is Normal</a:t>
+            </a:r>
+          </a:p>
+          <a:p>
+            <a:r>
+              <a:rPr lang="en-US" dirty="0"/>
+              <a:t>The bootstrap distribution works for the sample distribution of any statistic</a:t>
+            </a:r>
+          </a:p>
+          <a:p>
             <a:endParaRPr dirty="0"/>
           </a:p>
         </p:txBody>
@@ -11495,18 +11621,35 @@
             </a:r>
             <a:r>
               <a:rPr b="1" dirty="0"/>
-              <a:t>independently sample the two groups</a:t>
-            </a:r>
+              <a:t>independently </a:t>
+            </a:r>
+            <a:r>
+              <a:rPr lang="en-US" b="1" dirty="0"/>
+              <a:t>re</a:t>
+            </a:r>
+            <a:r>
+              <a:rPr b="1" dirty="0"/>
+              <a:t>sample the two </a:t>
+            </a:r>
+            <a:r>
+              <a:rPr lang="en-US" b="1" dirty="0"/>
+              <a:t>sets of observations</a:t>
+            </a:r>
+            <a:endParaRPr dirty="0"/>
+          </a:p>
+          <a:p>
+            <a:pPr lvl="0"/>
             <a:r>
               <a:rPr dirty="0"/>
-              <a:t> or populations</a:t>
-            </a:r>
-          </a:p>
-          <a:p>
-            <a:pPr lvl="0"/>
+              <a:t>Compute the statistic from the two </a:t>
+            </a:r>
+            <a:r>
+              <a:rPr lang="en-US" dirty="0"/>
+              <a:t>independent re</a:t>
+            </a:r>
             <a:r>
               <a:rPr dirty="0"/>
-              <a:t>Compute the statistic from the two samples</a:t>
+              <a:t>samples</a:t>
             </a:r>
           </a:p>
         </p:txBody>
@@ -11622,7 +11765,7 @@
             </a:r>
             <a:r>
               <a:rPr lang="en-US" dirty="0"/>
-              <a:t>values</a:t>
+              <a:t>values respectively</a:t>
             </a:r>
             <a:r>
               <a:rPr dirty="0"/>
@@ -11654,7 +11797,7 @@
             </a:r>
             <a:r>
               <a:rPr lang="en-US" dirty="0"/>
-              <a:t>from</a:t>
+              <a:t>in</a:t>
             </a:r>
             <a:r>
               <a:rPr dirty="0"/>
@@ -11666,8 +11809,13 @@
             </a:r>
             <a:r>
               <a:rPr dirty="0"/>
-              <a:t> population</a:t>
-            </a:r>
+              <a:t> </a:t>
+            </a:r>
+            <a:r>
+              <a:rPr lang="en-US" dirty="0"/>
+              <a:t>set of observations</a:t>
+            </a:r>
+            <a:endParaRPr dirty="0"/>
           </a:p>
           <a:p>
             <a:pPr marL="342900" lvl="0" indent="-342900">
@@ -14023,6 +14171,11 @@
               <a:rPr b="1" dirty="0"/>
               <a:t>likelihood</a:t>
             </a:r>
+            <a:r>
+              <a:rPr lang="en-US" b="1" dirty="0"/>
+              <a:t> model</a:t>
+            </a:r>
+            <a:endParaRPr b="1" dirty="0"/>
           </a:p>
           <a:p>
             <a:pPr lvl="0"/>
@@ -14035,7 +14188,15 @@
             <a:pPr lvl="0"/>
             <a:r>
               <a:rPr dirty="0"/>
-              <a:t>Parametric models have low variance estimates for statistics</a:t>
+              <a:t>Parametric models have low</a:t>
+            </a:r>
+            <a:r>
+              <a:rPr lang="en-US" dirty="0"/>
+              <a:t>er</a:t>
+            </a:r>
+            <a:r>
+              <a:rPr dirty="0"/>
+              <a:t> variance estimates for statistics</a:t>
             </a:r>
           </a:p>
           <a:p>
@@ -14137,7 +14298,7 @@
         <p:spPr/>
         <p:txBody>
           <a:bodyPr>
-            <a:normAutofit fontScale="85000" lnSpcReduction="20000"/>
+            <a:normAutofit fontScale="92500" lnSpcReduction="20000"/>
           </a:bodyPr>
           <a:lstStyle/>
           <a:p>
@@ -14169,13 +14330,6 @@
             </a:r>
           </a:p>
           <a:p>
-            <a:pPr lvl="1"/>
-            <a:r>
-              <a:rPr dirty="0"/>
-              <a:t>No likelihood model assumptions</a:t>
-            </a:r>
-          </a:p>
-          <a:p>
             <a:pPr lvl="0"/>
             <a:r>
               <a:rPr dirty="0"/>
@@ -14186,7 +14340,7 @@
             <a:pPr lvl="1"/>
             <a:r>
               <a:rPr lang="en-US" dirty="0"/>
-              <a:t>Example, mean and variance estimates</a:t>
+              <a:t>Example, mean, variance, correlation, and ratio estimates</a:t>
             </a:r>
           </a:p>
           <a:p>
@@ -14882,7 +15036,15 @@
             </a:r>
             <a:r>
               <a:rPr b="1" dirty="0"/>
-              <a:t>no assumptions about population distribution!</a:t>
+              <a:t>no assumptions about </a:t>
+            </a:r>
+            <a:r>
+              <a:rPr lang="en-US" b="1" dirty="0"/>
+              <a:t>sample</a:t>
+            </a:r>
+            <a:r>
+              <a:rPr b="1" dirty="0"/>
+              <a:t> distribution!</a:t>
             </a:r>
           </a:p>
           <a:p>

</xml_diff>